<commit_message>
completed first review of the slide deck.
</commit_message>
<xml_diff>
--- a/docs/MVP to MVVM.pptx
+++ b/docs/MVP to MVVM.pptx
@@ -5,17 +5,20 @@
     <p:sldMasterId id="2147483720" r:id="rId1"/>
   </p:sldMasterIdLst>
   <p:notesMasterIdLst>
-    <p:notesMasterId r:id="rId10"/>
+    <p:notesMasterId r:id="rId13"/>
   </p:notesMasterIdLst>
   <p:sldIdLst>
     <p:sldId id="256" r:id="rId2"/>
     <p:sldId id="257" r:id="rId3"/>
     <p:sldId id="260" r:id="rId4"/>
     <p:sldId id="263" r:id="rId5"/>
-    <p:sldId id="258" r:id="rId6"/>
-    <p:sldId id="261" r:id="rId7"/>
-    <p:sldId id="259" r:id="rId8"/>
-    <p:sldId id="262" r:id="rId9"/>
+    <p:sldId id="261" r:id="rId6"/>
+    <p:sldId id="258" r:id="rId7"/>
+    <p:sldId id="264" r:id="rId8"/>
+    <p:sldId id="265" r:id="rId9"/>
+    <p:sldId id="266" r:id="rId10"/>
+    <p:sldId id="259" r:id="rId11"/>
+    <p:sldId id="262" r:id="rId12"/>
   </p:sldIdLst>
   <p:sldSz cx="9144000" cy="6858000" type="screen4x3"/>
   <p:notesSz cx="6858000" cy="9144000"/>
@@ -903,6 +906,729 @@
     <p:extLst>
       <p:ext uri="{BB962C8B-B14F-4D97-AF65-F5344CB8AC3E}">
         <p14:creationId xmlns:p14="http://schemas.microsoft.com/office/powerpoint/2010/main" val="3011597861"/>
+      </p:ext>
+    </p:extLst>
+  </p:cSld>
+  <p:clrMapOvr>
+    <a:masterClrMapping/>
+  </p:clrMapOvr>
+</p:notes>
+</file>
+
+<file path=ppt/notesSlides/notesSlide4.xml><?xml version="1.0" encoding="utf-8"?>
+<p:notes xmlns:a="http://schemas.openxmlformats.org/drawingml/2006/main" xmlns:r="http://schemas.openxmlformats.org/officeDocument/2006/relationships" xmlns:p="http://schemas.openxmlformats.org/presentationml/2006/main">
+  <p:cSld>
+    <p:spTree>
+      <p:nvGrpSpPr>
+        <p:cNvPr id="1" name=""/>
+        <p:cNvGrpSpPr/>
+        <p:nvPr/>
+      </p:nvGrpSpPr>
+      <p:grpSpPr>
+        <a:xfrm>
+          <a:off x="0" y="0"/>
+          <a:ext cx="0" cy="0"/>
+          <a:chOff x="0" y="0"/>
+          <a:chExt cx="0" cy="0"/>
+        </a:xfrm>
+      </p:grpSpPr>
+      <p:sp>
+        <p:nvSpPr>
+          <p:cNvPr id="2" name="Slide Image Placeholder 1"/>
+          <p:cNvSpPr>
+            <a:spLocks noGrp="1" noRot="1" noChangeAspect="1"/>
+          </p:cNvSpPr>
+          <p:nvPr>
+            <p:ph type="sldImg"/>
+          </p:nvPr>
+        </p:nvSpPr>
+        <p:spPr/>
+      </p:sp>
+      <p:sp>
+        <p:nvSpPr>
+          <p:cNvPr id="3" name="Notes Placeholder 2"/>
+          <p:cNvSpPr>
+            <a:spLocks noGrp="1"/>
+          </p:cNvSpPr>
+          <p:nvPr>
+            <p:ph type="body" idx="1"/>
+          </p:nvPr>
+        </p:nvSpPr>
+        <p:spPr/>
+        <p:txBody>
+          <a:bodyPr/>
+          <a:lstStyle/>
+          <a:p>
+            <a:pPr marL="228600" indent="-228600">
+              <a:buAutoNum type="arabicPeriod"/>
+            </a:pPr>
+            <a:r>
+              <a:rPr lang="en-US" dirty="0" smtClean="0"/>
+              <a:t>MVVM: is a specialization of the more general</a:t>
+            </a:r>
+            <a:r>
+              <a:rPr lang="en-US" baseline="0" dirty="0" smtClean="0"/>
+              <a:t> Presentation Model pattern, tailor made for WPF and Silverlight.</a:t>
+            </a:r>
+          </a:p>
+          <a:p>
+            <a:pPr marL="228600" indent="-228600">
+              <a:buAutoNum type="arabicPeriod"/>
+            </a:pPr>
+            <a:r>
+              <a:rPr lang="en-US" baseline="0" dirty="0" smtClean="0"/>
+              <a:t>View knows which properties it must bind to.</a:t>
+            </a:r>
+          </a:p>
+          <a:p>
+            <a:pPr marL="228600" indent="-228600">
+              <a:buAutoNum type="arabicPeriod"/>
+            </a:pPr>
+            <a:r>
+              <a:rPr lang="en-CA" sz="1200" dirty="0" err="1" smtClean="0"/>
+              <a:t>ViewModel</a:t>
+            </a:r>
+            <a:r>
+              <a:rPr lang="en-CA" sz="1200" baseline="0" dirty="0" smtClean="0"/>
+              <a:t> c</a:t>
+            </a:r>
+            <a:r>
+              <a:rPr lang="en-CA" sz="1200" dirty="0" smtClean="0"/>
+              <a:t>ommunicates updates to the View via events.</a:t>
+            </a:r>
+            <a:endParaRPr lang="en-US" dirty="0"/>
+          </a:p>
+        </p:txBody>
+      </p:sp>
+      <p:sp>
+        <p:nvSpPr>
+          <p:cNvPr id="4" name="Slide Number Placeholder 3"/>
+          <p:cNvSpPr>
+            <a:spLocks noGrp="1"/>
+          </p:cNvSpPr>
+          <p:nvPr>
+            <p:ph type="sldNum" sz="quarter" idx="10"/>
+          </p:nvPr>
+        </p:nvSpPr>
+        <p:spPr/>
+        <p:txBody>
+          <a:bodyPr/>
+          <a:lstStyle/>
+          <a:p>
+            <a:fld id="{CA820E9B-1621-4B8C-AC33-C5AB23D4FDC8}" type="slidenum">
+              <a:rPr lang="en-US" smtClean="0"/>
+              <a:t>5</a:t>
+            </a:fld>
+            <a:endParaRPr lang="en-US"/>
+          </a:p>
+        </p:txBody>
+      </p:sp>
+    </p:spTree>
+    <p:extLst>
+      <p:ext uri="{BB962C8B-B14F-4D97-AF65-F5344CB8AC3E}">
+        <p14:creationId xmlns:p14="http://schemas.microsoft.com/office/powerpoint/2010/main" val="3978377817"/>
+      </p:ext>
+    </p:extLst>
+  </p:cSld>
+  <p:clrMapOvr>
+    <a:masterClrMapping/>
+  </p:clrMapOvr>
+</p:notes>
+</file>
+
+<file path=ppt/notesSlides/notesSlide5.xml><?xml version="1.0" encoding="utf-8"?>
+<p:notes xmlns:a="http://schemas.openxmlformats.org/drawingml/2006/main" xmlns:r="http://schemas.openxmlformats.org/officeDocument/2006/relationships" xmlns:p="http://schemas.openxmlformats.org/presentationml/2006/main">
+  <p:cSld>
+    <p:spTree>
+      <p:nvGrpSpPr>
+        <p:cNvPr id="1" name=""/>
+        <p:cNvGrpSpPr/>
+        <p:nvPr/>
+      </p:nvGrpSpPr>
+      <p:grpSpPr>
+        <a:xfrm>
+          <a:off x="0" y="0"/>
+          <a:ext cx="0" cy="0"/>
+          <a:chOff x="0" y="0"/>
+          <a:chExt cx="0" cy="0"/>
+        </a:xfrm>
+      </p:grpSpPr>
+      <p:sp>
+        <p:nvSpPr>
+          <p:cNvPr id="2" name="Slide Image Placeholder 1"/>
+          <p:cNvSpPr>
+            <a:spLocks noGrp="1" noRot="1" noChangeAspect="1"/>
+          </p:cNvSpPr>
+          <p:nvPr>
+            <p:ph type="sldImg"/>
+          </p:nvPr>
+        </p:nvSpPr>
+        <p:spPr/>
+      </p:sp>
+      <p:sp>
+        <p:nvSpPr>
+          <p:cNvPr id="3" name="Notes Placeholder 2"/>
+          <p:cNvSpPr>
+            <a:spLocks noGrp="1"/>
+          </p:cNvSpPr>
+          <p:nvPr>
+            <p:ph type="body" idx="1"/>
+          </p:nvPr>
+        </p:nvSpPr>
+        <p:spPr/>
+        <p:txBody>
+          <a:bodyPr/>
+          <a:lstStyle/>
+          <a:p>
+            <a:r>
+              <a:rPr lang="en-US" dirty="0" smtClean="0"/>
+              <a:t>Code Example</a:t>
+            </a:r>
+          </a:p>
+          <a:p>
+            <a:pPr marL="171450" indent="-171450">
+              <a:buFontTx/>
+              <a:buChar char="-"/>
+            </a:pPr>
+            <a:r>
+              <a:rPr lang="en-US" dirty="0" smtClean="0"/>
+              <a:t>Show</a:t>
+            </a:r>
+            <a:r>
+              <a:rPr lang="en-US" baseline="0" dirty="0" smtClean="0"/>
+              <a:t> the </a:t>
+            </a:r>
+            <a:r>
+              <a:rPr lang="en-US" dirty="0" err="1" smtClean="0"/>
+              <a:t>MainWindow.xaml</a:t>
+            </a:r>
+            <a:r>
+              <a:rPr lang="en-US" baseline="0" dirty="0" err="1" smtClean="0"/>
+              <a:t>.cs</a:t>
+            </a:r>
+            <a:r>
+              <a:rPr lang="en-US" baseline="0" dirty="0" smtClean="0"/>
+              <a:t> where we assign a </a:t>
+            </a:r>
+            <a:r>
+              <a:rPr lang="en-US" baseline="0" dirty="0" err="1" smtClean="0"/>
+              <a:t>ViewModel</a:t>
+            </a:r>
+            <a:r>
+              <a:rPr lang="en-US" baseline="0" dirty="0" smtClean="0"/>
+              <a:t> to the </a:t>
+            </a:r>
+            <a:r>
+              <a:rPr lang="en-US" baseline="0" dirty="0" err="1" smtClean="0"/>
+              <a:t>DataContext</a:t>
+            </a:r>
+            <a:r>
+              <a:rPr lang="en-US" baseline="0" dirty="0" smtClean="0"/>
+              <a:t>.</a:t>
+            </a:r>
+          </a:p>
+          <a:p>
+            <a:pPr marL="171450" indent="-171450">
+              <a:buFontTx/>
+              <a:buChar char="-"/>
+            </a:pPr>
+            <a:r>
+              <a:rPr lang="en-US" dirty="0" smtClean="0"/>
+              <a:t>Show the </a:t>
+            </a:r>
+            <a:r>
+              <a:rPr lang="en-US" dirty="0" err="1" smtClean="0"/>
+              <a:t>MainWindow.xaml</a:t>
+            </a:r>
+            <a:r>
+              <a:rPr lang="en-US" baseline="0" dirty="0" smtClean="0"/>
+              <a:t> where we bind to properties on the target </a:t>
+            </a:r>
+            <a:r>
+              <a:rPr lang="en-US" baseline="0" dirty="0" err="1" smtClean="0"/>
+              <a:t>ViewModel</a:t>
+            </a:r>
+            <a:r>
+              <a:rPr lang="en-US" baseline="0" dirty="0" smtClean="0"/>
+              <a:t>.</a:t>
+            </a:r>
+          </a:p>
+          <a:p>
+            <a:pPr marL="171450" indent="-171450">
+              <a:buFontTx/>
+              <a:buChar char="-"/>
+            </a:pPr>
+            <a:r>
+              <a:rPr lang="en-US" baseline="0" dirty="0" smtClean="0"/>
+              <a:t>Show the </a:t>
+            </a:r>
+            <a:r>
+              <a:rPr lang="en-US" baseline="0" dirty="0" err="1" smtClean="0"/>
+              <a:t>MainWindowViewModel</a:t>
+            </a:r>
+            <a:r>
+              <a:rPr lang="en-US" baseline="0" dirty="0" smtClean="0"/>
+              <a:t> to show the properties that the view is bound to.</a:t>
+            </a:r>
+            <a:endParaRPr lang="en-US" dirty="0"/>
+          </a:p>
+        </p:txBody>
+      </p:sp>
+      <p:sp>
+        <p:nvSpPr>
+          <p:cNvPr id="4" name="Slide Number Placeholder 3"/>
+          <p:cNvSpPr>
+            <a:spLocks noGrp="1"/>
+          </p:cNvSpPr>
+          <p:nvPr>
+            <p:ph type="sldNum" sz="quarter" idx="10"/>
+          </p:nvPr>
+        </p:nvSpPr>
+        <p:spPr/>
+        <p:txBody>
+          <a:bodyPr/>
+          <a:lstStyle/>
+          <a:p>
+            <a:fld id="{CA820E9B-1621-4B8C-AC33-C5AB23D4FDC8}" type="slidenum">
+              <a:rPr lang="en-US" smtClean="0"/>
+              <a:t>7</a:t>
+            </a:fld>
+            <a:endParaRPr lang="en-US"/>
+          </a:p>
+        </p:txBody>
+      </p:sp>
+    </p:spTree>
+    <p:extLst>
+      <p:ext uri="{BB962C8B-B14F-4D97-AF65-F5344CB8AC3E}">
+        <p14:creationId xmlns:p14="http://schemas.microsoft.com/office/powerpoint/2010/main" val="2730682473"/>
+      </p:ext>
+    </p:extLst>
+  </p:cSld>
+  <p:clrMapOvr>
+    <a:masterClrMapping/>
+  </p:clrMapOvr>
+</p:notes>
+</file>
+
+<file path=ppt/notesSlides/notesSlide6.xml><?xml version="1.0" encoding="utf-8"?>
+<p:notes xmlns:a="http://schemas.openxmlformats.org/drawingml/2006/main" xmlns:r="http://schemas.openxmlformats.org/officeDocument/2006/relationships" xmlns:p="http://schemas.openxmlformats.org/presentationml/2006/main">
+  <p:cSld>
+    <p:spTree>
+      <p:nvGrpSpPr>
+        <p:cNvPr id="1" name=""/>
+        <p:cNvGrpSpPr/>
+        <p:nvPr/>
+      </p:nvGrpSpPr>
+      <p:grpSpPr>
+        <a:xfrm>
+          <a:off x="0" y="0"/>
+          <a:ext cx="0" cy="0"/>
+          <a:chOff x="0" y="0"/>
+          <a:chExt cx="0" cy="0"/>
+        </a:xfrm>
+      </p:grpSpPr>
+      <p:sp>
+        <p:nvSpPr>
+          <p:cNvPr id="2" name="Slide Image Placeholder 1"/>
+          <p:cNvSpPr>
+            <a:spLocks noGrp="1" noRot="1" noChangeAspect="1"/>
+          </p:cNvSpPr>
+          <p:nvPr>
+            <p:ph type="sldImg"/>
+          </p:nvPr>
+        </p:nvSpPr>
+        <p:spPr/>
+      </p:sp>
+      <p:sp>
+        <p:nvSpPr>
+          <p:cNvPr id="3" name="Notes Placeholder 2"/>
+          <p:cNvSpPr>
+            <a:spLocks noGrp="1"/>
+          </p:cNvSpPr>
+          <p:nvPr>
+            <p:ph type="body" idx="1"/>
+          </p:nvPr>
+        </p:nvSpPr>
+        <p:spPr/>
+        <p:txBody>
+          <a:bodyPr/>
+          <a:lstStyle/>
+          <a:p>
+            <a:r>
+              <a:rPr lang="en-US" dirty="0" smtClean="0"/>
+              <a:t>Show them what happens when we change the </a:t>
+            </a:r>
+            <a:r>
+              <a:rPr lang="en-US" dirty="0" err="1" smtClean="0"/>
+              <a:t>Observable</a:t>
+            </a:r>
+            <a:r>
+              <a:rPr lang="en-US" baseline="0" dirty="0" err="1" smtClean="0"/>
+              <a:t>Collection</a:t>
+            </a:r>
+            <a:r>
+              <a:rPr lang="en-US" baseline="0" dirty="0" smtClean="0"/>
+              <a:t> to a List.</a:t>
+            </a:r>
+          </a:p>
+          <a:p>
+            <a:r>
+              <a:rPr lang="en-US" baseline="0" dirty="0" smtClean="0"/>
+              <a:t>Show them what happens when we do not raise a property changed for the warning icon.</a:t>
+            </a:r>
+          </a:p>
+          <a:p>
+            <a:r>
+              <a:rPr lang="en-US" baseline="0" dirty="0" smtClean="0"/>
+              <a:t>Calling the property changed event handler is not pretty, but we will show you a way to deal with it.</a:t>
+            </a:r>
+            <a:endParaRPr lang="en-US" dirty="0" smtClean="0"/>
+          </a:p>
+          <a:p>
+            <a:endParaRPr lang="en-US" dirty="0"/>
+          </a:p>
+        </p:txBody>
+      </p:sp>
+      <p:sp>
+        <p:nvSpPr>
+          <p:cNvPr id="4" name="Slide Number Placeholder 3"/>
+          <p:cNvSpPr>
+            <a:spLocks noGrp="1"/>
+          </p:cNvSpPr>
+          <p:nvPr>
+            <p:ph type="sldNum" sz="quarter" idx="10"/>
+          </p:nvPr>
+        </p:nvSpPr>
+        <p:spPr/>
+        <p:txBody>
+          <a:bodyPr/>
+          <a:lstStyle/>
+          <a:p>
+            <a:fld id="{CA820E9B-1621-4B8C-AC33-C5AB23D4FDC8}" type="slidenum">
+              <a:rPr lang="en-US" smtClean="0"/>
+              <a:t>8</a:t>
+            </a:fld>
+            <a:endParaRPr lang="en-US"/>
+          </a:p>
+        </p:txBody>
+      </p:sp>
+    </p:spTree>
+    <p:extLst>
+      <p:ext uri="{BB962C8B-B14F-4D97-AF65-F5344CB8AC3E}">
+        <p14:creationId xmlns:p14="http://schemas.microsoft.com/office/powerpoint/2010/main" val="363792024"/>
+      </p:ext>
+    </p:extLst>
+  </p:cSld>
+  <p:clrMapOvr>
+    <a:masterClrMapping/>
+  </p:clrMapOvr>
+</p:notes>
+</file>
+
+<file path=ppt/notesSlides/notesSlide7.xml><?xml version="1.0" encoding="utf-8"?>
+<p:notes xmlns:a="http://schemas.openxmlformats.org/drawingml/2006/main" xmlns:r="http://schemas.openxmlformats.org/officeDocument/2006/relationships" xmlns:p="http://schemas.openxmlformats.org/presentationml/2006/main">
+  <p:cSld>
+    <p:spTree>
+      <p:nvGrpSpPr>
+        <p:cNvPr id="1" name=""/>
+        <p:cNvGrpSpPr/>
+        <p:nvPr/>
+      </p:nvGrpSpPr>
+      <p:grpSpPr>
+        <a:xfrm>
+          <a:off x="0" y="0"/>
+          <a:ext cx="0" cy="0"/>
+          <a:chOff x="0" y="0"/>
+          <a:chExt cx="0" cy="0"/>
+        </a:xfrm>
+      </p:grpSpPr>
+      <p:sp>
+        <p:nvSpPr>
+          <p:cNvPr id="2" name="Slide Image Placeholder 1"/>
+          <p:cNvSpPr>
+            <a:spLocks noGrp="1" noRot="1" noChangeAspect="1"/>
+          </p:cNvSpPr>
+          <p:nvPr>
+            <p:ph type="sldImg"/>
+          </p:nvPr>
+        </p:nvSpPr>
+        <p:spPr/>
+      </p:sp>
+      <p:sp>
+        <p:nvSpPr>
+          <p:cNvPr id="3" name="Notes Placeholder 2"/>
+          <p:cNvSpPr>
+            <a:spLocks noGrp="1"/>
+          </p:cNvSpPr>
+          <p:nvPr>
+            <p:ph type="body" idx="1"/>
+          </p:nvPr>
+        </p:nvSpPr>
+        <p:spPr/>
+        <p:txBody>
+          <a:bodyPr/>
+          <a:lstStyle/>
+          <a:p>
+            <a:pPr marL="0" indent="0">
+              <a:buFontTx/>
+              <a:buNone/>
+            </a:pPr>
+            <a:r>
+              <a:rPr lang="en-US" dirty="0" smtClean="0"/>
+              <a:t>User</a:t>
+            </a:r>
+            <a:r>
+              <a:rPr lang="en-US" baseline="0" dirty="0" smtClean="0"/>
+              <a:t> Interaction</a:t>
+            </a:r>
+          </a:p>
+          <a:p>
+            <a:pPr marL="171450" indent="-171450">
+              <a:buFontTx/>
+              <a:buChar char="-"/>
+            </a:pPr>
+            <a:r>
+              <a:rPr lang="en-US" baseline="0" dirty="0" err="1" smtClean="0"/>
+              <a:t>IValueConverter</a:t>
+            </a:r>
+            <a:endParaRPr lang="en-US" baseline="0" dirty="0" smtClean="0"/>
+          </a:p>
+          <a:p>
+            <a:r>
+              <a:rPr lang="en-US" dirty="0" smtClean="0"/>
+              <a:t>Go</a:t>
+            </a:r>
+            <a:r>
+              <a:rPr lang="en-US" baseline="0" dirty="0" smtClean="0"/>
+              <a:t> over the </a:t>
+            </a:r>
+            <a:r>
+              <a:rPr lang="en-US" baseline="0" dirty="0" err="1" smtClean="0"/>
+              <a:t>SaveCommand</a:t>
+            </a:r>
+            <a:r>
+              <a:rPr lang="en-US" baseline="0" dirty="0" smtClean="0"/>
+              <a:t>, </a:t>
+            </a:r>
+            <a:r>
+              <a:rPr lang="en-US" baseline="0" dirty="0" err="1" smtClean="0"/>
+              <a:t>DeleteCommand</a:t>
+            </a:r>
+            <a:r>
+              <a:rPr lang="en-US" baseline="0" dirty="0" smtClean="0"/>
+              <a:t>.</a:t>
+            </a:r>
+          </a:p>
+          <a:p>
+            <a:r>
+              <a:rPr lang="en-US" baseline="0" dirty="0" smtClean="0"/>
+              <a:t>Go over the Description and </a:t>
+            </a:r>
+            <a:r>
+              <a:rPr lang="en-US" baseline="0" dirty="0" err="1" smtClean="0"/>
+              <a:t>DueDate</a:t>
+            </a:r>
+            <a:r>
+              <a:rPr lang="en-US" baseline="0" dirty="0" smtClean="0"/>
+              <a:t> validations.</a:t>
+            </a:r>
+            <a:endParaRPr lang="en-US" dirty="0"/>
+          </a:p>
+        </p:txBody>
+      </p:sp>
+      <p:sp>
+        <p:nvSpPr>
+          <p:cNvPr id="4" name="Slide Number Placeholder 3"/>
+          <p:cNvSpPr>
+            <a:spLocks noGrp="1"/>
+          </p:cNvSpPr>
+          <p:nvPr>
+            <p:ph type="sldNum" sz="quarter" idx="10"/>
+          </p:nvPr>
+        </p:nvSpPr>
+        <p:spPr/>
+        <p:txBody>
+          <a:bodyPr/>
+          <a:lstStyle/>
+          <a:p>
+            <a:fld id="{CA820E9B-1621-4B8C-AC33-C5AB23D4FDC8}" type="slidenum">
+              <a:rPr lang="en-US" smtClean="0"/>
+              <a:t>9</a:t>
+            </a:fld>
+            <a:endParaRPr lang="en-US"/>
+          </a:p>
+        </p:txBody>
+      </p:sp>
+    </p:spTree>
+    <p:extLst>
+      <p:ext uri="{BB962C8B-B14F-4D97-AF65-F5344CB8AC3E}">
+        <p14:creationId xmlns:p14="http://schemas.microsoft.com/office/powerpoint/2010/main" val="457232171"/>
+      </p:ext>
+    </p:extLst>
+  </p:cSld>
+  <p:clrMapOvr>
+    <a:masterClrMapping/>
+  </p:clrMapOvr>
+</p:notes>
+</file>
+
+<file path=ppt/notesSlides/notesSlide8.xml><?xml version="1.0" encoding="utf-8"?>
+<p:notes xmlns:a="http://schemas.openxmlformats.org/drawingml/2006/main" xmlns:r="http://schemas.openxmlformats.org/officeDocument/2006/relationships" xmlns:p="http://schemas.openxmlformats.org/presentationml/2006/main">
+  <p:cSld>
+    <p:spTree>
+      <p:nvGrpSpPr>
+        <p:cNvPr id="1" name=""/>
+        <p:cNvGrpSpPr/>
+        <p:nvPr/>
+      </p:nvGrpSpPr>
+      <p:grpSpPr>
+        <a:xfrm>
+          <a:off x="0" y="0"/>
+          <a:ext cx="0" cy="0"/>
+          <a:chOff x="0" y="0"/>
+          <a:chExt cx="0" cy="0"/>
+        </a:xfrm>
+      </p:grpSpPr>
+      <p:sp>
+        <p:nvSpPr>
+          <p:cNvPr id="2" name="Slide Image Placeholder 1"/>
+          <p:cNvSpPr>
+            <a:spLocks noGrp="1" noRot="1" noChangeAspect="1"/>
+          </p:cNvSpPr>
+          <p:nvPr>
+            <p:ph type="sldImg"/>
+          </p:nvPr>
+        </p:nvSpPr>
+        <p:spPr/>
+      </p:sp>
+      <p:sp>
+        <p:nvSpPr>
+          <p:cNvPr id="3" name="Notes Placeholder 2"/>
+          <p:cNvSpPr>
+            <a:spLocks noGrp="1"/>
+          </p:cNvSpPr>
+          <p:nvPr>
+            <p:ph type="body" idx="1"/>
+          </p:nvPr>
+        </p:nvSpPr>
+        <p:spPr/>
+        <p:txBody>
+          <a:bodyPr/>
+          <a:lstStyle/>
+          <a:p>
+            <a:r>
+              <a:rPr lang="en-US" dirty="0" smtClean="0"/>
+              <a:t>Show them the synchronizer.</a:t>
+            </a:r>
+          </a:p>
+          <a:p>
+            <a:endParaRPr lang="en-US" dirty="0" smtClean="0"/>
+          </a:p>
+          <a:p>
+            <a:r>
+              <a:rPr lang="en-US" dirty="0" err="1" smtClean="0"/>
+              <a:t>OpenFileDialog</a:t>
+            </a:r>
+            <a:r>
+              <a:rPr lang="en-US" dirty="0" smtClean="0"/>
+              <a:t> is hard to bind a </a:t>
+            </a:r>
+            <a:r>
+              <a:rPr lang="en-US" smtClean="0"/>
+              <a:t>view model too.</a:t>
+            </a:r>
+          </a:p>
+          <a:p>
+            <a:endParaRPr lang="en-US" dirty="0" smtClean="0"/>
+          </a:p>
+          <a:p>
+            <a:r>
+              <a:rPr lang="en-US" dirty="0" smtClean="0"/>
+              <a:t>XAML oddities</a:t>
+            </a:r>
+          </a:p>
+          <a:p>
+            <a:pPr marL="171450" indent="-171450">
+              <a:buFontTx/>
+              <a:buChar char="-"/>
+            </a:pPr>
+            <a:r>
+              <a:rPr lang="en-US" dirty="0" smtClean="0"/>
+              <a:t>Things</a:t>
+            </a:r>
+            <a:r>
+              <a:rPr lang="en-US" baseline="0" dirty="0" smtClean="0"/>
+              <a:t> like stretching controls (horizontal alignment/horizontal content alignment)</a:t>
+            </a:r>
+          </a:p>
+          <a:p>
+            <a:pPr marL="171450" indent="-171450">
+              <a:buFontTx/>
+              <a:buChar char="-"/>
+            </a:pPr>
+            <a:r>
+              <a:rPr lang="en-US" baseline="0" dirty="0" err="1" smtClean="0"/>
+              <a:t>DockPanel</a:t>
+            </a:r>
+            <a:r>
+              <a:rPr lang="en-US" baseline="0" dirty="0" smtClean="0"/>
+              <a:t> vs. </a:t>
+            </a:r>
+            <a:r>
+              <a:rPr lang="en-US" baseline="0" dirty="0" err="1" smtClean="0"/>
+              <a:t>StackPanel</a:t>
+            </a:r>
+            <a:r>
+              <a:rPr lang="en-US" baseline="0" dirty="0" smtClean="0"/>
+              <a:t>.</a:t>
+            </a:r>
+          </a:p>
+          <a:p>
+            <a:pPr marL="171450" indent="-171450">
+              <a:buFontTx/>
+              <a:buChar char="-"/>
+            </a:pPr>
+            <a:r>
+              <a:rPr lang="en-US" baseline="0" dirty="0" smtClean="0"/>
+              <a:t>Stretching</a:t>
+            </a:r>
+          </a:p>
+          <a:p>
+            <a:pPr marL="0" indent="0">
+              <a:buFontTx/>
+              <a:buNone/>
+            </a:pPr>
+            <a:endParaRPr lang="en-US" dirty="0"/>
+          </a:p>
+        </p:txBody>
+      </p:sp>
+      <p:sp>
+        <p:nvSpPr>
+          <p:cNvPr id="4" name="Slide Number Placeholder 3"/>
+          <p:cNvSpPr>
+            <a:spLocks noGrp="1"/>
+          </p:cNvSpPr>
+          <p:nvPr>
+            <p:ph type="sldNum" sz="quarter" idx="10"/>
+          </p:nvPr>
+        </p:nvSpPr>
+        <p:spPr/>
+        <p:txBody>
+          <a:bodyPr/>
+          <a:lstStyle/>
+          <a:p>
+            <a:fld id="{CA820E9B-1621-4B8C-AC33-C5AB23D4FDC8}" type="slidenum">
+              <a:rPr lang="en-US" smtClean="0"/>
+              <a:t>10</a:t>
+            </a:fld>
+            <a:endParaRPr lang="en-US"/>
+          </a:p>
+        </p:txBody>
+      </p:sp>
+    </p:spTree>
+    <p:extLst>
+      <p:ext uri="{BB962C8B-B14F-4D97-AF65-F5344CB8AC3E}">
+        <p14:creationId xmlns:p14="http://schemas.microsoft.com/office/powerpoint/2010/main" val="81893713"/>
       </p:ext>
     </p:extLst>
   </p:cSld>
@@ -4483,6 +5209,309 @@
 </p:sld>
 </file>
 
+<file path=ppt/slides/slide10.xml><?xml version="1.0" encoding="utf-8"?>
+<p:sld xmlns:a="http://schemas.openxmlformats.org/drawingml/2006/main" xmlns:r="http://schemas.openxmlformats.org/officeDocument/2006/relationships" xmlns:p="http://schemas.openxmlformats.org/presentationml/2006/main">
+  <p:cSld>
+    <p:spTree>
+      <p:nvGrpSpPr>
+        <p:cNvPr id="1" name=""/>
+        <p:cNvGrpSpPr/>
+        <p:nvPr/>
+      </p:nvGrpSpPr>
+      <p:grpSpPr>
+        <a:xfrm>
+          <a:off x="0" y="0"/>
+          <a:ext cx="0" cy="0"/>
+          <a:chOff x="0" y="0"/>
+          <a:chExt cx="0" cy="0"/>
+        </a:xfrm>
+      </p:grpSpPr>
+      <p:sp>
+        <p:nvSpPr>
+          <p:cNvPr id="2" name="Title 1"/>
+          <p:cNvSpPr>
+            <a:spLocks noGrp="1"/>
+          </p:cNvSpPr>
+          <p:nvPr>
+            <p:ph type="title"/>
+          </p:nvPr>
+        </p:nvSpPr>
+        <p:spPr/>
+        <p:txBody>
+          <a:bodyPr>
+            <a:normAutofit fontScale="90000"/>
+          </a:bodyPr>
+          <a:lstStyle/>
+          <a:p>
+            <a:r>
+              <a:rPr lang="en-CA" dirty="0" smtClean="0"/>
+              <a:t>Difficulties with </a:t>
+            </a:r>
+            <a:br>
+              <a:rPr lang="en-CA" dirty="0" smtClean="0"/>
+            </a:br>
+            <a:r>
+              <a:rPr lang="en-CA" dirty="0" smtClean="0"/>
+              <a:t>Model-View-</a:t>
+            </a:r>
+            <a:r>
+              <a:rPr lang="en-CA" dirty="0" err="1" smtClean="0"/>
+              <a:t>ViewModel</a:t>
+            </a:r>
+            <a:endParaRPr lang="en-CA" dirty="0"/>
+          </a:p>
+        </p:txBody>
+      </p:sp>
+      <p:sp>
+        <p:nvSpPr>
+          <p:cNvPr id="3" name="Content Placeholder 2"/>
+          <p:cNvSpPr>
+            <a:spLocks noGrp="1"/>
+          </p:cNvSpPr>
+          <p:nvPr>
+            <p:ph idx="1"/>
+          </p:nvPr>
+        </p:nvSpPr>
+        <p:spPr/>
+        <p:txBody>
+          <a:bodyPr/>
+          <a:lstStyle/>
+          <a:p>
+            <a:r>
+              <a:rPr lang="en-CA" dirty="0" smtClean="0"/>
+              <a:t>Bindings are strings (XAML vs. </a:t>
+            </a:r>
+            <a:r>
+              <a:rPr lang="en-CA" smtClean="0"/>
+              <a:t>C#)</a:t>
+            </a:r>
+            <a:endParaRPr lang="en-CA" dirty="0" smtClean="0"/>
+          </a:p>
+          <a:p>
+            <a:r>
+              <a:rPr lang="en-CA" dirty="0" smtClean="0"/>
+              <a:t>Some controls </a:t>
+            </a:r>
+            <a:r>
+              <a:rPr lang="en-CA" dirty="0" smtClean="0"/>
+              <a:t>don’t bind well</a:t>
+            </a:r>
+          </a:p>
+          <a:p>
+            <a:r>
+              <a:rPr lang="en-CA" dirty="0" err="1" smtClean="0"/>
+              <a:t>INotifyPropertyChanged</a:t>
+            </a:r>
+            <a:r>
+              <a:rPr lang="en-CA" dirty="0" smtClean="0"/>
+              <a:t> events are published as</a:t>
+            </a:r>
+            <a:r>
+              <a:rPr lang="en-CA" dirty="0" smtClean="0"/>
+              <a:t> strings</a:t>
+            </a:r>
+          </a:p>
+          <a:p>
+            <a:pPr lvl="1"/>
+            <a:r>
+              <a:rPr lang="en-CA" dirty="0" smtClean="0"/>
+              <a:t>Synchronizer&lt;T&gt;</a:t>
+            </a:r>
+            <a:endParaRPr lang="en-CA" dirty="0" smtClean="0"/>
+          </a:p>
+          <a:p>
+            <a:r>
+              <a:rPr lang="en-CA" dirty="0" smtClean="0"/>
+              <a:t>XAML </a:t>
+            </a:r>
+            <a:r>
+              <a:rPr lang="en-CA" dirty="0" smtClean="0"/>
+              <a:t>Oddities</a:t>
+            </a:r>
+          </a:p>
+        </p:txBody>
+      </p:sp>
+    </p:spTree>
+    <p:extLst>
+      <p:ext uri="{BB962C8B-B14F-4D97-AF65-F5344CB8AC3E}">
+        <p14:creationId xmlns:p14="http://schemas.microsoft.com/office/powerpoint/2010/main" val="2372477167"/>
+      </p:ext>
+    </p:extLst>
+  </p:cSld>
+  <p:clrMapOvr>
+    <a:masterClrMapping/>
+  </p:clrMapOvr>
+  <p:timing>
+    <p:tnLst>
+      <p:par>
+        <p:cTn id="1" dur="indefinite" restart="never" nodeType="tmRoot"/>
+      </p:par>
+    </p:tnLst>
+  </p:timing>
+</p:sld>
+</file>
+
+<file path=ppt/slides/slide11.xml><?xml version="1.0" encoding="utf-8"?>
+<p:sld xmlns:a="http://schemas.openxmlformats.org/drawingml/2006/main" xmlns:r="http://schemas.openxmlformats.org/officeDocument/2006/relationships" xmlns:p="http://schemas.openxmlformats.org/presentationml/2006/main">
+  <p:cSld>
+    <p:spTree>
+      <p:nvGrpSpPr>
+        <p:cNvPr id="1" name=""/>
+        <p:cNvGrpSpPr/>
+        <p:nvPr/>
+      </p:nvGrpSpPr>
+      <p:grpSpPr>
+        <a:xfrm>
+          <a:off x="0" y="0"/>
+          <a:ext cx="0" cy="0"/>
+          <a:chOff x="0" y="0"/>
+          <a:chExt cx="0" cy="0"/>
+        </a:xfrm>
+      </p:grpSpPr>
+      <p:sp>
+        <p:nvSpPr>
+          <p:cNvPr id="2" name="Title 1"/>
+          <p:cNvSpPr>
+            <a:spLocks noGrp="1"/>
+          </p:cNvSpPr>
+          <p:nvPr>
+            <p:ph type="title"/>
+          </p:nvPr>
+        </p:nvSpPr>
+        <p:spPr/>
+        <p:txBody>
+          <a:bodyPr/>
+          <a:lstStyle/>
+          <a:p>
+            <a:r>
+              <a:rPr lang="en-CA" dirty="0" smtClean="0"/>
+              <a:t>Contact Us</a:t>
+            </a:r>
+            <a:endParaRPr lang="en-CA" dirty="0"/>
+          </a:p>
+        </p:txBody>
+      </p:sp>
+      <p:sp>
+        <p:nvSpPr>
+          <p:cNvPr id="3" name="Content Placeholder 2"/>
+          <p:cNvSpPr>
+            <a:spLocks noGrp="1"/>
+          </p:cNvSpPr>
+          <p:nvPr>
+            <p:ph idx="1"/>
+          </p:nvPr>
+        </p:nvSpPr>
+        <p:spPr>
+          <a:xfrm>
+            <a:off x="539552" y="2564904"/>
+            <a:ext cx="8183880" cy="2898648"/>
+          </a:xfrm>
+        </p:spPr>
+        <p:txBody>
+          <a:bodyPr/>
+          <a:lstStyle/>
+          <a:p>
+            <a:r>
+              <a:rPr lang="en-CA" dirty="0" smtClean="0"/>
+              <a:t>Jason Lepp </a:t>
+            </a:r>
+          </a:p>
+          <a:p>
+            <a:pPr lvl="1"/>
+            <a:r>
+              <a:rPr lang="en-CA" dirty="0" smtClean="0">
+                <a:hlinkClick r:id="rId2"/>
+              </a:rPr>
+              <a:t>awesome@arcresources.com</a:t>
+            </a:r>
+            <a:endParaRPr lang="en-CA" dirty="0" smtClean="0"/>
+          </a:p>
+          <a:p>
+            <a:r>
+              <a:rPr lang="en-CA" dirty="0" smtClean="0"/>
+              <a:t>Mo </a:t>
+            </a:r>
+            <a:r>
+              <a:rPr lang="en-CA" dirty="0"/>
+              <a:t>Khan</a:t>
+            </a:r>
+          </a:p>
+          <a:p>
+            <a:pPr lvl="1"/>
+            <a:r>
+              <a:rPr lang="en-CA" dirty="0"/>
+              <a:t> </a:t>
+            </a:r>
+            <a:r>
+              <a:rPr lang="en-CA" dirty="0" smtClean="0"/>
+              <a:t>mocheen@arcresources.com</a:t>
+            </a:r>
+          </a:p>
+          <a:p>
+            <a:r>
+              <a:rPr lang="en-CA" dirty="0" smtClean="0"/>
+              <a:t>Craig Anderson</a:t>
+            </a:r>
+          </a:p>
+          <a:p>
+            <a:pPr lvl="1"/>
+            <a:r>
+              <a:rPr lang="en-CA" dirty="0" smtClean="0"/>
+              <a:t>justKeepingUp@arcresources.com</a:t>
+            </a:r>
+          </a:p>
+        </p:txBody>
+      </p:sp>
+      <p:pic>
+        <p:nvPicPr>
+          <p:cNvPr id="4" name="Picture 3"/>
+          <p:cNvPicPr>
+            <a:picLocks noChangeAspect="1"/>
+          </p:cNvPicPr>
+          <p:nvPr/>
+        </p:nvPicPr>
+        <p:blipFill>
+          <a:blip r:embed="rId3" cstate="print">
+            <a:extLst>
+              <a:ext uri="{28A0092B-C50C-407E-A947-70E740481C1C}">
+                <a14:useLocalDpi xmlns:a14="http://schemas.microsoft.com/office/drawing/2010/main" val="0"/>
+              </a:ext>
+            </a:extLst>
+          </a:blip>
+          <a:stretch>
+            <a:fillRect/>
+          </a:stretch>
+        </p:blipFill>
+        <p:spPr>
+          <a:xfrm>
+            <a:off x="3851920" y="836712"/>
+            <a:ext cx="4608512" cy="1973105"/>
+          </a:xfrm>
+          <a:prstGeom prst="rect">
+            <a:avLst/>
+          </a:prstGeom>
+        </p:spPr>
+      </p:pic>
+    </p:spTree>
+    <p:extLst>
+      <p:ext uri="{BB962C8B-B14F-4D97-AF65-F5344CB8AC3E}">
+        <p14:creationId xmlns:p14="http://schemas.microsoft.com/office/powerpoint/2010/main" val="3854264388"/>
+      </p:ext>
+    </p:extLst>
+  </p:cSld>
+  <p:clrMapOvr>
+    <a:masterClrMapping/>
+  </p:clrMapOvr>
+  <p:timing>
+    <p:tnLst>
+      <p:par>
+        <p:cTn id="1" dur="indefinite" restart="never" nodeType="tmRoot"/>
+      </p:par>
+    </p:tnLst>
+  </p:timing>
+</p:sld>
+</file>
+
 <file path=ppt/slides/slide2.xml><?xml version="1.0" encoding="utf-8"?>
 <p:sld xmlns:a="http://schemas.openxmlformats.org/drawingml/2006/main" xmlns:r="http://schemas.openxmlformats.org/officeDocument/2006/relationships" xmlns:p="http://schemas.openxmlformats.org/presentationml/2006/main">
   <p:cSld>
@@ -4536,7 +5565,7 @@
         <p:spPr/>
         <p:txBody>
           <a:bodyPr>
-            <a:normAutofit lnSpcReduction="10000"/>
+            <a:normAutofit fontScale="92500" lnSpcReduction="10000"/>
           </a:bodyPr>
           <a:lstStyle/>
           <a:p>
@@ -4548,16 +5577,18 @@
               <a:rPr lang="en-CA" dirty="0" smtClean="0"/>
               <a:t>Model-View-Presenter</a:t>
             </a:r>
+          </a:p>
+          <a:p>
+            <a:r>
+              <a:rPr lang="en-CA" dirty="0" smtClean="0"/>
+              <a:t>Sample App</a:t>
+            </a:r>
             <a:endParaRPr lang="en-CA" dirty="0" smtClean="0"/>
           </a:p>
           <a:p>
             <a:r>
               <a:rPr lang="en-CA" dirty="0" smtClean="0"/>
-              <a:t>Introduction </a:t>
-            </a:r>
-            <a:r>
-              <a:rPr lang="en-CA" dirty="0" smtClean="0"/>
-              <a:t>to Model-View-</a:t>
+              <a:t>Introduction to Model-View-</a:t>
             </a:r>
             <a:r>
               <a:rPr lang="en-CA" dirty="0" err="1" smtClean="0"/>
@@ -4588,8 +5619,21 @@
             <a:pPr lvl="1"/>
             <a:r>
               <a:rPr lang="en-CA" dirty="0" smtClean="0"/>
-              <a:t>Communicating changes to the view.</a:t>
-            </a:r>
+              <a:t>Communicating </a:t>
+            </a:r>
+            <a:r>
+              <a:rPr lang="en-CA" dirty="0" smtClean="0"/>
+              <a:t>Changes </a:t>
+            </a:r>
+            <a:r>
+              <a:rPr lang="en-CA" dirty="0" smtClean="0"/>
+              <a:t>to the </a:t>
+            </a:r>
+            <a:r>
+              <a:rPr lang="en-CA" dirty="0" smtClean="0"/>
+              <a:t>View</a:t>
+            </a:r>
+            <a:endParaRPr lang="en-CA" dirty="0" smtClean="0"/>
           </a:p>
           <a:p>
             <a:pPr lvl="1"/>
@@ -4597,20 +5641,11 @@
               <a:rPr lang="en-CA" dirty="0" smtClean="0"/>
               <a:t>User Interaction</a:t>
             </a:r>
-            <a:endParaRPr lang="en-CA" dirty="0" smtClean="0"/>
           </a:p>
           <a:p>
             <a:r>
               <a:rPr lang="en-CA" dirty="0" smtClean="0"/>
-              <a:t>Difficulties </a:t>
-            </a:r>
-            <a:r>
-              <a:rPr lang="en-CA" dirty="0" smtClean="0"/>
-              <a:t>with </a:t>
-            </a:r>
-            <a:r>
-              <a:rPr lang="en-CA" dirty="0" smtClean="0"/>
-              <a:t>Model-View-</a:t>
+              <a:t>Difficulties with Model-View-</a:t>
             </a:r>
             <a:r>
               <a:rPr lang="en-CA" dirty="0" err="1" smtClean="0"/>
@@ -4702,10 +5737,6 @@
               <a:rPr lang="en-CA" dirty="0" smtClean="0"/>
               <a:t>Reviewing</a:t>
             </a:r>
-            <a:r>
-              <a:rPr lang="en-CA" dirty="0" smtClean="0"/>
-              <a:t/>
-            </a:r>
             <a:br>
               <a:rPr lang="en-CA" dirty="0" smtClean="0"/>
             </a:br>
@@ -4765,11 +5796,7 @@
             </a:r>
             <a:r>
               <a:rPr lang="en-CA" sz="1600" dirty="0" smtClean="0"/>
-              <a:t>here </a:t>
-            </a:r>
-            <a:r>
-              <a:rPr lang="en-CA" sz="1600" dirty="0" smtClean="0"/>
-              <a:t>is a lot of </a:t>
+              <a:t>here is a lot of </a:t>
             </a:r>
             <a:r>
               <a:rPr lang="en-CA" sz="1600" i="1" dirty="0" smtClean="0"/>
@@ -4777,15 +5804,7 @@
             </a:r>
             <a:r>
               <a:rPr lang="en-CA" sz="1600" dirty="0" smtClean="0"/>
-              <a:t> </a:t>
-            </a:r>
-            <a:r>
-              <a:rPr lang="en-CA" sz="1600" dirty="0" smtClean="0"/>
-              <a:t>between the View and </a:t>
-            </a:r>
-            <a:r>
-              <a:rPr lang="en-CA" sz="1600" dirty="0" smtClean="0"/>
-              <a:t>Presenter</a:t>
+              <a:t> between the View and Presenter</a:t>
             </a:r>
           </a:p>
           <a:p>
@@ -4801,28 +5820,11 @@
               <a:rPr lang="en-CA" sz="1400" dirty="0" smtClean="0"/>
               <a:t>Chatter back and forth</a:t>
             </a:r>
-            <a:endParaRPr lang="en-CA" sz="1400" dirty="0" smtClean="0"/>
           </a:p>
           <a:p>
             <a:r>
               <a:rPr lang="en-CA" sz="1600" dirty="0" smtClean="0"/>
-              <a:t>Presenter has </a:t>
-            </a:r>
-            <a:r>
-              <a:rPr lang="en-CA" sz="1600" dirty="0" smtClean="0"/>
-              <a:t>reference </a:t>
-            </a:r>
-            <a:r>
-              <a:rPr lang="en-CA" sz="1600" dirty="0" smtClean="0"/>
-              <a:t>to View to </a:t>
-            </a:r>
-            <a:r>
-              <a:rPr lang="en-CA" sz="1600" dirty="0" smtClean="0"/>
-              <a:t>tell </a:t>
-            </a:r>
-            <a:r>
-              <a:rPr lang="en-CA" sz="1600" dirty="0" smtClean="0"/>
-              <a:t>it what to do</a:t>
+              <a:t>Presenter has reference to View to tell it what to do</a:t>
             </a:r>
           </a:p>
           <a:p>
@@ -5042,7 +6044,7 @@
           <a:p>
             <a:r>
               <a:rPr lang="en-CA" dirty="0" smtClean="0"/>
-              <a:t>Why Move to </a:t>
+              <a:t>Introduction to </a:t>
             </a:r>
             <a:br>
               <a:rPr lang="en-CA" dirty="0" smtClean="0"/>
@@ -5054,6 +6056,235 @@
             <a:r>
               <a:rPr lang="en-CA" dirty="0" err="1" smtClean="0"/>
               <a:t>ViewModel</a:t>
+            </a:r>
+            <a:endParaRPr lang="en-CA" dirty="0"/>
+          </a:p>
+        </p:txBody>
+      </p:sp>
+      <p:sp>
+        <p:nvSpPr>
+          <p:cNvPr id="3" name="Content Placeholder 2"/>
+          <p:cNvSpPr>
+            <a:spLocks noGrp="1"/>
+          </p:cNvSpPr>
+          <p:nvPr>
+            <p:ph idx="1"/>
+          </p:nvPr>
+        </p:nvSpPr>
+        <p:spPr>
+          <a:xfrm>
+            <a:off x="467544" y="548681"/>
+            <a:ext cx="8183880" cy="2016224"/>
+          </a:xfrm>
+        </p:spPr>
+        <p:txBody>
+          <a:bodyPr>
+            <a:noAutofit/>
+          </a:bodyPr>
+          <a:lstStyle/>
+          <a:p>
+            <a:r>
+              <a:rPr lang="en-CA" dirty="0" smtClean="0"/>
+              <a:t>Another Presentation Pattern</a:t>
+            </a:r>
+          </a:p>
+          <a:p>
+            <a:r>
+              <a:rPr lang="en-CA" dirty="0" err="1" smtClean="0"/>
+              <a:t>ViewModel</a:t>
+            </a:r>
+            <a:r>
+              <a:rPr lang="en-CA" dirty="0" smtClean="0"/>
+              <a:t> </a:t>
+            </a:r>
+            <a:r>
+              <a:rPr lang="en-CA" dirty="0" smtClean="0"/>
+              <a:t>knows nothing of the </a:t>
+            </a:r>
+            <a:r>
+              <a:rPr lang="en-CA" dirty="0" smtClean="0"/>
+              <a:t>View</a:t>
+            </a:r>
+          </a:p>
+          <a:p>
+            <a:r>
+              <a:rPr lang="en-CA" dirty="0" err="1" smtClean="0"/>
+              <a:t>ViewModel</a:t>
+            </a:r>
+            <a:r>
+              <a:rPr lang="en-CA" dirty="0" smtClean="0"/>
+              <a:t> </a:t>
+            </a:r>
+            <a:r>
+              <a:rPr lang="en-CA" dirty="0" smtClean="0"/>
+              <a:t>is </a:t>
+            </a:r>
+            <a:r>
+              <a:rPr lang="en-CA" dirty="0" smtClean="0"/>
+              <a:t>attached </a:t>
+            </a:r>
+            <a:r>
+              <a:rPr lang="en-CA" dirty="0" smtClean="0"/>
+              <a:t>to the View </a:t>
+            </a:r>
+          </a:p>
+          <a:p>
+            <a:r>
+              <a:rPr lang="en-CA" dirty="0" smtClean="0"/>
+              <a:t>Behaviour is executed through commands which interact with the Model</a:t>
+            </a:r>
+            <a:endParaRPr lang="en-CA" dirty="0"/>
+          </a:p>
+        </p:txBody>
+      </p:sp>
+      <p:pic>
+        <p:nvPicPr>
+          <p:cNvPr id="2051" name="Picture 3"/>
+          <p:cNvPicPr>
+            <a:picLocks noChangeAspect="1" noChangeArrowheads="1"/>
+          </p:cNvPicPr>
+          <p:nvPr/>
+        </p:nvPicPr>
+        <p:blipFill>
+          <a:blip r:embed="rId3">
+            <a:extLst>
+              <a:ext uri="{28A0092B-C50C-407E-A947-70E740481C1C}">
+                <a14:useLocalDpi xmlns:a14="http://schemas.microsoft.com/office/drawing/2010/main" val="0"/>
+              </a:ext>
+            </a:extLst>
+          </a:blip>
+          <a:srcRect/>
+          <a:stretch>
+            <a:fillRect/>
+          </a:stretch>
+        </p:blipFill>
+        <p:spPr bwMode="auto">
+          <a:xfrm>
+            <a:off x="5292080" y="2924944"/>
+            <a:ext cx="2105025" cy="1419225"/>
+          </a:xfrm>
+          <a:prstGeom prst="rect">
+            <a:avLst/>
+          </a:prstGeom>
+          <a:noFill/>
+          <a:ln>
+            <a:noFill/>
+          </a:ln>
+          <a:effectLst/>
+          <a:extLst>
+            <a:ext uri="{909E8E84-426E-40DD-AFC4-6F175D3DCCD1}">
+              <a14:hiddenFill xmlns:a14="http://schemas.microsoft.com/office/drawing/2010/main">
+                <a:solidFill>
+                  <a:schemeClr val="accent1"/>
+                </a:solidFill>
+              </a14:hiddenFill>
+            </a:ext>
+            <a:ext uri="{91240B29-F687-4F45-9708-019B960494DF}">
+              <a14:hiddenLine xmlns:a14="http://schemas.microsoft.com/office/drawing/2010/main" w="9525">
+                <a:solidFill>
+                  <a:schemeClr val="tx1"/>
+                </a:solidFill>
+                <a:miter lim="800000"/>
+                <a:headEnd/>
+                <a:tailEnd/>
+              </a14:hiddenLine>
+            </a:ext>
+            <a:ext uri="{AF507438-7753-43E0-B8FC-AC1667EBCBE1}">
+              <a14:hiddenEffects xmlns:a14="http://schemas.microsoft.com/office/drawing/2010/main">
+                <a:effectLst>
+                  <a:outerShdw dist="35921" dir="2700000" algn="ctr" rotWithShape="0">
+                    <a:schemeClr val="bg2"/>
+                  </a:outerShdw>
+                </a:effectLst>
+              </a14:hiddenEffects>
+            </a:ext>
+          </a:extLst>
+        </p:spPr>
+      </p:pic>
+    </p:spTree>
+    <p:extLst>
+      <p:ext uri="{BB962C8B-B14F-4D97-AF65-F5344CB8AC3E}">
+        <p14:creationId xmlns:p14="http://schemas.microsoft.com/office/powerpoint/2010/main" val="90620156"/>
+      </p:ext>
+    </p:extLst>
+  </p:cSld>
+  <p:clrMapOvr>
+    <a:masterClrMapping/>
+  </p:clrMapOvr>
+  <p:timing>
+    <p:tnLst>
+      <p:par>
+        <p:cTn id="1" dur="indefinite" restart="never" nodeType="tmRoot"/>
+      </p:par>
+    </p:tnLst>
+  </p:timing>
+</p:sld>
+</file>
+
+<file path=ppt/slides/slide6.xml><?xml version="1.0" encoding="utf-8"?>
+<p:sld xmlns:a="http://schemas.openxmlformats.org/drawingml/2006/main" xmlns:r="http://schemas.openxmlformats.org/officeDocument/2006/relationships" xmlns:p="http://schemas.openxmlformats.org/presentationml/2006/main">
+  <p:cSld>
+    <p:spTree>
+      <p:nvGrpSpPr>
+        <p:cNvPr id="1" name=""/>
+        <p:cNvGrpSpPr/>
+        <p:nvPr/>
+      </p:nvGrpSpPr>
+      <p:grpSpPr>
+        <a:xfrm>
+          <a:off x="0" y="0"/>
+          <a:ext cx="0" cy="0"/>
+          <a:chOff x="0" y="0"/>
+          <a:chExt cx="0" cy="0"/>
+        </a:xfrm>
+      </p:grpSpPr>
+      <p:sp>
+        <p:nvSpPr>
+          <p:cNvPr id="2" name="Title 1"/>
+          <p:cNvSpPr>
+            <a:spLocks noGrp="1"/>
+          </p:cNvSpPr>
+          <p:nvPr>
+            <p:ph type="title"/>
+          </p:nvPr>
+        </p:nvSpPr>
+        <p:spPr/>
+        <p:txBody>
+          <a:bodyPr>
+            <a:normAutofit fontScale="90000"/>
+          </a:bodyPr>
+          <a:lstStyle/>
+          <a:p>
+            <a:r>
+              <a:rPr lang="en-CA" dirty="0" smtClean="0"/>
+              <a:t>Why </a:t>
+            </a:r>
+            <a:r>
+              <a:rPr lang="en-CA" dirty="0"/>
+              <a:t>U</a:t>
+            </a:r>
+            <a:r>
+              <a:rPr lang="en-CA" dirty="0" smtClean="0"/>
+              <a:t>se </a:t>
+            </a:r>
+            <a:r>
+              <a:rPr lang="en-CA" dirty="0" smtClean="0"/>
+              <a:t/>
+            </a:r>
+            <a:br>
+              <a:rPr lang="en-CA" dirty="0" smtClean="0"/>
+            </a:br>
+            <a:r>
+              <a:rPr lang="en-CA" dirty="0" smtClean="0"/>
+              <a:t>Model-View-</a:t>
+            </a:r>
+            <a:r>
+              <a:rPr lang="en-CA" dirty="0" err="1" smtClean="0"/>
+              <a:t>ViewModel</a:t>
+            </a:r>
+            <a:r>
+              <a:rPr lang="en-CA" dirty="0" smtClean="0"/>
+              <a:t>?</a:t>
             </a:r>
             <a:endParaRPr lang="en-CA" dirty="0"/>
           </a:p>
@@ -5080,8 +6311,42 @@
             </a:pPr>
             <a:r>
               <a:rPr lang="en-CA" dirty="0" smtClean="0"/>
-              <a:t>Less Code</a:t>
-            </a:r>
+              <a:t>Built-in </a:t>
+            </a:r>
+            <a:r>
+              <a:rPr lang="en-CA" dirty="0"/>
+              <a:t>plumbing via </a:t>
+            </a:r>
+            <a:r>
+              <a:rPr lang="en-CA" dirty="0" smtClean="0"/>
+              <a:t>WPF features</a:t>
+            </a:r>
+            <a:endParaRPr lang="en-CA" dirty="0" smtClean="0"/>
+          </a:p>
+          <a:p>
+            <a:pPr marL="834390" lvl="1" indent="-514350">
+              <a:buFont typeface="+mj-lt"/>
+              <a:buAutoNum type="alphaLcParenR"/>
+            </a:pPr>
+            <a:r>
+              <a:rPr lang="en-CA" dirty="0" smtClean="0"/>
+              <a:t>Less </a:t>
+            </a:r>
+            <a:r>
+              <a:rPr lang="en-CA" dirty="0" smtClean="0"/>
+              <a:t>Code</a:t>
+            </a:r>
+          </a:p>
+          <a:p>
+            <a:pPr marL="834390" lvl="1" indent="-514350">
+              <a:buFont typeface="+mj-lt"/>
+              <a:buAutoNum type="alphaLcParenR"/>
+            </a:pPr>
+            <a:r>
+              <a:rPr lang="en-CA" dirty="0" smtClean="0"/>
+              <a:t>Looser Coupling</a:t>
+            </a:r>
+            <a:endParaRPr lang="en-CA" dirty="0" smtClean="0"/>
           </a:p>
           <a:p>
             <a:pPr marL="514350" indent="-514350">
@@ -5090,7 +6355,15 @@
             </a:pPr>
             <a:r>
               <a:rPr lang="en-CA" dirty="0" smtClean="0"/>
-              <a:t>Loosely Coupled</a:t>
+              <a:t>Focus </a:t>
+            </a:r>
+            <a:r>
+              <a:rPr lang="en-CA" dirty="0" smtClean="0"/>
+              <a:t>on design without </a:t>
+            </a:r>
+            <a:r>
+              <a:rPr lang="en-CA" dirty="0" smtClean="0"/>
+              <a:t>affecting behaviour</a:t>
             </a:r>
           </a:p>
           <a:p>
@@ -5100,32 +6373,14 @@
             </a:pPr>
             <a:r>
               <a:rPr lang="en-CA" dirty="0" smtClean="0"/>
-              <a:t>Easier plumbing</a:t>
-            </a:r>
+              <a:t>Maintainability</a:t>
+            </a:r>
+            <a:endParaRPr lang="en-CA" dirty="0"/>
           </a:p>
           <a:p>
             <a:pPr marL="514350" indent="-514350">
               <a:buFont typeface="+mj-lt"/>
               <a:buAutoNum type="arabicPeriod"/>
-            </a:pPr>
-            <a:r>
-              <a:rPr lang="en-CA" dirty="0" smtClean="0"/>
-              <a:t>Increased Test Coverage</a:t>
-            </a:r>
-          </a:p>
-          <a:p>
-            <a:pPr marL="514350" indent="-514350">
-              <a:buFont typeface="+mj-lt"/>
-              <a:buAutoNum type="arabicPeriod"/>
-            </a:pPr>
-            <a:r>
-              <a:rPr lang="en-CA" dirty="0" smtClean="0"/>
-              <a:t>Focus on design without effecting behaviour</a:t>
-            </a:r>
-          </a:p>
-          <a:p>
-            <a:pPr marL="0" indent="0">
-              <a:buNone/>
             </a:pPr>
             <a:endParaRPr lang="en-CA" dirty="0"/>
           </a:p>
@@ -5296,211 +6551,6 @@
 </p:sld>
 </file>
 
-<file path=ppt/slides/slide6.xml><?xml version="1.0" encoding="utf-8"?>
-<p:sld xmlns:a="http://schemas.openxmlformats.org/drawingml/2006/main" xmlns:r="http://schemas.openxmlformats.org/officeDocument/2006/relationships" xmlns:p="http://schemas.openxmlformats.org/presentationml/2006/main">
-  <p:cSld>
-    <p:spTree>
-      <p:nvGrpSpPr>
-        <p:cNvPr id="1" name=""/>
-        <p:cNvGrpSpPr/>
-        <p:nvPr/>
-      </p:nvGrpSpPr>
-      <p:grpSpPr>
-        <a:xfrm>
-          <a:off x="0" y="0"/>
-          <a:ext cx="0" cy="0"/>
-          <a:chOff x="0" y="0"/>
-          <a:chExt cx="0" cy="0"/>
-        </a:xfrm>
-      </p:grpSpPr>
-      <p:sp>
-        <p:nvSpPr>
-          <p:cNvPr id="2" name="Title 1"/>
-          <p:cNvSpPr>
-            <a:spLocks noGrp="1"/>
-          </p:cNvSpPr>
-          <p:nvPr>
-            <p:ph type="title"/>
-          </p:nvPr>
-        </p:nvSpPr>
-        <p:spPr/>
-        <p:txBody>
-          <a:bodyPr>
-            <a:normAutofit fontScale="90000"/>
-          </a:bodyPr>
-          <a:lstStyle/>
-          <a:p>
-            <a:r>
-              <a:rPr lang="en-CA" dirty="0" smtClean="0"/>
-              <a:t>Introduction to </a:t>
-            </a:r>
-            <a:br>
-              <a:rPr lang="en-CA" dirty="0" smtClean="0"/>
-            </a:br>
-            <a:r>
-              <a:rPr lang="en-CA" dirty="0" smtClean="0"/>
-              <a:t>Model-View-</a:t>
-            </a:r>
-            <a:r>
-              <a:rPr lang="en-CA" dirty="0" err="1" smtClean="0"/>
-              <a:t>ViewModel</a:t>
-            </a:r>
-            <a:endParaRPr lang="en-CA" dirty="0"/>
-          </a:p>
-        </p:txBody>
-      </p:sp>
-      <p:sp>
-        <p:nvSpPr>
-          <p:cNvPr id="3" name="Content Placeholder 2"/>
-          <p:cNvSpPr>
-            <a:spLocks noGrp="1"/>
-          </p:cNvSpPr>
-          <p:nvPr>
-            <p:ph idx="1"/>
-          </p:nvPr>
-        </p:nvSpPr>
-        <p:spPr>
-          <a:xfrm>
-            <a:off x="467544" y="548681"/>
-            <a:ext cx="8183880" cy="2016224"/>
-          </a:xfrm>
-        </p:spPr>
-        <p:txBody>
-          <a:bodyPr>
-            <a:normAutofit/>
-          </a:bodyPr>
-          <a:lstStyle/>
-          <a:p>
-            <a:r>
-              <a:rPr lang="en-CA" sz="1600" dirty="0" err="1" smtClean="0"/>
-              <a:t>ViewModel</a:t>
-            </a:r>
-            <a:r>
-              <a:rPr lang="en-CA" sz="1600" dirty="0" smtClean="0"/>
-              <a:t> knows nothing of the View</a:t>
-            </a:r>
-          </a:p>
-          <a:p>
-            <a:pPr lvl="1"/>
-            <a:r>
-              <a:rPr lang="en-CA" sz="1400" dirty="0" smtClean="0"/>
-              <a:t>View knows which properties it must bind to</a:t>
-            </a:r>
-          </a:p>
-          <a:p>
-            <a:r>
-              <a:rPr lang="en-CA" sz="1600" dirty="0" err="1" smtClean="0"/>
-              <a:t>ViewModel</a:t>
-            </a:r>
-            <a:r>
-              <a:rPr lang="en-CA" sz="1600" dirty="0" smtClean="0"/>
-              <a:t> is bound to the View </a:t>
-            </a:r>
-          </a:p>
-          <a:p>
-            <a:pPr lvl="1"/>
-            <a:r>
-              <a:rPr lang="en-CA" sz="1200" dirty="0" smtClean="0"/>
-              <a:t>Communicates updates to the View via events</a:t>
-            </a:r>
-          </a:p>
-          <a:p>
-            <a:pPr lvl="1"/>
-            <a:endParaRPr lang="en-CA" sz="1200" dirty="0" smtClean="0"/>
-          </a:p>
-          <a:p>
-            <a:r>
-              <a:rPr lang="en-CA" sz="1600" dirty="0" smtClean="0"/>
-              <a:t>Behaviour is executed through commands which interact with the Model</a:t>
-            </a:r>
-            <a:endParaRPr lang="en-CA" sz="1600" dirty="0"/>
-          </a:p>
-        </p:txBody>
-      </p:sp>
-      <p:pic>
-        <p:nvPicPr>
-          <p:cNvPr id="2051" name="Picture 3"/>
-          <p:cNvPicPr>
-            <a:picLocks noChangeAspect="1" noChangeArrowheads="1"/>
-          </p:cNvPicPr>
-          <p:nvPr/>
-        </p:nvPicPr>
-        <p:blipFill>
-          <a:blip r:embed="rId2">
-            <a:extLst>
-              <a:ext uri="{28A0092B-C50C-407E-A947-70E740481C1C}">
-                <a14:useLocalDpi xmlns:a14="http://schemas.microsoft.com/office/drawing/2010/main" val="0"/>
-              </a:ext>
-            </a:extLst>
-          </a:blip>
-          <a:srcRect/>
-          <a:stretch>
-            <a:fillRect/>
-          </a:stretch>
-        </p:blipFill>
-        <p:spPr bwMode="auto">
-          <a:xfrm>
-            <a:off x="5292080" y="2924944"/>
-            <a:ext cx="2105025" cy="1419225"/>
-          </a:xfrm>
-          <a:prstGeom prst="rect">
-            <a:avLst/>
-          </a:prstGeom>
-          <a:noFill/>
-          <a:ln>
-            <a:noFill/>
-          </a:ln>
-          <a:effectLst/>
-          <a:extLst>
-            <a:ext uri="{909E8E84-426E-40DD-AFC4-6F175D3DCCD1}">
-              <a14:hiddenFill xmlns:a14="http://schemas.microsoft.com/office/drawing/2010/main">
-                <a:solidFill>
-                  <a:schemeClr val="accent1"/>
-                </a:solidFill>
-              </a14:hiddenFill>
-            </a:ext>
-            <a:ext uri="{91240B29-F687-4F45-9708-019B960494DF}">
-              <a14:hiddenLine xmlns:a14="http://schemas.microsoft.com/office/drawing/2010/main" w="9525">
-                <a:solidFill>
-                  <a:schemeClr val="tx1"/>
-                </a:solidFill>
-                <a:miter lim="800000"/>
-                <a:headEnd/>
-                <a:tailEnd/>
-              </a14:hiddenLine>
-            </a:ext>
-            <a:ext uri="{AF507438-7753-43E0-B8FC-AC1667EBCBE1}">
-              <a14:hiddenEffects xmlns:a14="http://schemas.microsoft.com/office/drawing/2010/main">
-                <a:effectLst>
-                  <a:outerShdw dist="35921" dir="2700000" algn="ctr" rotWithShape="0">
-                    <a:schemeClr val="bg2"/>
-                  </a:outerShdw>
-                </a:effectLst>
-              </a14:hiddenEffects>
-            </a:ext>
-          </a:extLst>
-        </p:spPr>
-      </p:pic>
-    </p:spTree>
-    <p:extLst>
-      <p:ext uri="{BB962C8B-B14F-4D97-AF65-F5344CB8AC3E}">
-        <p14:creationId xmlns:p14="http://schemas.microsoft.com/office/powerpoint/2010/main" val="90620156"/>
-      </p:ext>
-    </p:extLst>
-  </p:cSld>
-  <p:clrMapOvr>
-    <a:masterClrMapping/>
-  </p:clrMapOvr>
-  <p:timing>
-    <p:tnLst>
-      <p:par>
-        <p:cTn id="1" dur="indefinite" restart="never" nodeType="tmRoot"/>
-      </p:par>
-    </p:tnLst>
-  </p:timing>
-</p:sld>
-</file>
-
 <file path=ppt/slides/slide7.xml><?xml version="1.0" encoding="utf-8"?>
 <p:sld xmlns:a="http://schemas.openxmlformats.org/drawingml/2006/main" xmlns:r="http://schemas.openxmlformats.org/officeDocument/2006/relationships" xmlns:p="http://schemas.openxmlformats.org/presentationml/2006/main">
   <p:cSld>
@@ -5530,60 +6580,95 @@
         </p:nvSpPr>
         <p:spPr/>
         <p:txBody>
-          <a:bodyPr>
-            <a:normAutofit fontScale="90000"/>
-          </a:bodyPr>
-          <a:lstStyle/>
-          <a:p>
-            <a:r>
-              <a:rPr lang="en-CA" dirty="0" smtClean="0"/>
-              <a:t>Difficulties with </a:t>
-            </a:r>
-            <a:br>
-              <a:rPr lang="en-CA" dirty="0" smtClean="0"/>
-            </a:br>
-            <a:r>
-              <a:rPr lang="en-CA" dirty="0" smtClean="0"/>
-              <a:t>Model-View-</a:t>
-            </a:r>
-            <a:r>
-              <a:rPr lang="en-CA" dirty="0" err="1" smtClean="0"/>
+          <a:bodyPr/>
+          <a:lstStyle/>
+          <a:p>
+            <a:r>
+              <a:rPr lang="en-US" dirty="0" smtClean="0"/>
+              <a:t>Binding/</a:t>
+            </a:r>
+            <a:r>
+              <a:rPr lang="en-US" dirty="0" err="1" smtClean="0"/>
+              <a:t>DataContext</a:t>
+            </a:r>
+            <a:endParaRPr lang="en-US" dirty="0"/>
+          </a:p>
+        </p:txBody>
+      </p:sp>
+      <p:sp>
+        <p:nvSpPr>
+          <p:cNvPr id="3" name="Content Placeholder 2"/>
+          <p:cNvSpPr>
+            <a:spLocks noGrp="1"/>
+          </p:cNvSpPr>
+          <p:nvPr>
+            <p:ph idx="1"/>
+          </p:nvPr>
+        </p:nvSpPr>
+        <p:spPr/>
+        <p:txBody>
+          <a:bodyPr/>
+          <a:lstStyle/>
+          <a:p>
+            <a:r>
+              <a:rPr lang="en-US" dirty="0" err="1" smtClean="0"/>
+              <a:t>DataContext</a:t>
+            </a:r>
+            <a:endParaRPr lang="en-US" dirty="0" smtClean="0"/>
+          </a:p>
+          <a:p>
+            <a:pPr lvl="1"/>
+            <a:r>
+              <a:rPr lang="en-US" dirty="0" smtClean="0"/>
+              <a:t>Every control has one</a:t>
+            </a:r>
+          </a:p>
+          <a:p>
+            <a:pPr lvl="1"/>
+            <a:r>
+              <a:rPr lang="en-US" dirty="0" smtClean="0"/>
+              <a:t>It is the </a:t>
+            </a:r>
+            <a:r>
+              <a:rPr lang="en-US" dirty="0" err="1" smtClean="0"/>
               <a:t>ViewModel</a:t>
             </a:r>
-            <a:endParaRPr lang="en-CA" dirty="0"/>
-          </a:p>
-        </p:txBody>
-      </p:sp>
-      <p:sp>
-        <p:nvSpPr>
-          <p:cNvPr id="3" name="Content Placeholder 2"/>
-          <p:cNvSpPr>
-            <a:spLocks noGrp="1"/>
-          </p:cNvSpPr>
-          <p:nvPr>
-            <p:ph idx="1"/>
-          </p:nvPr>
-        </p:nvSpPr>
-        <p:spPr/>
-        <p:txBody>
-          <a:bodyPr/>
-          <a:lstStyle/>
-          <a:p>
-            <a:r>
-              <a:rPr lang="en-CA" dirty="0" smtClean="0"/>
-              <a:t>Some Controls don’t bind well</a:t>
-            </a:r>
-          </a:p>
-          <a:p>
-            <a:r>
-              <a:rPr lang="en-CA" dirty="0" smtClean="0"/>
-              <a:t>Bindings are strings</a:t>
-            </a:r>
-          </a:p>
-          <a:p>
-            <a:r>
-              <a:rPr lang="en-CA" dirty="0" smtClean="0"/>
-              <a:t>XAML Oddities</a:t>
+            <a:r>
+              <a:rPr lang="en-US" dirty="0" smtClean="0"/>
+              <a:t> that is being bound to</a:t>
+            </a:r>
+          </a:p>
+          <a:p>
+            <a:pPr lvl="1"/>
+            <a:endParaRPr lang="en-US" dirty="0"/>
+          </a:p>
+          <a:p>
+            <a:r>
+              <a:rPr lang="en-US" dirty="0" smtClean="0"/>
+              <a:t>Binding</a:t>
+            </a:r>
+          </a:p>
+          <a:p>
+            <a:pPr lvl="1"/>
+            <a:r>
+              <a:rPr lang="en-US" dirty="0" smtClean="0"/>
+              <a:t>Used to bind properties on a control to properties on a </a:t>
+            </a:r>
+            <a:r>
+              <a:rPr lang="en-US" dirty="0" err="1" smtClean="0"/>
+              <a:t>DataContext</a:t>
+            </a:r>
+            <a:r>
+              <a:rPr lang="en-US" dirty="0" smtClean="0"/>
+              <a:t> (</a:t>
+            </a:r>
+            <a:r>
+              <a:rPr lang="en-US" dirty="0" err="1" smtClean="0"/>
+              <a:t>ViewModel</a:t>
+            </a:r>
+            <a:r>
+              <a:rPr lang="en-US" dirty="0" smtClean="0"/>
+              <a:t>)</a:t>
             </a:r>
           </a:p>
         </p:txBody>
@@ -5591,20 +6676,13 @@
     </p:spTree>
     <p:extLst>
       <p:ext uri="{BB962C8B-B14F-4D97-AF65-F5344CB8AC3E}">
-        <p14:creationId xmlns:p14="http://schemas.microsoft.com/office/powerpoint/2010/main" val="2372477167"/>
+        <p14:creationId xmlns:p14="http://schemas.microsoft.com/office/powerpoint/2010/main" val="2403866076"/>
       </p:ext>
     </p:extLst>
   </p:cSld>
   <p:clrMapOvr>
     <a:masterClrMapping/>
   </p:clrMapOvr>
-  <p:timing>
-    <p:tnLst>
-      <p:par>
-        <p:cTn id="1" dur="indefinite" restart="never" nodeType="tmRoot"/>
-      </p:par>
-    </p:tnLst>
-  </p:timing>
 </p:sld>
 </file>
 
@@ -5637,135 +6715,192 @@
         </p:nvSpPr>
         <p:spPr/>
         <p:txBody>
+          <a:bodyPr>
+            <a:normAutofit fontScale="90000"/>
+          </a:bodyPr>
+          <a:lstStyle/>
+          <a:p>
+            <a:r>
+              <a:rPr lang="en-CA" dirty="0"/>
+              <a:t>Communicating Changes to the View</a:t>
+            </a:r>
+            <a:endParaRPr lang="en-US" dirty="0"/>
+          </a:p>
+        </p:txBody>
+      </p:sp>
+      <p:sp>
+        <p:nvSpPr>
+          <p:cNvPr id="3" name="Content Placeholder 2"/>
+          <p:cNvSpPr>
+            <a:spLocks noGrp="1"/>
+          </p:cNvSpPr>
+          <p:nvPr>
+            <p:ph idx="1"/>
+          </p:nvPr>
+        </p:nvSpPr>
+        <p:spPr/>
+        <p:txBody>
           <a:bodyPr/>
           <a:lstStyle/>
           <a:p>
             <a:r>
-              <a:rPr lang="en-CA" dirty="0" smtClean="0"/>
-              <a:t>Contact Us</a:t>
-            </a:r>
-            <a:endParaRPr lang="en-CA" dirty="0"/>
-          </a:p>
-        </p:txBody>
-      </p:sp>
-      <p:sp>
-        <p:nvSpPr>
-          <p:cNvPr id="3" name="Content Placeholder 2"/>
-          <p:cNvSpPr>
-            <a:spLocks noGrp="1"/>
-          </p:cNvSpPr>
-          <p:nvPr>
-            <p:ph idx="1"/>
-          </p:nvPr>
-        </p:nvSpPr>
-        <p:spPr>
-          <a:xfrm>
-            <a:off x="539552" y="2564904"/>
-            <a:ext cx="8183880" cy="2898648"/>
-          </a:xfrm>
-        </p:spPr>
-        <p:txBody>
-          <a:bodyPr/>
-          <a:lstStyle/>
-          <a:p>
-            <a:r>
-              <a:rPr lang="en-CA" dirty="0" smtClean="0"/>
-              <a:t>Jason Lepp </a:t>
-            </a:r>
+              <a:rPr lang="en-US" dirty="0" err="1" smtClean="0"/>
+              <a:t>INotifyPropertyChanged</a:t>
+            </a:r>
+            <a:endParaRPr lang="en-US" dirty="0" smtClean="0"/>
           </a:p>
           <a:p>
             <a:pPr lvl="1"/>
             <a:r>
-              <a:rPr lang="en-CA" dirty="0" smtClean="0">
-                <a:hlinkClick r:id="rId2"/>
-              </a:rPr>
-              <a:t>awesome@arcresources.com</a:t>
-            </a:r>
-            <a:endParaRPr lang="en-CA" dirty="0" smtClean="0"/>
-          </a:p>
-          <a:p>
-            <a:r>
-              <a:rPr lang="en-CA" dirty="0" smtClean="0"/>
-              <a:t>Mo </a:t>
-            </a:r>
-            <a:r>
-              <a:rPr lang="en-CA" dirty="0"/>
-              <a:t>Khan</a:t>
+              <a:rPr lang="en-US" dirty="0" smtClean="0"/>
+              <a:t>Used to tell the view that a specific property has changed.</a:t>
+            </a:r>
+          </a:p>
+          <a:p>
+            <a:r>
+              <a:rPr lang="en-US" dirty="0" err="1" smtClean="0"/>
+              <a:t>INotifyCollectionChanged</a:t>
+            </a:r>
+            <a:r>
+              <a:rPr lang="en-US" dirty="0" smtClean="0"/>
+              <a:t> (</a:t>
+            </a:r>
+            <a:r>
+              <a:rPr lang="en-US" dirty="0" err="1" smtClean="0"/>
+              <a:t>ObservableCollection</a:t>
+            </a:r>
+            <a:r>
+              <a:rPr lang="en-US" dirty="0" smtClean="0"/>
+              <a:t>&lt;T&gt;)</a:t>
             </a:r>
           </a:p>
           <a:p>
             <a:pPr lvl="1"/>
             <a:r>
-              <a:rPr lang="en-CA" dirty="0"/>
-              <a:t> </a:t>
-            </a:r>
-            <a:r>
-              <a:rPr lang="en-CA" dirty="0" smtClean="0"/>
-              <a:t>mocheen@arcresources.com</a:t>
-            </a:r>
-          </a:p>
-          <a:p>
-            <a:r>
-              <a:rPr lang="en-CA" dirty="0" smtClean="0"/>
-              <a:t>Craig Anderson</a:t>
-            </a:r>
-          </a:p>
-          <a:p>
-            <a:pPr lvl="1"/>
-            <a:r>
-              <a:rPr lang="en-CA" dirty="0" smtClean="0"/>
-              <a:t>justKeepingUp@arcresources.com</a:t>
-            </a:r>
-          </a:p>
-        </p:txBody>
-      </p:sp>
-      <p:pic>
-        <p:nvPicPr>
-          <p:cNvPr id="4" name="Picture 3"/>
-          <p:cNvPicPr>
-            <a:picLocks noChangeAspect="1"/>
-          </p:cNvPicPr>
-          <p:nvPr/>
-        </p:nvPicPr>
-        <p:blipFill>
-          <a:blip r:embed="rId3" cstate="print">
-            <a:extLst>
-              <a:ext uri="{28A0092B-C50C-407E-A947-70E740481C1C}">
-                <a14:useLocalDpi xmlns:a14="http://schemas.microsoft.com/office/drawing/2010/main" val="0"/>
-              </a:ext>
-            </a:extLst>
-          </a:blip>
-          <a:stretch>
-            <a:fillRect/>
-          </a:stretch>
-        </p:blipFill>
-        <p:spPr>
-          <a:xfrm>
-            <a:off x="3851920" y="836712"/>
-            <a:ext cx="4608512" cy="1973105"/>
-          </a:xfrm>
-          <a:prstGeom prst="rect">
-            <a:avLst/>
-          </a:prstGeom>
-        </p:spPr>
-      </p:pic>
+              <a:rPr lang="en-US" dirty="0" smtClean="0"/>
+              <a:t>Used to tell the view that the items in the collection have changed.</a:t>
+            </a:r>
+            <a:endParaRPr lang="en-US" dirty="0"/>
+          </a:p>
+        </p:txBody>
+      </p:sp>
     </p:spTree>
     <p:extLst>
       <p:ext uri="{BB962C8B-B14F-4D97-AF65-F5344CB8AC3E}">
-        <p14:creationId xmlns:p14="http://schemas.microsoft.com/office/powerpoint/2010/main" val="3854264388"/>
+        <p14:creationId xmlns:p14="http://schemas.microsoft.com/office/powerpoint/2010/main" val="221136404"/>
       </p:ext>
     </p:extLst>
   </p:cSld>
   <p:clrMapOvr>
     <a:masterClrMapping/>
   </p:clrMapOvr>
-  <p:timing>
-    <p:tnLst>
-      <p:par>
-        <p:cTn id="1" dur="indefinite" restart="never" nodeType="tmRoot"/>
-      </p:par>
-    </p:tnLst>
-  </p:timing>
+</p:sld>
+</file>
+
+<file path=ppt/slides/slide9.xml><?xml version="1.0" encoding="utf-8"?>
+<p:sld xmlns:a="http://schemas.openxmlformats.org/drawingml/2006/main" xmlns:r="http://schemas.openxmlformats.org/officeDocument/2006/relationships" xmlns:p="http://schemas.openxmlformats.org/presentationml/2006/main">
+  <p:cSld>
+    <p:spTree>
+      <p:nvGrpSpPr>
+        <p:cNvPr id="1" name=""/>
+        <p:cNvGrpSpPr/>
+        <p:nvPr/>
+      </p:nvGrpSpPr>
+      <p:grpSpPr>
+        <a:xfrm>
+          <a:off x="0" y="0"/>
+          <a:ext cx="0" cy="0"/>
+          <a:chOff x="0" y="0"/>
+          <a:chExt cx="0" cy="0"/>
+        </a:xfrm>
+      </p:grpSpPr>
+      <p:sp>
+        <p:nvSpPr>
+          <p:cNvPr id="2" name="Title 1"/>
+          <p:cNvSpPr>
+            <a:spLocks noGrp="1"/>
+          </p:cNvSpPr>
+          <p:nvPr>
+            <p:ph type="title"/>
+          </p:nvPr>
+        </p:nvSpPr>
+        <p:spPr/>
+        <p:txBody>
+          <a:bodyPr/>
+          <a:lstStyle/>
+          <a:p>
+            <a:r>
+              <a:rPr lang="en-CA" dirty="0"/>
+              <a:t>User Interaction</a:t>
+            </a:r>
+            <a:endParaRPr lang="en-US" dirty="0"/>
+          </a:p>
+        </p:txBody>
+      </p:sp>
+      <p:sp>
+        <p:nvSpPr>
+          <p:cNvPr id="3" name="Content Placeholder 2"/>
+          <p:cNvSpPr>
+            <a:spLocks noGrp="1"/>
+          </p:cNvSpPr>
+          <p:nvPr>
+            <p:ph idx="1"/>
+          </p:nvPr>
+        </p:nvSpPr>
+        <p:spPr/>
+        <p:txBody>
+          <a:bodyPr/>
+          <a:lstStyle/>
+          <a:p>
+            <a:r>
+              <a:rPr lang="en-US" dirty="0" err="1" smtClean="0"/>
+              <a:t>ICommand</a:t>
+            </a:r>
+            <a:r>
+              <a:rPr lang="en-US" dirty="0" smtClean="0"/>
+              <a:t> – Consists of two things:</a:t>
+            </a:r>
+          </a:p>
+          <a:p>
+            <a:pPr lvl="1"/>
+            <a:r>
+              <a:rPr lang="en-US" dirty="0" smtClean="0"/>
+              <a:t>The action to perform</a:t>
+            </a:r>
+          </a:p>
+          <a:p>
+            <a:pPr lvl="1"/>
+            <a:r>
+              <a:rPr lang="en-US" dirty="0" smtClean="0"/>
+              <a:t>A specification for when that action can be performed</a:t>
+            </a:r>
+          </a:p>
+          <a:p>
+            <a:r>
+              <a:rPr lang="en-US" dirty="0" err="1" smtClean="0"/>
+              <a:t>IDataErrorInfo</a:t>
+            </a:r>
+            <a:endParaRPr lang="en-US" dirty="0" smtClean="0"/>
+          </a:p>
+          <a:p>
+            <a:pPr lvl="1"/>
+            <a:r>
+              <a:rPr lang="en-US" dirty="0" smtClean="0"/>
+              <a:t>Used to provide validation notifications to the View</a:t>
+            </a:r>
+          </a:p>
+        </p:txBody>
+      </p:sp>
+    </p:spTree>
+    <p:extLst>
+      <p:ext uri="{BB962C8B-B14F-4D97-AF65-F5344CB8AC3E}">
+        <p14:creationId xmlns:p14="http://schemas.microsoft.com/office/powerpoint/2010/main" val="444865502"/>
+      </p:ext>
+    </p:extLst>
+  </p:cSld>
+  <p:clrMapOvr>
+    <a:masterClrMapping/>
+  </p:clrMapOvr>
 </p:sld>
 </file>
 

</xml_diff>

<commit_message>
updated the email addresses. added a slide for the summary. added a slide for questions.
</commit_message>
<xml_diff>
--- a/docs/MVP to MVVM.pptx
+++ b/docs/MVP to MVVM.pptx
@@ -5,7 +5,7 @@
     <p:sldMasterId id="2147483720" r:id="rId1"/>
   </p:sldMasterIdLst>
   <p:notesMasterIdLst>
-    <p:notesMasterId r:id="rId13"/>
+    <p:notesMasterId r:id="rId15"/>
   </p:notesMasterIdLst>
   <p:sldIdLst>
     <p:sldId id="256" r:id="rId2"/>
@@ -18,7 +18,9 @@
     <p:sldId id="265" r:id="rId9"/>
     <p:sldId id="266" r:id="rId10"/>
     <p:sldId id="259" r:id="rId11"/>
-    <p:sldId id="262" r:id="rId12"/>
+    <p:sldId id="268" r:id="rId12"/>
+    <p:sldId id="267" r:id="rId13"/>
+    <p:sldId id="262" r:id="rId14"/>
   </p:sldIdLst>
   <p:sldSz cx="9144000" cy="6858000" type="screen4x3"/>
   <p:notesSz cx="6858000" cy="9144000"/>
@@ -202,7 +204,7 @@
           <a:p>
             <a:fld id="{8D08F68D-1A06-4ECF-90B8-C93D7E69BD8D}" type="datetimeFigureOut">
               <a:rPr lang="en-US" smtClean="0"/>
-              <a:t>10/18/2010</a:t>
+              <a:t>10/19/2010</a:t>
             </a:fld>
             <a:endParaRPr lang="en-US"/>
           </a:p>
@@ -1868,7 +1870,7 @@
           <a:p>
             <a:fld id="{A9FF1B46-0630-42FE-A1C3-6B8EE9112517}" type="datetimeFigureOut">
               <a:rPr lang="en-CA" smtClean="0"/>
-              <a:t>18/10/2010</a:t>
+              <a:t>19/10/2010</a:t>
             </a:fld>
             <a:endParaRPr lang="en-CA"/>
           </a:p>
@@ -2081,7 +2083,7 @@
           <a:p>
             <a:fld id="{A9FF1B46-0630-42FE-A1C3-6B8EE9112517}" type="datetimeFigureOut">
               <a:rPr lang="en-CA" smtClean="0"/>
-              <a:t>18/10/2010</a:t>
+              <a:t>19/10/2010</a:t>
             </a:fld>
             <a:endParaRPr lang="en-CA"/>
           </a:p>
@@ -2256,7 +2258,7 @@
           <a:p>
             <a:fld id="{A9FF1B46-0630-42FE-A1C3-6B8EE9112517}" type="datetimeFigureOut">
               <a:rPr lang="en-CA" smtClean="0"/>
-              <a:t>18/10/2010</a:t>
+              <a:t>19/10/2010</a:t>
             </a:fld>
             <a:endParaRPr lang="en-CA"/>
           </a:p>
@@ -2421,7 +2423,7 @@
           <a:p>
             <a:fld id="{A9FF1B46-0630-42FE-A1C3-6B8EE9112517}" type="datetimeFigureOut">
               <a:rPr lang="en-CA" smtClean="0"/>
-              <a:t>18/10/2010</a:t>
+              <a:t>19/10/2010</a:t>
             </a:fld>
             <a:endParaRPr lang="en-CA"/>
           </a:p>
@@ -2705,7 +2707,7 @@
           <a:p>
             <a:fld id="{A9FF1B46-0630-42FE-A1C3-6B8EE9112517}" type="datetimeFigureOut">
               <a:rPr lang="en-CA" smtClean="0"/>
-              <a:t>18/10/2010</a:t>
+              <a:t>19/10/2010</a:t>
             </a:fld>
             <a:endParaRPr lang="en-CA"/>
           </a:p>
@@ -3031,7 +3033,7 @@
           <a:p>
             <a:fld id="{A9FF1B46-0630-42FE-A1C3-6B8EE9112517}" type="datetimeFigureOut">
               <a:rPr lang="en-CA" smtClean="0"/>
-              <a:t>18/10/2010</a:t>
+              <a:t>19/10/2010</a:t>
             </a:fld>
             <a:endParaRPr lang="en-CA"/>
           </a:p>
@@ -3456,7 +3458,7 @@
           <a:p>
             <a:fld id="{A9FF1B46-0630-42FE-A1C3-6B8EE9112517}" type="datetimeFigureOut">
               <a:rPr lang="en-CA" smtClean="0"/>
-              <a:t>18/10/2010</a:t>
+              <a:t>19/10/2010</a:t>
             </a:fld>
             <a:endParaRPr lang="en-CA"/>
           </a:p>
@@ -3629,7 +3631,7 @@
           <a:p>
             <a:fld id="{A9FF1B46-0630-42FE-A1C3-6B8EE9112517}" type="datetimeFigureOut">
               <a:rPr lang="en-CA" smtClean="0"/>
-              <a:t>18/10/2010</a:t>
+              <a:t>19/10/2010</a:t>
             </a:fld>
             <a:endParaRPr lang="en-CA"/>
           </a:p>
@@ -3719,7 +3721,7 @@
           <a:p>
             <a:fld id="{A9FF1B46-0630-42FE-A1C3-6B8EE9112517}" type="datetimeFigureOut">
               <a:rPr lang="en-CA" smtClean="0"/>
-              <a:t>18/10/2010</a:t>
+              <a:t>19/10/2010</a:t>
             </a:fld>
             <a:endParaRPr lang="en-CA"/>
           </a:p>
@@ -3999,7 +4001,7 @@
           <a:p>
             <a:fld id="{A9FF1B46-0630-42FE-A1C3-6B8EE9112517}" type="datetimeFigureOut">
               <a:rPr lang="en-CA" smtClean="0"/>
-              <a:t>18/10/2010</a:t>
+              <a:t>19/10/2010</a:t>
             </a:fld>
             <a:endParaRPr lang="en-CA"/>
           </a:p>
@@ -4298,7 +4300,7 @@
           <a:p>
             <a:fld id="{A9FF1B46-0630-42FE-A1C3-6B8EE9112517}" type="datetimeFigureOut">
               <a:rPr lang="en-CA" smtClean="0"/>
-              <a:t>18/10/2010</a:t>
+              <a:t>19/10/2010</a:t>
             </a:fld>
             <a:endParaRPr lang="en-CA"/>
           </a:p>
@@ -4508,7 +4510,7 @@
           <a:p>
             <a:fld id="{A9FF1B46-0630-42FE-A1C3-6B8EE9112517}" type="datetimeFigureOut">
               <a:rPr lang="en-CA" smtClean="0"/>
-              <a:t>18/10/2010</a:t>
+              <a:t>19/10/2010</a:t>
             </a:fld>
             <a:endParaRPr lang="en-CA"/>
           </a:p>
@@ -5120,7 +5122,7 @@
         <p:spPr>
           <a:xfrm>
             <a:off x="5292080" y="5373216"/>
-            <a:ext cx="3456384" cy="1077218"/>
+            <a:ext cx="3456384" cy="830997"/>
           </a:xfrm>
           <a:prstGeom prst="rect">
             <a:avLst/>
@@ -5132,18 +5134,6 @@
             <a:spAutoFit/>
           </a:bodyPr>
           <a:lstStyle/>
-          <a:p>
-            <a:r>
-              <a:rPr lang="en-CA" sz="1600" dirty="0" smtClean="0">
-                <a:solidFill>
-                  <a:schemeClr val="bg1">
-                    <a:lumMod val="50000"/>
-                  </a:schemeClr>
-                </a:solidFill>
-              </a:rPr>
-              <a:t>Presented by:</a:t>
-            </a:r>
-          </a:p>
           <a:p>
             <a:r>
               <a:rPr lang="en-CA" sz="1600" dirty="0" smtClean="0">
@@ -5177,7 +5167,17 @@
                   </a:schemeClr>
                 </a:solidFill>
               </a:rPr>
-              <a:t>	Craig Anderson</a:t>
+              <a:t>	Craig </a:t>
+            </a:r>
+            <a:r>
+              <a:rPr lang="en-CA" sz="1600" dirty="0" smtClean="0">
+                <a:solidFill>
+                  <a:schemeClr val="bg1">
+                    <a:lumMod val="50000"/>
+                  </a:schemeClr>
+                </a:solidFill>
+              </a:rPr>
+              <a:t>Anderson</a:t>
             </a:r>
             <a:endParaRPr lang="en-CA" sz="1600" dirty="0">
               <a:solidFill>
@@ -5290,11 +5290,7 @@
           <a:p>
             <a:r>
               <a:rPr lang="en-CA" dirty="0" smtClean="0"/>
-              <a:t>Some controls </a:t>
-            </a:r>
-            <a:r>
-              <a:rPr lang="en-CA" dirty="0" smtClean="0"/>
-              <a:t>don’t bind well</a:t>
+              <a:t>Some controls don’t bind well</a:t>
             </a:r>
           </a:p>
           <a:p>
@@ -5304,11 +5300,7 @@
             </a:r>
             <a:r>
               <a:rPr lang="en-CA" dirty="0" smtClean="0"/>
-              <a:t> events are published as</a:t>
-            </a:r>
-            <a:r>
-              <a:rPr lang="en-CA" dirty="0" smtClean="0"/>
-              <a:t> strings</a:t>
+              <a:t> events are published as strings</a:t>
             </a:r>
           </a:p>
           <a:p>
@@ -5317,16 +5309,11 @@
               <a:rPr lang="en-CA" dirty="0" smtClean="0"/>
               <a:t>Synchronizer&lt;T&gt;</a:t>
             </a:r>
-            <a:endParaRPr lang="en-CA" dirty="0" smtClean="0"/>
           </a:p>
           <a:p>
             <a:r>
               <a:rPr lang="en-CA" dirty="0" smtClean="0"/>
-              <a:t>XAML </a:t>
-            </a:r>
-            <a:r>
-              <a:rPr lang="en-CA" dirty="0" smtClean="0"/>
-              <a:t>Oddities</a:t>
+              <a:t>XAML Oddities</a:t>
             </a:r>
           </a:p>
         </p:txBody>
@@ -5384,6 +5371,150 @@
           <a:lstStyle/>
           <a:p>
             <a:r>
+              <a:rPr lang="en-US" dirty="0" smtClean="0"/>
+              <a:t>Summary</a:t>
+            </a:r>
+            <a:endParaRPr lang="en-US" dirty="0"/>
+          </a:p>
+        </p:txBody>
+      </p:sp>
+      <p:sp>
+        <p:nvSpPr>
+          <p:cNvPr id="3" name="Content Placeholder 2"/>
+          <p:cNvSpPr>
+            <a:spLocks noGrp="1"/>
+          </p:cNvSpPr>
+          <p:nvPr>
+            <p:ph idx="1"/>
+          </p:nvPr>
+        </p:nvSpPr>
+        <p:spPr/>
+        <p:txBody>
+          <a:bodyPr/>
+          <a:lstStyle/>
+          <a:p>
+            <a:endParaRPr lang="en-US"/>
+          </a:p>
+        </p:txBody>
+      </p:sp>
+    </p:spTree>
+    <p:extLst>
+      <p:ext uri="{BB962C8B-B14F-4D97-AF65-F5344CB8AC3E}">
+        <p14:creationId xmlns:p14="http://schemas.microsoft.com/office/powerpoint/2010/main" val="1512480988"/>
+      </p:ext>
+    </p:extLst>
+  </p:cSld>
+  <p:clrMapOvr>
+    <a:masterClrMapping/>
+  </p:clrMapOvr>
+</p:sld>
+</file>
+
+<file path=ppt/slides/slide12.xml><?xml version="1.0" encoding="utf-8"?>
+<p:sld xmlns:a="http://schemas.openxmlformats.org/drawingml/2006/main" xmlns:r="http://schemas.openxmlformats.org/officeDocument/2006/relationships" xmlns:p="http://schemas.openxmlformats.org/presentationml/2006/main">
+  <p:cSld>
+    <p:spTree>
+      <p:nvGrpSpPr>
+        <p:cNvPr id="1" name=""/>
+        <p:cNvGrpSpPr/>
+        <p:nvPr/>
+      </p:nvGrpSpPr>
+      <p:grpSpPr>
+        <a:xfrm>
+          <a:off x="0" y="0"/>
+          <a:ext cx="0" cy="0"/>
+          <a:chOff x="0" y="0"/>
+          <a:chExt cx="0" cy="0"/>
+        </a:xfrm>
+      </p:grpSpPr>
+      <p:sp>
+        <p:nvSpPr>
+          <p:cNvPr id="2" name="Title 1"/>
+          <p:cNvSpPr>
+            <a:spLocks noGrp="1"/>
+          </p:cNvSpPr>
+          <p:nvPr>
+            <p:ph type="title"/>
+          </p:nvPr>
+        </p:nvSpPr>
+        <p:spPr/>
+        <p:txBody>
+          <a:bodyPr/>
+          <a:lstStyle/>
+          <a:p>
+            <a:r>
+              <a:rPr lang="en-US" dirty="0" smtClean="0"/>
+              <a:t>Questions?</a:t>
+            </a:r>
+            <a:endParaRPr lang="en-US" dirty="0"/>
+          </a:p>
+        </p:txBody>
+      </p:sp>
+      <p:sp>
+        <p:nvSpPr>
+          <p:cNvPr id="3" name="Content Placeholder 2"/>
+          <p:cNvSpPr>
+            <a:spLocks noGrp="1"/>
+          </p:cNvSpPr>
+          <p:nvPr>
+            <p:ph idx="1"/>
+          </p:nvPr>
+        </p:nvSpPr>
+        <p:spPr/>
+        <p:txBody>
+          <a:bodyPr/>
+          <a:lstStyle/>
+          <a:p>
+            <a:endParaRPr lang="en-US"/>
+          </a:p>
+        </p:txBody>
+      </p:sp>
+    </p:spTree>
+    <p:extLst>
+      <p:ext uri="{BB962C8B-B14F-4D97-AF65-F5344CB8AC3E}">
+        <p14:creationId xmlns:p14="http://schemas.microsoft.com/office/powerpoint/2010/main" val="754734916"/>
+      </p:ext>
+    </p:extLst>
+  </p:cSld>
+  <p:clrMapOvr>
+    <a:masterClrMapping/>
+  </p:clrMapOvr>
+</p:sld>
+</file>
+
+<file path=ppt/slides/slide13.xml><?xml version="1.0" encoding="utf-8"?>
+<p:sld xmlns:a="http://schemas.openxmlformats.org/drawingml/2006/main" xmlns:r="http://schemas.openxmlformats.org/officeDocument/2006/relationships" xmlns:p="http://schemas.openxmlformats.org/presentationml/2006/main">
+  <p:cSld>
+    <p:spTree>
+      <p:nvGrpSpPr>
+        <p:cNvPr id="1" name=""/>
+        <p:cNvGrpSpPr/>
+        <p:nvPr/>
+      </p:nvGrpSpPr>
+      <p:grpSpPr>
+        <a:xfrm>
+          <a:off x="0" y="0"/>
+          <a:ext cx="0" cy="0"/>
+          <a:chOff x="0" y="0"/>
+          <a:chExt cx="0" cy="0"/>
+        </a:xfrm>
+      </p:grpSpPr>
+      <p:sp>
+        <p:nvSpPr>
+          <p:cNvPr id="2" name="Title 1"/>
+          <p:cNvSpPr>
+            <a:spLocks noGrp="1"/>
+          </p:cNvSpPr>
+          <p:nvPr>
+            <p:ph type="title"/>
+          </p:nvPr>
+        </p:nvSpPr>
+        <p:spPr/>
+        <p:txBody>
+          <a:bodyPr/>
+          <a:lstStyle/>
+          <a:p>
+            <a:r>
               <a:rPr lang="en-CA" dirty="0" smtClean="0"/>
               <a:t>Contact Us</a:t>
             </a:r>
@@ -5419,10 +5550,8 @@
           <a:p>
             <a:pPr lvl="1"/>
             <a:r>
-              <a:rPr lang="en-CA" dirty="0" smtClean="0">
-                <a:hlinkClick r:id="rId2"/>
-              </a:rPr>
-              <a:t>awesome@arcresources.com</a:t>
+              <a:rPr lang="en-CA" dirty="0" smtClean="0"/>
+              <a:t>jlepp@arcresources.com</a:t>
             </a:r>
             <a:endParaRPr lang="en-CA" dirty="0" smtClean="0"/>
           </a:p>
@@ -5439,13 +5568,10 @@
           <a:p>
             <a:pPr lvl="1"/>
             <a:r>
-              <a:rPr lang="en-CA" dirty="0"/>
-              <a:t> </a:t>
-            </a:r>
-            <a:r>
               <a:rPr lang="en-CA" dirty="0" smtClean="0"/>
-              <a:t>mocheen@arcresources.com</a:t>
-            </a:r>
+              <a:t>mkhan@arcresources.com</a:t>
+            </a:r>
+            <a:endParaRPr lang="en-CA" dirty="0" smtClean="0"/>
           </a:p>
           <a:p>
             <a:r>
@@ -5457,8 +5583,9 @@
             <a:pPr lvl="1"/>
             <a:r>
               <a:rPr lang="en-CA" dirty="0" smtClean="0"/>
-              <a:t>justKeepingUp@arcresources.com</a:t>
-            </a:r>
+              <a:t>canderson@arcresources.com</a:t>
+            </a:r>
+            <a:endParaRPr lang="en-CA" dirty="0" smtClean="0"/>
           </a:p>
         </p:txBody>
       </p:sp>
@@ -5471,7 +5598,7 @@
           <p:nvPr/>
         </p:nvPicPr>
         <p:blipFill>
-          <a:blip r:embed="rId3" cstate="print">
+          <a:blip r:embed="rId2" cstate="print">
             <a:extLst>
               <a:ext uri="{28A0092B-C50C-407E-A947-70E740481C1C}">
                 <a14:useLocalDpi xmlns:a14="http://schemas.microsoft.com/office/drawing/2010/main" val="0"/>
@@ -5565,7 +5692,7 @@
         <p:spPr/>
         <p:txBody>
           <a:bodyPr>
-            <a:normAutofit fontScale="92500" lnSpcReduction="10000"/>
+            <a:normAutofit fontScale="92500" lnSpcReduction="20000"/>
           </a:bodyPr>
           <a:lstStyle/>
           <a:p>
@@ -5583,7 +5710,6 @@
               <a:rPr lang="en-CA" dirty="0" smtClean="0"/>
               <a:t>Sample App</a:t>
             </a:r>
-            <a:endParaRPr lang="en-CA" dirty="0" smtClean="0"/>
           </a:p>
           <a:p>
             <a:r>
@@ -5619,21 +5745,8 @@
             <a:pPr lvl="1"/>
             <a:r>
               <a:rPr lang="en-CA" dirty="0" smtClean="0"/>
-              <a:t>Communicating </a:t>
-            </a:r>
-            <a:r>
-              <a:rPr lang="en-CA" dirty="0" smtClean="0"/>
-              <a:t>Changes </a:t>
-            </a:r>
-            <a:r>
-              <a:rPr lang="en-CA" dirty="0" smtClean="0"/>
-              <a:t>to the </a:t>
-            </a:r>
-            <a:r>
-              <a:rPr lang="en-CA" dirty="0" smtClean="0"/>
-              <a:t>View</a:t>
-            </a:r>
-            <a:endParaRPr lang="en-CA" dirty="0" smtClean="0"/>
+              <a:t>Communicating Changes to the View</a:t>
+            </a:r>
           </a:p>
           <a:p>
             <a:pPr lvl="1"/>
@@ -5673,6 +5786,13 @@
               <a:rPr lang="en-CA" dirty="0" smtClean="0"/>
               <a:t>Summary</a:t>
             </a:r>
+          </a:p>
+          <a:p>
+            <a:r>
+              <a:rPr lang="en-CA" dirty="0" smtClean="0"/>
+              <a:t>Questions</a:t>
+            </a:r>
+            <a:endParaRPr lang="en-CA" dirty="0" smtClean="0"/>
           </a:p>
           <a:p>
             <a:endParaRPr lang="en-CA" dirty="0" smtClean="0"/>
@@ -6005,6 +6125,13 @@
   <p:clrMapOvr>
     <a:masterClrMapping/>
   </p:clrMapOvr>
+  <p:timing>
+    <p:tnLst>
+      <p:par>
+        <p:cTn id="1" dur="indefinite" restart="never" nodeType="tmRoot"/>
+      </p:par>
+    </p:tnLst>
+  </p:timing>
 </p:sld>
 </file>
 
@@ -6095,15 +6222,7 @@
             </a:r>
             <a:r>
               <a:rPr lang="en-CA" dirty="0" smtClean="0"/>
-              <a:t> </a:t>
-            </a:r>
-            <a:r>
-              <a:rPr lang="en-CA" dirty="0" smtClean="0"/>
-              <a:t>knows nothing of the </a:t>
-            </a:r>
-            <a:r>
-              <a:rPr lang="en-CA" dirty="0" smtClean="0"/>
-              <a:t>View</a:t>
+              <a:t> knows nothing of the View</a:t>
             </a:r>
           </a:p>
           <a:p>
@@ -6113,19 +6232,7 @@
             </a:r>
             <a:r>
               <a:rPr lang="en-CA" dirty="0" smtClean="0"/>
-              <a:t> </a:t>
-            </a:r>
-            <a:r>
-              <a:rPr lang="en-CA" dirty="0" smtClean="0"/>
-              <a:t>is </a:t>
-            </a:r>
-            <a:r>
-              <a:rPr lang="en-CA" dirty="0" smtClean="0"/>
-              <a:t>attached </a:t>
-            </a:r>
-            <a:r>
-              <a:rPr lang="en-CA" dirty="0" smtClean="0"/>
-              <a:t>to the View </a:t>
+              <a:t> is attached to the View </a:t>
             </a:r>
           </a:p>
           <a:p>
@@ -6267,10 +6374,6 @@
               <a:rPr lang="en-CA" dirty="0" smtClean="0"/>
               <a:t>se </a:t>
             </a:r>
-            <a:r>
-              <a:rPr lang="en-CA" dirty="0" smtClean="0"/>
-              <a:t/>
-            </a:r>
             <a:br>
               <a:rPr lang="en-CA" dirty="0" smtClean="0"/>
             </a:br>
@@ -6321,7 +6424,6 @@
               <a:rPr lang="en-CA" dirty="0" smtClean="0"/>
               <a:t>WPF features</a:t>
             </a:r>
-            <a:endParaRPr lang="en-CA" dirty="0" smtClean="0"/>
           </a:p>
           <a:p>
             <a:pPr marL="834390" lvl="1" indent="-514350">
@@ -6330,11 +6432,7 @@
             </a:pPr>
             <a:r>
               <a:rPr lang="en-CA" dirty="0" smtClean="0"/>
-              <a:t>Less </a:t>
-            </a:r>
-            <a:r>
-              <a:rPr lang="en-CA" dirty="0" smtClean="0"/>
-              <a:t>Code</a:t>
+              <a:t>Less Code</a:t>
             </a:r>
           </a:p>
           <a:p>
@@ -6346,7 +6444,6 @@
               <a:rPr lang="en-CA" dirty="0" smtClean="0"/>
               <a:t>Looser Coupling</a:t>
             </a:r>
-            <a:endParaRPr lang="en-CA" dirty="0" smtClean="0"/>
           </a:p>
           <a:p>
             <a:pPr marL="514350" indent="-514350">
@@ -6355,15 +6452,7 @@
             </a:pPr>
             <a:r>
               <a:rPr lang="en-CA" dirty="0" smtClean="0"/>
-              <a:t>Focus </a:t>
-            </a:r>
-            <a:r>
-              <a:rPr lang="en-CA" dirty="0" smtClean="0"/>
-              <a:t>on design without </a:t>
-            </a:r>
-            <a:r>
-              <a:rPr lang="en-CA" dirty="0" smtClean="0"/>
-              <a:t>affecting behaviour</a:t>
+              <a:t>Focus on design without affecting behaviour</a:t>
             </a:r>
           </a:p>
           <a:p>

</xml_diff>

<commit_message>
updated the slide deck after first demo of the presentation.
</commit_message>
<xml_diff>
--- a/docs/MVP to MVVM.pptx
+++ b/docs/MVP to MVVM.pptx
@@ -5,7 +5,7 @@
     <p:sldMasterId id="2147483720" r:id="rId1"/>
   </p:sldMasterIdLst>
   <p:notesMasterIdLst>
-    <p:notesMasterId r:id="rId15"/>
+    <p:notesMasterId r:id="rId16"/>
   </p:notesMasterIdLst>
   <p:sldIdLst>
     <p:sldId id="256" r:id="rId2"/>
@@ -15,12 +15,13 @@
     <p:sldId id="261" r:id="rId6"/>
     <p:sldId id="258" r:id="rId7"/>
     <p:sldId id="264" r:id="rId8"/>
-    <p:sldId id="265" r:id="rId9"/>
-    <p:sldId id="266" r:id="rId10"/>
-    <p:sldId id="259" r:id="rId11"/>
-    <p:sldId id="268" r:id="rId12"/>
-    <p:sldId id="267" r:id="rId13"/>
-    <p:sldId id="262" r:id="rId14"/>
+    <p:sldId id="270" r:id="rId9"/>
+    <p:sldId id="265" r:id="rId10"/>
+    <p:sldId id="266" r:id="rId11"/>
+    <p:sldId id="269" r:id="rId12"/>
+    <p:sldId id="268" r:id="rId13"/>
+    <p:sldId id="267" r:id="rId14"/>
+    <p:sldId id="262" r:id="rId15"/>
   </p:sldIdLst>
   <p:sldSz cx="9144000" cy="6858000" type="screen4x3"/>
   <p:notesSz cx="6858000" cy="9144000"/>
@@ -518,95 +519,11 @@
           <a:p>
             <a:r>
               <a:rPr lang="en-US" dirty="0" smtClean="0"/>
-              <a:t>Communicating Changes</a:t>
-            </a:r>
-          </a:p>
-          <a:p>
-            <a:pPr marL="171450" indent="-171450">
-              <a:buFontTx/>
-              <a:buChar char="-"/>
-            </a:pPr>
-            <a:r>
-              <a:rPr lang="en-US" dirty="0" err="1" smtClean="0"/>
-              <a:t>INotifyPropertyChanged</a:t>
-            </a:r>
-            <a:endParaRPr lang="en-US" dirty="0" smtClean="0"/>
-          </a:p>
-          <a:p>
-            <a:pPr marL="171450" indent="-171450">
-              <a:buFontTx/>
-              <a:buChar char="-"/>
-            </a:pPr>
-            <a:r>
-              <a:rPr lang="en-US" dirty="0" err="1" smtClean="0"/>
-              <a:t>INotifyCollectionChanged</a:t>
-            </a:r>
-            <a:r>
-              <a:rPr lang="en-US" dirty="0" smtClean="0"/>
-              <a:t> (</a:t>
-            </a:r>
-            <a:r>
-              <a:rPr lang="en-US" dirty="0" err="1" smtClean="0"/>
-              <a:t>ObservableCollection</a:t>
-            </a:r>
-            <a:r>
-              <a:rPr lang="en-US" dirty="0" smtClean="0"/>
-              <a:t>&lt;T&gt;)</a:t>
-            </a:r>
-          </a:p>
-          <a:p>
-            <a:pPr marL="0" indent="0">
-              <a:buFontTx/>
-              <a:buNone/>
-            </a:pPr>
-            <a:endParaRPr lang="en-US" dirty="0" smtClean="0"/>
-          </a:p>
-          <a:p>
-            <a:pPr marL="0" indent="0">
-              <a:buFontTx/>
-              <a:buNone/>
-            </a:pPr>
-            <a:r>
-              <a:rPr lang="en-US" dirty="0" smtClean="0"/>
-              <a:t>User</a:t>
-            </a:r>
-            <a:r>
-              <a:rPr lang="en-US" baseline="0" dirty="0" smtClean="0"/>
-              <a:t> Interaction</a:t>
-            </a:r>
-          </a:p>
-          <a:p>
-            <a:pPr marL="171450" indent="-171450">
-              <a:buFontTx/>
-              <a:buChar char="-"/>
-            </a:pPr>
-            <a:r>
-              <a:rPr lang="en-US" baseline="0" dirty="0" err="1" smtClean="0"/>
-              <a:t>ICommand</a:t>
-            </a:r>
-            <a:endParaRPr lang="en-US" baseline="0" dirty="0" smtClean="0"/>
-          </a:p>
-          <a:p>
-            <a:pPr marL="171450" indent="-171450">
-              <a:buFontTx/>
-              <a:buChar char="-"/>
-            </a:pPr>
-            <a:r>
-              <a:rPr lang="en-US" baseline="0" dirty="0" err="1" smtClean="0"/>
-              <a:t>IDataErrorInfo</a:t>
-            </a:r>
-            <a:endParaRPr lang="en-US" baseline="0" dirty="0" smtClean="0"/>
-          </a:p>
-          <a:p>
-            <a:pPr marL="171450" indent="-171450">
-              <a:buFontTx/>
-              <a:buChar char="-"/>
-            </a:pPr>
-            <a:r>
-              <a:rPr lang="en-US" baseline="0" dirty="0" err="1" smtClean="0"/>
-              <a:t>IValueConverter</a:t>
-            </a:r>
-            <a:endParaRPr lang="en-US" baseline="0" dirty="0" smtClean="0"/>
+              <a:t>Jason</a:t>
+            </a:r>
+          </a:p>
+          <a:p>
+            <a:endParaRPr lang="en-US" dirty="0"/>
           </a:p>
         </p:txBody>
       </p:sp>
@@ -627,7 +544,7 @@
           <a:p>
             <a:fld id="{CA820E9B-1621-4B8C-AC33-C5AB23D4FDC8}" type="slidenum">
               <a:rPr lang="en-US" smtClean="0"/>
-              <a:t>2</a:t>
+              <a:t>1</a:t>
             </a:fld>
             <a:endParaRPr lang="en-US"/>
           </a:p>
@@ -636,7 +553,405 @@
     </p:spTree>
     <p:extLst>
       <p:ext uri="{BB962C8B-B14F-4D97-AF65-F5344CB8AC3E}">
-        <p14:creationId xmlns:p14="http://schemas.microsoft.com/office/powerpoint/2010/main" val="1332039370"/>
+        <p14:creationId xmlns:p14="http://schemas.microsoft.com/office/powerpoint/2010/main" val="3462671091"/>
+      </p:ext>
+    </p:extLst>
+  </p:cSld>
+  <p:clrMapOvr>
+    <a:masterClrMapping/>
+  </p:clrMapOvr>
+</p:notes>
+</file>
+
+<file path=ppt/notesSlides/notesSlide10.xml><?xml version="1.0" encoding="utf-8"?>
+<p:notes xmlns:a="http://schemas.openxmlformats.org/drawingml/2006/main" xmlns:r="http://schemas.openxmlformats.org/officeDocument/2006/relationships" xmlns:p="http://schemas.openxmlformats.org/presentationml/2006/main">
+  <p:cSld>
+    <p:spTree>
+      <p:nvGrpSpPr>
+        <p:cNvPr id="1" name=""/>
+        <p:cNvGrpSpPr/>
+        <p:nvPr/>
+      </p:nvGrpSpPr>
+      <p:grpSpPr>
+        <a:xfrm>
+          <a:off x="0" y="0"/>
+          <a:ext cx="0" cy="0"/>
+          <a:chOff x="0" y="0"/>
+          <a:chExt cx="0" cy="0"/>
+        </a:xfrm>
+      </p:grpSpPr>
+      <p:sp>
+        <p:nvSpPr>
+          <p:cNvPr id="2" name="Slide Image Placeholder 1"/>
+          <p:cNvSpPr>
+            <a:spLocks noGrp="1" noRot="1" noChangeAspect="1"/>
+          </p:cNvSpPr>
+          <p:nvPr>
+            <p:ph type="sldImg"/>
+          </p:nvPr>
+        </p:nvSpPr>
+        <p:spPr/>
+      </p:sp>
+      <p:sp>
+        <p:nvSpPr>
+          <p:cNvPr id="3" name="Notes Placeholder 2"/>
+          <p:cNvSpPr>
+            <a:spLocks noGrp="1"/>
+          </p:cNvSpPr>
+          <p:nvPr>
+            <p:ph type="body" idx="1"/>
+          </p:nvPr>
+        </p:nvSpPr>
+        <p:spPr/>
+        <p:txBody>
+          <a:bodyPr/>
+          <a:lstStyle/>
+          <a:p>
+            <a:r>
+              <a:rPr lang="en-US" dirty="0" smtClean="0"/>
+              <a:t>Craig</a:t>
+            </a:r>
+          </a:p>
+          <a:p>
+            <a:endParaRPr lang="en-US" dirty="0" smtClean="0"/>
+          </a:p>
+          <a:p>
+            <a:r>
+              <a:rPr lang="en-US" dirty="0" smtClean="0"/>
+              <a:t>Go</a:t>
+            </a:r>
+            <a:r>
+              <a:rPr lang="en-US" baseline="0" dirty="0" smtClean="0"/>
+              <a:t> over the </a:t>
+            </a:r>
+            <a:r>
+              <a:rPr lang="en-US" baseline="0" dirty="0" err="1" smtClean="0"/>
+              <a:t>SaveCommand</a:t>
+            </a:r>
+            <a:r>
+              <a:rPr lang="en-US" baseline="0" dirty="0" smtClean="0"/>
+              <a:t>, </a:t>
+            </a:r>
+            <a:r>
+              <a:rPr lang="en-US" baseline="0" dirty="0" err="1" smtClean="0"/>
+              <a:t>DeleteCommand</a:t>
+            </a:r>
+            <a:r>
+              <a:rPr lang="en-US" baseline="0" dirty="0" smtClean="0"/>
+              <a:t>.</a:t>
+            </a:r>
+          </a:p>
+        </p:txBody>
+      </p:sp>
+      <p:sp>
+        <p:nvSpPr>
+          <p:cNvPr id="4" name="Slide Number Placeholder 3"/>
+          <p:cNvSpPr>
+            <a:spLocks noGrp="1"/>
+          </p:cNvSpPr>
+          <p:nvPr>
+            <p:ph type="sldNum" sz="quarter" idx="10"/>
+          </p:nvPr>
+        </p:nvSpPr>
+        <p:spPr/>
+        <p:txBody>
+          <a:bodyPr/>
+          <a:lstStyle/>
+          <a:p>
+            <a:fld id="{CA820E9B-1621-4B8C-AC33-C5AB23D4FDC8}" type="slidenum">
+              <a:rPr lang="en-US" smtClean="0"/>
+              <a:t>10</a:t>
+            </a:fld>
+            <a:endParaRPr lang="en-US"/>
+          </a:p>
+        </p:txBody>
+      </p:sp>
+    </p:spTree>
+    <p:extLst>
+      <p:ext uri="{BB962C8B-B14F-4D97-AF65-F5344CB8AC3E}">
+        <p14:creationId xmlns:p14="http://schemas.microsoft.com/office/powerpoint/2010/main" val="457232171"/>
+      </p:ext>
+    </p:extLst>
+  </p:cSld>
+  <p:clrMapOvr>
+    <a:masterClrMapping/>
+  </p:clrMapOvr>
+</p:notes>
+</file>
+
+<file path=ppt/notesSlides/notesSlide11.xml><?xml version="1.0" encoding="utf-8"?>
+<p:notes xmlns:a="http://schemas.openxmlformats.org/drawingml/2006/main" xmlns:r="http://schemas.openxmlformats.org/officeDocument/2006/relationships" xmlns:p="http://schemas.openxmlformats.org/presentationml/2006/main">
+  <p:cSld>
+    <p:spTree>
+      <p:nvGrpSpPr>
+        <p:cNvPr id="1" name=""/>
+        <p:cNvGrpSpPr/>
+        <p:nvPr/>
+      </p:nvGrpSpPr>
+      <p:grpSpPr>
+        <a:xfrm>
+          <a:off x="0" y="0"/>
+          <a:ext cx="0" cy="0"/>
+          <a:chOff x="0" y="0"/>
+          <a:chExt cx="0" cy="0"/>
+        </a:xfrm>
+      </p:grpSpPr>
+      <p:sp>
+        <p:nvSpPr>
+          <p:cNvPr id="2" name="Slide Image Placeholder 1"/>
+          <p:cNvSpPr>
+            <a:spLocks noGrp="1" noRot="1" noChangeAspect="1"/>
+          </p:cNvSpPr>
+          <p:nvPr>
+            <p:ph type="sldImg"/>
+          </p:nvPr>
+        </p:nvSpPr>
+        <p:spPr/>
+      </p:sp>
+      <p:sp>
+        <p:nvSpPr>
+          <p:cNvPr id="3" name="Notes Placeholder 2"/>
+          <p:cNvSpPr>
+            <a:spLocks noGrp="1"/>
+          </p:cNvSpPr>
+          <p:nvPr>
+            <p:ph type="body" idx="1"/>
+          </p:nvPr>
+        </p:nvSpPr>
+        <p:spPr/>
+        <p:txBody>
+          <a:bodyPr/>
+          <a:lstStyle/>
+          <a:p>
+            <a:r>
+              <a:rPr lang="en-US" baseline="0" dirty="0" smtClean="0"/>
+              <a:t>Craig</a:t>
+            </a:r>
+          </a:p>
+          <a:p>
+            <a:endParaRPr lang="en-US" baseline="0" dirty="0" smtClean="0"/>
+          </a:p>
+          <a:p>
+            <a:r>
+              <a:rPr lang="en-US" baseline="0" dirty="0" smtClean="0"/>
+              <a:t>Go over the Description and </a:t>
+            </a:r>
+            <a:r>
+              <a:rPr lang="en-US" baseline="0" dirty="0" err="1" smtClean="0"/>
+              <a:t>DueDate</a:t>
+            </a:r>
+            <a:r>
+              <a:rPr lang="en-US" baseline="0" dirty="0" smtClean="0"/>
+              <a:t> validations.</a:t>
+            </a:r>
+          </a:p>
+          <a:p>
+            <a:endParaRPr lang="en-US" baseline="0" dirty="0" smtClean="0"/>
+          </a:p>
+          <a:p>
+            <a:r>
+              <a:rPr lang="en-US" baseline="0" dirty="0" smtClean="0"/>
+              <a:t>Next -&gt; Jason</a:t>
+            </a:r>
+            <a:endParaRPr lang="en-US" dirty="0"/>
+          </a:p>
+        </p:txBody>
+      </p:sp>
+      <p:sp>
+        <p:nvSpPr>
+          <p:cNvPr id="4" name="Slide Number Placeholder 3"/>
+          <p:cNvSpPr>
+            <a:spLocks noGrp="1"/>
+          </p:cNvSpPr>
+          <p:nvPr>
+            <p:ph type="sldNum" sz="quarter" idx="10"/>
+          </p:nvPr>
+        </p:nvSpPr>
+        <p:spPr/>
+        <p:txBody>
+          <a:bodyPr/>
+          <a:lstStyle/>
+          <a:p>
+            <a:fld id="{CA820E9B-1621-4B8C-AC33-C5AB23D4FDC8}" type="slidenum">
+              <a:rPr lang="en-US" smtClean="0"/>
+              <a:t>11</a:t>
+            </a:fld>
+            <a:endParaRPr lang="en-US"/>
+          </a:p>
+        </p:txBody>
+      </p:sp>
+    </p:spTree>
+    <p:extLst>
+      <p:ext uri="{BB962C8B-B14F-4D97-AF65-F5344CB8AC3E}">
+        <p14:creationId xmlns:p14="http://schemas.microsoft.com/office/powerpoint/2010/main" val="457232171"/>
+      </p:ext>
+    </p:extLst>
+  </p:cSld>
+  <p:clrMapOvr>
+    <a:masterClrMapping/>
+  </p:clrMapOvr>
+</p:notes>
+</file>
+
+<file path=ppt/notesSlides/notesSlide12.xml><?xml version="1.0" encoding="utf-8"?>
+<p:notes xmlns:a="http://schemas.openxmlformats.org/drawingml/2006/main" xmlns:r="http://schemas.openxmlformats.org/officeDocument/2006/relationships" xmlns:p="http://schemas.openxmlformats.org/presentationml/2006/main">
+  <p:cSld>
+    <p:spTree>
+      <p:nvGrpSpPr>
+        <p:cNvPr id="1" name=""/>
+        <p:cNvGrpSpPr/>
+        <p:nvPr/>
+      </p:nvGrpSpPr>
+      <p:grpSpPr>
+        <a:xfrm>
+          <a:off x="0" y="0"/>
+          <a:ext cx="0" cy="0"/>
+          <a:chOff x="0" y="0"/>
+          <a:chExt cx="0" cy="0"/>
+        </a:xfrm>
+      </p:grpSpPr>
+      <p:sp>
+        <p:nvSpPr>
+          <p:cNvPr id="2" name="Slide Image Placeholder 1"/>
+          <p:cNvSpPr>
+            <a:spLocks noGrp="1" noRot="1" noChangeAspect="1"/>
+          </p:cNvSpPr>
+          <p:nvPr>
+            <p:ph type="sldImg"/>
+          </p:nvPr>
+        </p:nvSpPr>
+        <p:spPr/>
+      </p:sp>
+      <p:sp>
+        <p:nvSpPr>
+          <p:cNvPr id="3" name="Notes Placeholder 2"/>
+          <p:cNvSpPr>
+            <a:spLocks noGrp="1"/>
+          </p:cNvSpPr>
+          <p:nvPr>
+            <p:ph type="body" idx="1"/>
+          </p:nvPr>
+        </p:nvSpPr>
+        <p:spPr/>
+        <p:txBody>
+          <a:bodyPr/>
+          <a:lstStyle/>
+          <a:p>
+            <a:endParaRPr lang="en-US" dirty="0"/>
+          </a:p>
+        </p:txBody>
+      </p:sp>
+      <p:sp>
+        <p:nvSpPr>
+          <p:cNvPr id="4" name="Slide Number Placeholder 3"/>
+          <p:cNvSpPr>
+            <a:spLocks noGrp="1"/>
+          </p:cNvSpPr>
+          <p:nvPr>
+            <p:ph type="sldNum" sz="quarter" idx="10"/>
+          </p:nvPr>
+        </p:nvSpPr>
+        <p:spPr/>
+        <p:txBody>
+          <a:bodyPr/>
+          <a:lstStyle/>
+          <a:p>
+            <a:fld id="{CA820E9B-1621-4B8C-AC33-C5AB23D4FDC8}" type="slidenum">
+              <a:rPr lang="en-US" smtClean="0"/>
+              <a:t>12</a:t>
+            </a:fld>
+            <a:endParaRPr lang="en-US"/>
+          </a:p>
+        </p:txBody>
+      </p:sp>
+    </p:spTree>
+    <p:extLst>
+      <p:ext uri="{BB962C8B-B14F-4D97-AF65-F5344CB8AC3E}">
+        <p14:creationId xmlns:p14="http://schemas.microsoft.com/office/powerpoint/2010/main" val="70881940"/>
+      </p:ext>
+    </p:extLst>
+  </p:cSld>
+  <p:clrMapOvr>
+    <a:masterClrMapping/>
+  </p:clrMapOvr>
+</p:notes>
+</file>
+
+<file path=ppt/notesSlides/notesSlide13.xml><?xml version="1.0" encoding="utf-8"?>
+<p:notes xmlns:a="http://schemas.openxmlformats.org/drawingml/2006/main" xmlns:r="http://schemas.openxmlformats.org/officeDocument/2006/relationships" xmlns:p="http://schemas.openxmlformats.org/presentationml/2006/main">
+  <p:cSld>
+    <p:spTree>
+      <p:nvGrpSpPr>
+        <p:cNvPr id="1" name=""/>
+        <p:cNvGrpSpPr/>
+        <p:nvPr/>
+      </p:nvGrpSpPr>
+      <p:grpSpPr>
+        <a:xfrm>
+          <a:off x="0" y="0"/>
+          <a:ext cx="0" cy="0"/>
+          <a:chOff x="0" y="0"/>
+          <a:chExt cx="0" cy="0"/>
+        </a:xfrm>
+      </p:grpSpPr>
+      <p:sp>
+        <p:nvSpPr>
+          <p:cNvPr id="2" name="Slide Image Placeholder 1"/>
+          <p:cNvSpPr>
+            <a:spLocks noGrp="1" noRot="1" noChangeAspect="1"/>
+          </p:cNvSpPr>
+          <p:nvPr>
+            <p:ph type="sldImg"/>
+          </p:nvPr>
+        </p:nvSpPr>
+        <p:spPr/>
+      </p:sp>
+      <p:sp>
+        <p:nvSpPr>
+          <p:cNvPr id="3" name="Notes Placeholder 2"/>
+          <p:cNvSpPr>
+            <a:spLocks noGrp="1"/>
+          </p:cNvSpPr>
+          <p:nvPr>
+            <p:ph type="body" idx="1"/>
+          </p:nvPr>
+        </p:nvSpPr>
+        <p:spPr/>
+        <p:txBody>
+          <a:bodyPr/>
+          <a:lstStyle/>
+          <a:p>
+            <a:endParaRPr lang="en-US" dirty="0"/>
+          </a:p>
+        </p:txBody>
+      </p:sp>
+      <p:sp>
+        <p:nvSpPr>
+          <p:cNvPr id="4" name="Slide Number Placeholder 3"/>
+          <p:cNvSpPr>
+            <a:spLocks noGrp="1"/>
+          </p:cNvSpPr>
+          <p:nvPr>
+            <p:ph type="sldNum" sz="quarter" idx="10"/>
+          </p:nvPr>
+        </p:nvSpPr>
+        <p:spPr/>
+        <p:txBody>
+          <a:bodyPr/>
+          <a:lstStyle/>
+          <a:p>
+            <a:fld id="{CA820E9B-1621-4B8C-AC33-C5AB23D4FDC8}" type="slidenum">
+              <a:rPr lang="en-US" smtClean="0"/>
+              <a:t>13</a:t>
+            </a:fld>
+            <a:endParaRPr lang="en-US"/>
+          </a:p>
+        </p:txBody>
+      </p:sp>
+    </p:spTree>
+    <p:extLst>
+      <p:ext uri="{BB962C8B-B14F-4D97-AF65-F5344CB8AC3E}">
+        <p14:creationId xmlns:p14="http://schemas.microsoft.com/office/powerpoint/2010/main" val="2696873504"/>
       </p:ext>
     </p:extLst>
   </p:cSld>
@@ -690,57 +1005,24 @@
           <a:bodyPr/>
           <a:lstStyle/>
           <a:p>
-            <a:pPr marL="228600" indent="-228600">
-              <a:buAutoNum type="arabicPeriod"/>
-            </a:pPr>
             <a:r>
               <a:rPr lang="en-US" dirty="0" smtClean="0"/>
-              <a:t>Ask</a:t>
+              <a:t>Jason</a:t>
+            </a:r>
+          </a:p>
+          <a:p>
+            <a:endParaRPr lang="en-US" dirty="0" smtClean="0"/>
+          </a:p>
+          <a:p>
+            <a:r>
+              <a:rPr lang="en-US" dirty="0" smtClean="0"/>
+              <a:t>Next -&gt;</a:t>
             </a:r>
             <a:r>
               <a:rPr lang="en-US" baseline="0" dirty="0" smtClean="0"/>
-              <a:t> audience about what they use? </a:t>
-            </a:r>
-            <a:r>
-              <a:rPr lang="en-US" baseline="0" dirty="0" err="1" smtClean="0"/>
-              <a:t>Winforms</a:t>
-            </a:r>
-            <a:r>
-              <a:rPr lang="en-US" baseline="0" dirty="0" smtClean="0"/>
-              <a:t>? Presentation patterns?</a:t>
-            </a:r>
-          </a:p>
-          <a:p>
-            <a:pPr marL="228600" indent="-228600">
-              <a:buAutoNum type="arabicPeriod"/>
-            </a:pPr>
-            <a:r>
-              <a:rPr lang="en-US" baseline="0" dirty="0" smtClean="0"/>
-              <a:t>MVP -&gt; Supervising Controller: “Factor the UI into a view and controller where the view handles simple mapping to the underlying model and the controller handles input response and complex view logic.”</a:t>
-            </a:r>
-          </a:p>
-          <a:p>
-            <a:pPr marL="228600" indent="-228600">
-              <a:buAutoNum type="arabicPeriod"/>
-            </a:pPr>
-            <a:r>
-              <a:rPr lang="en-US" baseline="0" dirty="0" smtClean="0"/>
-              <a:t>MVP -&gt; Passive View: “A screen and components with all application specific behavior extracted into a controller so that the widgets have their state controlled entirely by controller.”</a:t>
-            </a:r>
-          </a:p>
-          <a:p>
-            <a:pPr marL="228600" indent="-228600">
-              <a:buAutoNum type="arabicPeriod"/>
-            </a:pPr>
-            <a:r>
-              <a:rPr lang="en-US" baseline="0" dirty="0" smtClean="0"/>
-              <a:t>Next </a:t>
-            </a:r>
-            <a:r>
-              <a:rPr lang="en-US" baseline="0" smtClean="0"/>
-              <a:t>-&gt; overview of the app</a:t>
-            </a:r>
-            <a:endParaRPr lang="en-US" dirty="0"/>
+              <a:t> Mo</a:t>
+            </a:r>
+            <a:endParaRPr lang="en-US" dirty="0" smtClean="0"/>
           </a:p>
         </p:txBody>
       </p:sp>
@@ -761,7 +1043,7 @@
           <a:p>
             <a:fld id="{CA820E9B-1621-4B8C-AC33-C5AB23D4FDC8}" type="slidenum">
               <a:rPr lang="en-US" smtClean="0"/>
-              <a:t>3</a:t>
+              <a:t>2</a:t>
             </a:fld>
             <a:endParaRPr lang="en-US"/>
           </a:p>
@@ -770,7 +1052,7 @@
     </p:spTree>
     <p:extLst>
       <p:ext uri="{BB962C8B-B14F-4D97-AF65-F5344CB8AC3E}">
-        <p14:creationId xmlns:p14="http://schemas.microsoft.com/office/powerpoint/2010/main" val="3014328081"/>
+        <p14:creationId xmlns:p14="http://schemas.microsoft.com/office/powerpoint/2010/main" val="1332039370"/>
       </p:ext>
     </p:extLst>
   </p:cSld>
@@ -824,13 +1106,19 @@
           <a:bodyPr/>
           <a:lstStyle/>
           <a:p>
+            <a:pPr marL="0" indent="0">
+              <a:buNone/>
+            </a:pPr>
+            <a:r>
+              <a:rPr lang="en-US" dirty="0" smtClean="0"/>
+              <a:t>Jason</a:t>
+            </a:r>
+          </a:p>
+          <a:p>
             <a:pPr marL="228600" indent="-228600">
               <a:buAutoNum type="arabicPeriod"/>
             </a:pPr>
-            <a:r>
-              <a:rPr lang="en-US" dirty="0" smtClean="0"/>
-              <a:t>Overview of application.</a:t>
-            </a:r>
+            <a:endParaRPr lang="en-US" dirty="0" smtClean="0"/>
           </a:p>
           <a:p>
             <a:pPr marL="228600" indent="-228600">
@@ -838,7 +1126,19 @@
             </a:pPr>
             <a:r>
               <a:rPr lang="en-US" dirty="0" smtClean="0"/>
-              <a:t>Add/remove item</a:t>
+              <a:t>Ask</a:t>
+            </a:r>
+            <a:r>
+              <a:rPr lang="en-US" baseline="0" dirty="0" smtClean="0"/>
+              <a:t> audience about what they use? </a:t>
+            </a:r>
+            <a:r>
+              <a:rPr lang="en-US" baseline="0" dirty="0" err="1" smtClean="0"/>
+              <a:t>Winforms</a:t>
+            </a:r>
+            <a:r>
+              <a:rPr lang="en-US" baseline="0" dirty="0" smtClean="0"/>
+              <a:t>? Presentation patterns?</a:t>
             </a:r>
           </a:p>
           <a:p>
@@ -846,8 +1146,8 @@
               <a:buAutoNum type="arabicPeriod"/>
             </a:pPr>
             <a:r>
-              <a:rPr lang="en-US" dirty="0" smtClean="0"/>
-              <a:t>Validation</a:t>
+              <a:rPr lang="en-US" baseline="0" dirty="0" smtClean="0"/>
+              <a:t>MVP -&gt; Supervising Controller: “Factor the UI into a view and controller where the view handles simple mapping to the underlying model and the controller handles input response and complex view logic.”</a:t>
             </a:r>
           </a:p>
           <a:p>
@@ -855,8 +1155,8 @@
               <a:buAutoNum type="arabicPeriod"/>
             </a:pPr>
             <a:r>
-              <a:rPr lang="en-US" dirty="0" smtClean="0"/>
-              <a:t>Notifications</a:t>
+              <a:rPr lang="en-US" baseline="0" dirty="0" smtClean="0"/>
+              <a:t>MVP -&gt; Passive View: “A screen and components with all application specific behavior extracted into a controller so that the widgets have their state controlled entirely by controller.”</a:t>
             </a:r>
           </a:p>
           <a:p>
@@ -864,19 +1164,18 @@
               <a:buAutoNum type="arabicPeriod"/>
             </a:pPr>
             <a:r>
-              <a:rPr lang="en-US" dirty="0" smtClean="0"/>
-              <a:t>Next -&gt; Show the MVP</a:t>
-            </a:r>
-            <a:r>
               <a:rPr lang="en-US" baseline="0" dirty="0" smtClean="0"/>
-              <a:t> code.</a:t>
-            </a:r>
-            <a:endParaRPr lang="en-US" dirty="0" smtClean="0"/>
+              <a:t>Describe the actors View -&gt; Presenter -&gt; Model</a:t>
+            </a:r>
           </a:p>
           <a:p>
             <a:pPr marL="228600" indent="-228600">
               <a:buAutoNum type="arabicPeriod"/>
             </a:pPr>
+            <a:r>
+              <a:rPr lang="en-US" baseline="0" dirty="0" smtClean="0"/>
+              <a:t>Next -&gt; overview of the app</a:t>
+            </a:r>
             <a:endParaRPr lang="en-US" dirty="0"/>
           </a:p>
         </p:txBody>
@@ -898,7 +1197,7 @@
           <a:p>
             <a:fld id="{CA820E9B-1621-4B8C-AC33-C5AB23D4FDC8}" type="slidenum">
               <a:rPr lang="en-US" smtClean="0"/>
-              <a:t>4</a:t>
+              <a:t>3</a:t>
             </a:fld>
             <a:endParaRPr lang="en-US"/>
           </a:p>
@@ -907,7 +1206,7 @@
     </p:spTree>
     <p:extLst>
       <p:ext uri="{BB962C8B-B14F-4D97-AF65-F5344CB8AC3E}">
-        <p14:creationId xmlns:p14="http://schemas.microsoft.com/office/powerpoint/2010/main" val="3011597861"/>
+        <p14:creationId xmlns:p14="http://schemas.microsoft.com/office/powerpoint/2010/main" val="3014328081"/>
       </p:ext>
     </p:extLst>
   </p:cSld>
@@ -961,25 +1260,27 @@
           <a:bodyPr/>
           <a:lstStyle/>
           <a:p>
+            <a:pPr marL="0" indent="0">
+              <a:buNone/>
+            </a:pPr>
+            <a:r>
+              <a:rPr lang="en-US" dirty="0" smtClean="0"/>
+              <a:t>Jason</a:t>
+            </a:r>
+          </a:p>
+          <a:p>
             <a:pPr marL="228600" indent="-228600">
               <a:buAutoNum type="arabicPeriod"/>
             </a:pPr>
-            <a:r>
-              <a:rPr lang="en-US" dirty="0" smtClean="0"/>
-              <a:t>MVVM: is a specialization of the more general</a:t>
-            </a:r>
-            <a:r>
-              <a:rPr lang="en-US" baseline="0" dirty="0" smtClean="0"/>
-              <a:t> Presentation Model pattern, tailor made for WPF and Silverlight.</a:t>
-            </a:r>
+            <a:endParaRPr lang="en-US" dirty="0" smtClean="0"/>
           </a:p>
           <a:p>
             <a:pPr marL="228600" indent="-228600">
               <a:buAutoNum type="arabicPeriod"/>
             </a:pPr>
             <a:r>
-              <a:rPr lang="en-US" baseline="0" dirty="0" smtClean="0"/>
-              <a:t>View knows which properties it must bind to.</a:t>
+              <a:rPr lang="en-US" dirty="0" smtClean="0"/>
+              <a:t>Overview of application.</a:t>
             </a:r>
           </a:p>
           <a:p>
@@ -987,17 +1288,46 @@
               <a:buAutoNum type="arabicPeriod"/>
             </a:pPr>
             <a:r>
-              <a:rPr lang="en-CA" sz="1200" dirty="0" err="1" smtClean="0"/>
-              <a:t>ViewModel</a:t>
-            </a:r>
-            <a:r>
-              <a:rPr lang="en-CA" sz="1200" baseline="0" dirty="0" smtClean="0"/>
-              <a:t> c</a:t>
-            </a:r>
-            <a:r>
-              <a:rPr lang="en-CA" sz="1200" dirty="0" smtClean="0"/>
-              <a:t>ommunicates updates to the View via events.</a:t>
-            </a:r>
+              <a:rPr lang="en-US" dirty="0" smtClean="0"/>
+              <a:t>Add/remove item</a:t>
+            </a:r>
+          </a:p>
+          <a:p>
+            <a:pPr marL="228600" indent="-228600">
+              <a:buAutoNum type="arabicPeriod"/>
+            </a:pPr>
+            <a:r>
+              <a:rPr lang="en-US" dirty="0" smtClean="0"/>
+              <a:t>Validation</a:t>
+            </a:r>
+          </a:p>
+          <a:p>
+            <a:pPr marL="228600" indent="-228600">
+              <a:buAutoNum type="arabicPeriod"/>
+            </a:pPr>
+            <a:r>
+              <a:rPr lang="en-US" dirty="0" smtClean="0"/>
+              <a:t>Notifications</a:t>
+            </a:r>
+          </a:p>
+          <a:p>
+            <a:pPr marL="228600" indent="-228600">
+              <a:buAutoNum type="arabicPeriod"/>
+            </a:pPr>
+            <a:r>
+              <a:rPr lang="en-US" dirty="0" smtClean="0"/>
+              <a:t>Next -&gt; Show the MVP</a:t>
+            </a:r>
+            <a:r>
+              <a:rPr lang="en-US" baseline="0" dirty="0" smtClean="0"/>
+              <a:t> code.</a:t>
+            </a:r>
+            <a:endParaRPr lang="en-US" dirty="0" smtClean="0"/>
+          </a:p>
+          <a:p>
+            <a:pPr marL="228600" indent="-228600">
+              <a:buAutoNum type="arabicPeriod"/>
+            </a:pPr>
             <a:endParaRPr lang="en-US" dirty="0"/>
           </a:p>
         </p:txBody>
@@ -1019,7 +1349,7 @@
           <a:p>
             <a:fld id="{CA820E9B-1621-4B8C-AC33-C5AB23D4FDC8}" type="slidenum">
               <a:rPr lang="en-US" smtClean="0"/>
-              <a:t>5</a:t>
+              <a:t>4</a:t>
             </a:fld>
             <a:endParaRPr lang="en-US"/>
           </a:p>
@@ -1028,7 +1358,7 @@
     </p:spTree>
     <p:extLst>
       <p:ext uri="{BB962C8B-B14F-4D97-AF65-F5344CB8AC3E}">
-        <p14:creationId xmlns:p14="http://schemas.microsoft.com/office/powerpoint/2010/main" val="3978377817"/>
+        <p14:creationId xmlns:p14="http://schemas.microsoft.com/office/powerpoint/2010/main" val="3011597861"/>
       </p:ext>
     </p:extLst>
   </p:cSld>
@@ -1082,95 +1412,57 @@
           <a:bodyPr/>
           <a:lstStyle/>
           <a:p>
+            <a:pPr marL="0" indent="0">
+              <a:buNone/>
+            </a:pPr>
             <a:r>
               <a:rPr lang="en-US" dirty="0" smtClean="0"/>
-              <a:t>Code Example</a:t>
-            </a:r>
-          </a:p>
-          <a:p>
-            <a:pPr marL="171450" indent="-171450">
-              <a:buFontTx/>
-              <a:buChar char="-"/>
+              <a:t>Mo</a:t>
+            </a:r>
+          </a:p>
+          <a:p>
+            <a:pPr marL="228600" indent="-228600">
+              <a:buAutoNum type="arabicPeriod"/>
             </a:pPr>
+            <a:endParaRPr lang="en-US" dirty="0" smtClean="0"/>
+          </a:p>
+          <a:p>
+            <a:pPr marL="228600" indent="-228600">
+              <a:buAutoNum type="arabicPeriod"/>
+            </a:pPr>
             <a:r>
               <a:rPr lang="en-US" dirty="0" smtClean="0"/>
-              <a:t>Show</a:t>
+              <a:t>MVVM: is a specialization of the more general</a:t>
             </a:r>
             <a:r>
               <a:rPr lang="en-US" baseline="0" dirty="0" smtClean="0"/>
-              <a:t> the </a:t>
-            </a:r>
-            <a:r>
-              <a:rPr lang="en-US" dirty="0" err="1" smtClean="0"/>
-              <a:t>MainWindow.xaml</a:t>
-            </a:r>
-            <a:r>
-              <a:rPr lang="en-US" baseline="0" dirty="0" err="1" smtClean="0"/>
-              <a:t>.cs</a:t>
-            </a:r>
+              <a:t> Presentation Model pattern, tailor made for WPF and Silverlight.</a:t>
+            </a:r>
+          </a:p>
+          <a:p>
+            <a:pPr marL="228600" indent="-228600">
+              <a:buAutoNum type="arabicPeriod"/>
+            </a:pPr>
             <a:r>
               <a:rPr lang="en-US" baseline="0" dirty="0" smtClean="0"/>
-              <a:t> where we assign a </a:t>
-            </a:r>
-            <a:r>
-              <a:rPr lang="en-US" baseline="0" dirty="0" err="1" smtClean="0"/>
+              <a:t>View knows which properties it must bind to.</a:t>
+            </a:r>
+          </a:p>
+          <a:p>
+            <a:pPr marL="228600" indent="-228600">
+              <a:buAutoNum type="arabicPeriod"/>
+            </a:pPr>
+            <a:r>
+              <a:rPr lang="en-CA" sz="1200" dirty="0" err="1" smtClean="0"/>
               <a:t>ViewModel</a:t>
             </a:r>
             <a:r>
-              <a:rPr lang="en-US" baseline="0" dirty="0" smtClean="0"/>
-              <a:t> to the </a:t>
-            </a:r>
-            <a:r>
-              <a:rPr lang="en-US" baseline="0" dirty="0" err="1" smtClean="0"/>
-              <a:t>DataContext</a:t>
-            </a:r>
-            <a:r>
-              <a:rPr lang="en-US" baseline="0" dirty="0" smtClean="0"/>
-              <a:t>.</a:t>
-            </a:r>
-          </a:p>
-          <a:p>
-            <a:pPr marL="171450" indent="-171450">
-              <a:buFontTx/>
-              <a:buChar char="-"/>
-            </a:pPr>
-            <a:r>
-              <a:rPr lang="en-US" dirty="0" smtClean="0"/>
-              <a:t>Show the </a:t>
-            </a:r>
-            <a:r>
-              <a:rPr lang="en-US" dirty="0" err="1" smtClean="0"/>
-              <a:t>MainWindow.xaml</a:t>
-            </a:r>
-            <a:r>
-              <a:rPr lang="en-US" baseline="0" dirty="0" smtClean="0"/>
-              <a:t> where we bind to properties on the target </a:t>
-            </a:r>
-            <a:r>
-              <a:rPr lang="en-US" baseline="0" dirty="0" err="1" smtClean="0"/>
-              <a:t>ViewModel</a:t>
-            </a:r>
-            <a:r>
-              <a:rPr lang="en-US" baseline="0" dirty="0" smtClean="0"/>
-              <a:t>.</a:t>
-            </a:r>
-          </a:p>
-          <a:p>
-            <a:pPr marL="171450" indent="-171450">
-              <a:buFontTx/>
-              <a:buChar char="-"/>
-            </a:pPr>
-            <a:r>
-              <a:rPr lang="en-US" baseline="0" dirty="0" smtClean="0"/>
-              <a:t>Show the </a:t>
-            </a:r>
-            <a:r>
-              <a:rPr lang="en-US" baseline="0" dirty="0" err="1" smtClean="0"/>
-              <a:t>MainWindowViewModel</a:t>
-            </a:r>
-            <a:r>
-              <a:rPr lang="en-US" baseline="0" dirty="0" smtClean="0"/>
-              <a:t> to show the properties that the view is bound to.</a:t>
+              <a:rPr lang="en-CA" sz="1200" baseline="0" dirty="0" smtClean="0"/>
+              <a:t> c</a:t>
+            </a:r>
+            <a:r>
+              <a:rPr lang="en-CA" sz="1200" dirty="0" smtClean="0"/>
+              <a:t>ommunicates updates to the View via events.</a:t>
             </a:r>
             <a:endParaRPr lang="en-US" dirty="0"/>
           </a:p>
@@ -1193,7 +1485,7 @@
           <a:p>
             <a:fld id="{CA820E9B-1621-4B8C-AC33-C5AB23D4FDC8}" type="slidenum">
               <a:rPr lang="en-US" smtClean="0"/>
-              <a:t>7</a:t>
+              <a:t>5</a:t>
             </a:fld>
             <a:endParaRPr lang="en-US"/>
           </a:p>
@@ -1202,7 +1494,7 @@
     </p:spTree>
     <p:extLst>
       <p:ext uri="{BB962C8B-B14F-4D97-AF65-F5344CB8AC3E}">
-        <p14:creationId xmlns:p14="http://schemas.microsoft.com/office/powerpoint/2010/main" val="2730682473"/>
+        <p14:creationId xmlns:p14="http://schemas.microsoft.com/office/powerpoint/2010/main" val="3978377817"/>
       </p:ext>
     </p:extLst>
   </p:cSld>
@@ -1258,35 +1550,8 @@
           <a:p>
             <a:r>
               <a:rPr lang="en-US" dirty="0" smtClean="0"/>
-              <a:t>Show them what happens when we change the </a:t>
-            </a:r>
-            <a:r>
-              <a:rPr lang="en-US" dirty="0" err="1" smtClean="0"/>
-              <a:t>Observable</a:t>
-            </a:r>
-            <a:r>
-              <a:rPr lang="en-US" baseline="0" dirty="0" err="1" smtClean="0"/>
-              <a:t>Collection</a:t>
-            </a:r>
-            <a:r>
-              <a:rPr lang="en-US" baseline="0" dirty="0" smtClean="0"/>
-              <a:t> to a List.</a:t>
-            </a:r>
-          </a:p>
-          <a:p>
-            <a:r>
-              <a:rPr lang="en-US" baseline="0" dirty="0" smtClean="0"/>
-              <a:t>Show them what happens when we do not raise a property changed for the warning icon.</a:t>
-            </a:r>
-          </a:p>
-          <a:p>
-            <a:r>
-              <a:rPr lang="en-US" baseline="0" dirty="0" smtClean="0"/>
-              <a:t>Calling the property changed event handler is not pretty, but we will show you a way to deal with it.</a:t>
-            </a:r>
-            <a:endParaRPr lang="en-US" dirty="0" smtClean="0"/>
-          </a:p>
-          <a:p>
+              <a:t>Mo</a:t>
+            </a:r>
             <a:endParaRPr lang="en-US" dirty="0"/>
           </a:p>
         </p:txBody>
@@ -1308,7 +1573,7 @@
           <a:p>
             <a:fld id="{CA820E9B-1621-4B8C-AC33-C5AB23D4FDC8}" type="slidenum">
               <a:rPr lang="en-US" smtClean="0"/>
-              <a:t>8</a:t>
+              <a:t>6</a:t>
             </a:fld>
             <a:endParaRPr lang="en-US"/>
           </a:p>
@@ -1317,7 +1582,7 @@
     </p:spTree>
     <p:extLst>
       <p:ext uri="{BB962C8B-B14F-4D97-AF65-F5344CB8AC3E}">
-        <p14:creationId xmlns:p14="http://schemas.microsoft.com/office/powerpoint/2010/main" val="363792024"/>
+        <p14:creationId xmlns:p14="http://schemas.microsoft.com/office/powerpoint/2010/main" val="128980673"/>
       </p:ext>
     </p:extLst>
   </p:cSld>
@@ -1371,68 +1636,149 @@
           <a:bodyPr/>
           <a:lstStyle/>
           <a:p>
+            <a:r>
+              <a:rPr lang="en-US" dirty="0" smtClean="0"/>
+              <a:t>Mo</a:t>
+            </a:r>
+          </a:p>
+          <a:p>
+            <a:endParaRPr lang="en-US" dirty="0" smtClean="0"/>
+          </a:p>
+          <a:p>
+            <a:r>
+              <a:rPr lang="en-US" dirty="0" smtClean="0"/>
+              <a:t>Code Example</a:t>
+            </a:r>
+          </a:p>
+          <a:p>
+            <a:pPr marL="171450" indent="-171450">
+              <a:buFontTx/>
+              <a:buChar char="-"/>
+            </a:pPr>
+            <a:r>
+              <a:rPr lang="en-US" dirty="0" smtClean="0"/>
+              <a:t>Show</a:t>
+            </a:r>
+            <a:r>
+              <a:rPr lang="en-US" baseline="0" dirty="0" smtClean="0"/>
+              <a:t> the </a:t>
+            </a:r>
+            <a:r>
+              <a:rPr lang="en-US" dirty="0" err="1" smtClean="0"/>
+              <a:t>MainWindow.xaml</a:t>
+            </a:r>
+            <a:r>
+              <a:rPr lang="en-US" baseline="0" dirty="0" err="1" smtClean="0"/>
+              <a:t>.cs</a:t>
+            </a:r>
+            <a:r>
+              <a:rPr lang="en-US" baseline="0" dirty="0" smtClean="0"/>
+              <a:t> where we assign a </a:t>
+            </a:r>
+            <a:r>
+              <a:rPr lang="en-US" baseline="0" dirty="0" err="1" smtClean="0"/>
+              <a:t>ViewModel</a:t>
+            </a:r>
+            <a:r>
+              <a:rPr lang="en-US" baseline="0" dirty="0" smtClean="0"/>
+              <a:t> to the </a:t>
+            </a:r>
+            <a:r>
+              <a:rPr lang="en-US" baseline="0" dirty="0" err="1" smtClean="0"/>
+              <a:t>DataContext</a:t>
+            </a:r>
+            <a:r>
+              <a:rPr lang="en-US" baseline="0" dirty="0" smtClean="0"/>
+              <a:t>.</a:t>
+            </a:r>
+          </a:p>
+          <a:p>
+            <a:pPr marL="171450" indent="-171450">
+              <a:buFontTx/>
+              <a:buChar char="-"/>
+            </a:pPr>
+            <a:r>
+              <a:rPr lang="en-US" dirty="0" smtClean="0"/>
+              <a:t>Show the </a:t>
+            </a:r>
+            <a:r>
+              <a:rPr lang="en-US" dirty="0" err="1" smtClean="0"/>
+              <a:t>MainWindow.xaml</a:t>
+            </a:r>
+            <a:r>
+              <a:rPr lang="en-US" baseline="0" dirty="0" smtClean="0"/>
+              <a:t> where we bind to properties on the target </a:t>
+            </a:r>
+            <a:r>
+              <a:rPr lang="en-US" baseline="0" dirty="0" err="1" smtClean="0"/>
+              <a:t>ViewModel</a:t>
+            </a:r>
+            <a:r>
+              <a:rPr lang="en-US" baseline="0" dirty="0" smtClean="0"/>
+              <a:t>.</a:t>
+            </a:r>
+          </a:p>
+          <a:p>
+            <a:pPr marL="171450" indent="-171450">
+              <a:buFontTx/>
+              <a:buChar char="-"/>
+            </a:pPr>
+            <a:r>
+              <a:rPr lang="en-US" baseline="0" dirty="0" smtClean="0"/>
+              <a:t>Show the </a:t>
+            </a:r>
+            <a:r>
+              <a:rPr lang="en-US" baseline="0" dirty="0" err="1" smtClean="0"/>
+              <a:t>MainWindowViewModel</a:t>
+            </a:r>
+            <a:r>
+              <a:rPr lang="en-US" baseline="0" dirty="0" smtClean="0"/>
+              <a:t> to show the properties that the view is bound to.</a:t>
+            </a:r>
+          </a:p>
+          <a:p>
+            <a:pPr marL="171450" indent="-171450">
+              <a:buFontTx/>
+              <a:buChar char="-"/>
+            </a:pPr>
+            <a:endParaRPr lang="en-US" baseline="0" dirty="0" smtClean="0"/>
+          </a:p>
+          <a:p>
             <a:pPr marL="0" indent="0">
               <a:buFontTx/>
               <a:buNone/>
             </a:pPr>
             <a:r>
-              <a:rPr lang="en-US" dirty="0" smtClean="0"/>
-              <a:t>User</a:t>
-            </a:r>
-            <a:r>
               <a:rPr lang="en-US" baseline="0" dirty="0" smtClean="0"/>
-              <a:t> Interaction</a:t>
-            </a:r>
-          </a:p>
-          <a:p>
-            <a:pPr marL="171450" indent="-171450">
+              <a:t>Binding changes from the View to the View Model.</a:t>
+            </a:r>
+          </a:p>
+          <a:p>
+            <a:pPr marL="0" indent="0">
               <a:buFontTx/>
-              <a:buChar char="-"/>
+              <a:buNone/>
             </a:pPr>
             <a:r>
+              <a:rPr lang="en-US" baseline="0" dirty="0" smtClean="0"/>
+              <a:t>Next -&gt; we will show you how to sync </a:t>
+            </a:r>
+            <a:r>
               <a:rPr lang="en-US" baseline="0" dirty="0" err="1" smtClean="0"/>
-              <a:t>IValueConverter</a:t>
-            </a:r>
-            <a:endParaRPr lang="en-US" baseline="0" dirty="0" smtClean="0"/>
-          </a:p>
-          <a:p>
-            <a:r>
-              <a:rPr lang="en-US" dirty="0" smtClean="0"/>
-              <a:t>Go</a:t>
+              <a:t>ViewModel</a:t>
             </a:r>
             <a:r>
               <a:rPr lang="en-US" baseline="0" dirty="0" smtClean="0"/>
-              <a:t> over the </a:t>
-            </a:r>
-            <a:r>
-              <a:rPr lang="en-US" baseline="0" dirty="0" err="1" smtClean="0"/>
-              <a:t>SaveCommand</a:t>
-            </a:r>
+              <a:t> to View changes. </a:t>
+            </a:r>
+          </a:p>
+          <a:p>
+            <a:pPr marL="0" indent="0">
+              <a:buFontTx/>
+              <a:buNone/>
+            </a:pPr>
             <a:r>
               <a:rPr lang="en-US" baseline="0" dirty="0" smtClean="0"/>
-              <a:t>, </a:t>
-            </a:r>
-            <a:r>
-              <a:rPr lang="en-US" baseline="0" dirty="0" err="1" smtClean="0"/>
-              <a:t>DeleteCommand</a:t>
-            </a:r>
-            <a:r>
-              <a:rPr lang="en-US" baseline="0" dirty="0" smtClean="0"/>
-              <a:t>.</a:t>
-            </a:r>
-          </a:p>
-          <a:p>
-            <a:r>
-              <a:rPr lang="en-US" baseline="0" dirty="0" smtClean="0"/>
-              <a:t>Go over the Description and </a:t>
-            </a:r>
-            <a:r>
-              <a:rPr lang="en-US" baseline="0" dirty="0" err="1" smtClean="0"/>
-              <a:t>DueDate</a:t>
-            </a:r>
-            <a:r>
-              <a:rPr lang="en-US" baseline="0" dirty="0" smtClean="0"/>
-              <a:t> validations.</a:t>
+              <a:t>-&gt; CRAIG</a:t>
             </a:r>
             <a:endParaRPr lang="en-US" dirty="0"/>
           </a:p>
@@ -1455,7 +1801,7 @@
           <a:p>
             <a:fld id="{CA820E9B-1621-4B8C-AC33-C5AB23D4FDC8}" type="slidenum">
               <a:rPr lang="en-US" smtClean="0"/>
-              <a:t>9</a:t>
+              <a:t>7</a:t>
             </a:fld>
             <a:endParaRPr lang="en-US"/>
           </a:p>
@@ -1464,7 +1810,7 @@
     </p:spTree>
     <p:extLst>
       <p:ext uri="{BB962C8B-B14F-4D97-AF65-F5344CB8AC3E}">
-        <p14:creationId xmlns:p14="http://schemas.microsoft.com/office/powerpoint/2010/main" val="457232171"/>
+        <p14:creationId xmlns:p14="http://schemas.microsoft.com/office/powerpoint/2010/main" val="2730682473"/>
       </p:ext>
     </p:extLst>
   </p:cSld>
@@ -1520,7 +1866,7 @@
           <a:p>
             <a:r>
               <a:rPr lang="en-US" dirty="0" smtClean="0"/>
-              <a:t>Show them the synchronizer.</a:t>
+              <a:t>Mo</a:t>
             </a:r>
           </a:p>
           <a:p>
@@ -1528,25 +1874,8 @@
           </a:p>
           <a:p>
             <a:r>
-              <a:rPr lang="en-US" dirty="0" err="1" smtClean="0"/>
-              <a:t>OpenFileDialog</a:t>
-            </a:r>
-            <a:r>
               <a:rPr lang="en-US" dirty="0" smtClean="0"/>
-              <a:t> is hard to bind a </a:t>
-            </a:r>
-            <a:r>
-              <a:rPr lang="en-US" smtClean="0"/>
-              <a:t>view model too.</a:t>
-            </a:r>
-          </a:p>
-          <a:p>
-            <a:endParaRPr lang="en-US" dirty="0" smtClean="0"/>
-          </a:p>
-          <a:p>
-            <a:r>
-              <a:rPr lang="en-US" dirty="0" smtClean="0"/>
-              <a:t>XAML oddities</a:t>
+              <a:t>Code Example</a:t>
             </a:r>
           </a:p>
           <a:p>
@@ -1556,11 +1885,39 @@
             </a:pPr>
             <a:r>
               <a:rPr lang="en-US" dirty="0" smtClean="0"/>
-              <a:t>Things</a:t>
+              <a:t>Show</a:t>
             </a:r>
             <a:r>
               <a:rPr lang="en-US" baseline="0" dirty="0" smtClean="0"/>
-              <a:t> like stretching controls (horizontal alignment/horizontal content alignment)</a:t>
+              <a:t> the </a:t>
+            </a:r>
+            <a:r>
+              <a:rPr lang="en-US" dirty="0" err="1" smtClean="0"/>
+              <a:t>MainWindow.xaml</a:t>
+            </a:r>
+            <a:r>
+              <a:rPr lang="en-US" baseline="0" dirty="0" err="1" smtClean="0"/>
+              <a:t>.cs</a:t>
+            </a:r>
+            <a:r>
+              <a:rPr lang="en-US" baseline="0" dirty="0" smtClean="0"/>
+              <a:t> where we assign a </a:t>
+            </a:r>
+            <a:r>
+              <a:rPr lang="en-US" baseline="0" dirty="0" err="1" smtClean="0"/>
+              <a:t>ViewModel</a:t>
+            </a:r>
+            <a:r>
+              <a:rPr lang="en-US" baseline="0" dirty="0" smtClean="0"/>
+              <a:t> to the </a:t>
+            </a:r>
+            <a:r>
+              <a:rPr lang="en-US" baseline="0" dirty="0" err="1" smtClean="0"/>
+              <a:t>DataContext</a:t>
+            </a:r>
+            <a:r>
+              <a:rPr lang="en-US" baseline="0" dirty="0" smtClean="0"/>
+              <a:t>.</a:t>
             </a:r>
           </a:p>
           <a:p>
@@ -1569,16 +1926,20 @@
               <a:buChar char="-"/>
             </a:pPr>
             <a:r>
+              <a:rPr lang="en-US" dirty="0" smtClean="0"/>
+              <a:t>Show the </a:t>
+            </a:r>
+            <a:r>
+              <a:rPr lang="en-US" dirty="0" err="1" smtClean="0"/>
+              <a:t>MainWindow.xaml</a:t>
+            </a:r>
+            <a:r>
+              <a:rPr lang="en-US" baseline="0" dirty="0" smtClean="0"/>
+              <a:t> where we bind to properties on the target </a:t>
+            </a:r>
+            <a:r>
               <a:rPr lang="en-US" baseline="0" dirty="0" err="1" smtClean="0"/>
-              <a:t>DockPanel</a:t>
-            </a:r>
-            <a:r>
-              <a:rPr lang="en-US" baseline="0" dirty="0" smtClean="0"/>
-              <a:t> vs. </a:t>
-            </a:r>
-            <a:r>
-              <a:rPr lang="en-US" baseline="0" dirty="0" err="1" smtClean="0"/>
-              <a:t>StackPanel</a:t>
+              <a:t>ViewModel</a:t>
             </a:r>
             <a:r>
               <a:rPr lang="en-US" baseline="0" dirty="0" smtClean="0"/>
@@ -1592,14 +1953,61 @@
             </a:pPr>
             <a:r>
               <a:rPr lang="en-US" baseline="0" dirty="0" smtClean="0"/>
-              <a:t>Stretching</a:t>
-            </a:r>
+              <a:t>Show the </a:t>
+            </a:r>
+            <a:r>
+              <a:rPr lang="en-US" baseline="0" dirty="0" err="1" smtClean="0"/>
+              <a:t>MainWindowViewModel</a:t>
+            </a:r>
+            <a:r>
+              <a:rPr lang="en-US" baseline="0" dirty="0" smtClean="0"/>
+              <a:t> to show the properties that the view is bound to.</a:t>
+            </a:r>
+          </a:p>
+          <a:p>
+            <a:pPr marL="171450" indent="-171450">
+              <a:buFontTx/>
+              <a:buChar char="-"/>
+            </a:pPr>
+            <a:endParaRPr lang="en-US" baseline="0" dirty="0" smtClean="0"/>
           </a:p>
           <a:p>
             <a:pPr marL="0" indent="0">
               <a:buFontTx/>
               <a:buNone/>
             </a:pPr>
+            <a:r>
+              <a:rPr lang="en-US" baseline="0" dirty="0" smtClean="0"/>
+              <a:t>Binding changes from the View to the View Model.</a:t>
+            </a:r>
+          </a:p>
+          <a:p>
+            <a:pPr marL="0" indent="0">
+              <a:buFontTx/>
+              <a:buNone/>
+            </a:pPr>
+            <a:r>
+              <a:rPr lang="en-US" baseline="0" dirty="0" smtClean="0"/>
+              <a:t>Next -&gt; we will show you how to sync </a:t>
+            </a:r>
+            <a:r>
+              <a:rPr lang="en-US" baseline="0" dirty="0" err="1" smtClean="0"/>
+              <a:t>ViewModel</a:t>
+            </a:r>
+            <a:r>
+              <a:rPr lang="en-US" baseline="0" dirty="0" smtClean="0"/>
+              <a:t> to View changes. </a:t>
+            </a:r>
+          </a:p>
+          <a:p>
+            <a:pPr marL="0" indent="0">
+              <a:buFontTx/>
+              <a:buNone/>
+            </a:pPr>
+            <a:r>
+              <a:rPr lang="en-US" baseline="0" dirty="0" smtClean="0"/>
+              <a:t>-&gt; CRAIG</a:t>
+            </a:r>
             <a:endParaRPr lang="en-US" dirty="0"/>
           </a:p>
         </p:txBody>
@@ -1621,7 +2029,7 @@
           <a:p>
             <a:fld id="{CA820E9B-1621-4B8C-AC33-C5AB23D4FDC8}" type="slidenum">
               <a:rPr lang="en-US" smtClean="0"/>
-              <a:t>10</a:t>
+              <a:t>8</a:t>
             </a:fld>
             <a:endParaRPr lang="en-US"/>
           </a:p>
@@ -1630,7 +2038,131 @@
     </p:spTree>
     <p:extLst>
       <p:ext uri="{BB962C8B-B14F-4D97-AF65-F5344CB8AC3E}">
-        <p14:creationId xmlns:p14="http://schemas.microsoft.com/office/powerpoint/2010/main" val="81893713"/>
+        <p14:creationId xmlns:p14="http://schemas.microsoft.com/office/powerpoint/2010/main" val="2730682473"/>
+      </p:ext>
+    </p:extLst>
+  </p:cSld>
+  <p:clrMapOvr>
+    <a:masterClrMapping/>
+  </p:clrMapOvr>
+</p:notes>
+</file>
+
+<file path=ppt/notesSlides/notesSlide9.xml><?xml version="1.0" encoding="utf-8"?>
+<p:notes xmlns:a="http://schemas.openxmlformats.org/drawingml/2006/main" xmlns:r="http://schemas.openxmlformats.org/officeDocument/2006/relationships" xmlns:p="http://schemas.openxmlformats.org/presentationml/2006/main">
+  <p:cSld>
+    <p:spTree>
+      <p:nvGrpSpPr>
+        <p:cNvPr id="1" name=""/>
+        <p:cNvGrpSpPr/>
+        <p:nvPr/>
+      </p:nvGrpSpPr>
+      <p:grpSpPr>
+        <a:xfrm>
+          <a:off x="0" y="0"/>
+          <a:ext cx="0" cy="0"/>
+          <a:chOff x="0" y="0"/>
+          <a:chExt cx="0" cy="0"/>
+        </a:xfrm>
+      </p:grpSpPr>
+      <p:sp>
+        <p:nvSpPr>
+          <p:cNvPr id="2" name="Slide Image Placeholder 1"/>
+          <p:cNvSpPr>
+            <a:spLocks noGrp="1" noRot="1" noChangeAspect="1"/>
+          </p:cNvSpPr>
+          <p:nvPr>
+            <p:ph type="sldImg"/>
+          </p:nvPr>
+        </p:nvSpPr>
+        <p:spPr/>
+      </p:sp>
+      <p:sp>
+        <p:nvSpPr>
+          <p:cNvPr id="3" name="Notes Placeholder 2"/>
+          <p:cNvSpPr>
+            <a:spLocks noGrp="1"/>
+          </p:cNvSpPr>
+          <p:nvPr>
+            <p:ph type="body" idx="1"/>
+          </p:nvPr>
+        </p:nvSpPr>
+        <p:spPr/>
+        <p:txBody>
+          <a:bodyPr/>
+          <a:lstStyle/>
+          <a:p>
+            <a:r>
+              <a:rPr lang="en-US" dirty="0" smtClean="0"/>
+              <a:t>Craig</a:t>
+            </a:r>
+          </a:p>
+          <a:p>
+            <a:endParaRPr lang="en-US" dirty="0" smtClean="0"/>
+          </a:p>
+          <a:p>
+            <a:r>
+              <a:rPr lang="en-US" dirty="0" smtClean="0"/>
+              <a:t>Show them what happens when we change the </a:t>
+            </a:r>
+            <a:r>
+              <a:rPr lang="en-US" dirty="0" err="1" smtClean="0"/>
+              <a:t>Observable</a:t>
+            </a:r>
+            <a:r>
+              <a:rPr lang="en-US" baseline="0" dirty="0" err="1" smtClean="0"/>
+              <a:t>Collection</a:t>
+            </a:r>
+            <a:r>
+              <a:rPr lang="en-US" baseline="0" dirty="0" smtClean="0"/>
+              <a:t> to a List.</a:t>
+            </a:r>
+          </a:p>
+          <a:p>
+            <a:r>
+              <a:rPr lang="en-US" baseline="0" dirty="0" smtClean="0"/>
+              <a:t>Show them what happens when we do not raise a property changed for the warning icon.</a:t>
+            </a:r>
+          </a:p>
+          <a:p>
+            <a:r>
+              <a:rPr lang="en-US" baseline="0" dirty="0" smtClean="0"/>
+              <a:t>Calling the property changed event handler is not pretty, but we will show you a way to deal with it.</a:t>
+            </a:r>
+            <a:endParaRPr lang="en-US" dirty="0" smtClean="0"/>
+          </a:p>
+          <a:p>
+            <a:endParaRPr lang="en-US" dirty="0"/>
+          </a:p>
+        </p:txBody>
+      </p:sp>
+      <p:sp>
+        <p:nvSpPr>
+          <p:cNvPr id="4" name="Slide Number Placeholder 3"/>
+          <p:cNvSpPr>
+            <a:spLocks noGrp="1"/>
+          </p:cNvSpPr>
+          <p:nvPr>
+            <p:ph type="sldNum" sz="quarter" idx="10"/>
+          </p:nvPr>
+        </p:nvSpPr>
+        <p:spPr/>
+        <p:txBody>
+          <a:bodyPr/>
+          <a:lstStyle/>
+          <a:p>
+            <a:fld id="{CA820E9B-1621-4B8C-AC33-C5AB23D4FDC8}" type="slidenum">
+              <a:rPr lang="en-US" smtClean="0"/>
+              <a:t>9</a:t>
+            </a:fld>
+            <a:endParaRPr lang="en-US"/>
+          </a:p>
+        </p:txBody>
+      </p:sp>
+    </p:spTree>
+    <p:extLst>
+      <p:ext uri="{BB962C8B-B14F-4D97-AF65-F5344CB8AC3E}">
+        <p14:creationId xmlns:p14="http://schemas.microsoft.com/office/powerpoint/2010/main" val="363792024"/>
       </p:ext>
     </p:extLst>
   </p:cSld>
@@ -5088,10 +5620,15 @@
             <p:ph type="subTitle" idx="1"/>
           </p:nvPr>
         </p:nvSpPr>
-        <p:spPr/>
+        <p:spPr>
+          <a:xfrm>
+            <a:off x="762000" y="4724399"/>
+            <a:ext cx="6858000" cy="1479813"/>
+          </a:xfrm>
+        </p:spPr>
         <p:txBody>
           <a:bodyPr>
-            <a:normAutofit lnSpcReduction="10000"/>
+            <a:normAutofit/>
           </a:bodyPr>
           <a:lstStyle/>
           <a:p>
@@ -5103,13 +5640,22 @@
           <a:p>
             <a:r>
               <a:rPr lang="en-CA" dirty="0" smtClean="0"/>
-              <a:t> Model-View-</a:t>
+              <a:t>Model-View-</a:t>
             </a:r>
             <a:r>
               <a:rPr lang="en-CA" dirty="0" err="1" smtClean="0"/>
               <a:t>ViewModel</a:t>
             </a:r>
-            <a:endParaRPr lang="en-CA" dirty="0"/>
+            <a:endParaRPr lang="en-CA" dirty="0" smtClean="0"/>
+          </a:p>
+          <a:p>
+            <a:r>
+              <a:rPr lang="en-US" sz="1400" dirty="0">
+                <a:hlinkClick r:id="rId3"/>
+              </a:rPr>
+              <a:t>http://github.com/arcresources/MVPtoMVVM</a:t>
+            </a:r>
+            <a:endParaRPr lang="en-CA" sz="1400" dirty="0"/>
           </a:p>
         </p:txBody>
       </p:sp>
@@ -5167,17 +5713,7 @@
                   </a:schemeClr>
                 </a:solidFill>
               </a:rPr>
-              <a:t>	Craig </a:t>
-            </a:r>
-            <a:r>
-              <a:rPr lang="en-CA" sz="1600" dirty="0" smtClean="0">
-                <a:solidFill>
-                  <a:schemeClr val="bg1">
-                    <a:lumMod val="50000"/>
-                  </a:schemeClr>
-                </a:solidFill>
-              </a:rPr>
-              <a:t>Anderson</a:t>
+              <a:t>	Craig Anderson</a:t>
             </a:r>
             <a:endParaRPr lang="en-CA" sz="1600" dirty="0">
               <a:solidFill>
@@ -5238,27 +5774,14 @@
         </p:nvSpPr>
         <p:spPr/>
         <p:txBody>
-          <a:bodyPr>
-            <a:normAutofit fontScale="90000"/>
-          </a:bodyPr>
-          <a:lstStyle/>
-          <a:p>
-            <a:r>
-              <a:rPr lang="en-CA" dirty="0" smtClean="0"/>
-              <a:t>Difficulties with </a:t>
-            </a:r>
-            <a:br>
-              <a:rPr lang="en-CA" dirty="0" smtClean="0"/>
-            </a:br>
-            <a:r>
-              <a:rPr lang="en-CA" dirty="0" smtClean="0"/>
-              <a:t>Model-View-</a:t>
-            </a:r>
-            <a:r>
-              <a:rPr lang="en-CA" dirty="0" err="1" smtClean="0"/>
-              <a:t>ViewModel</a:t>
-            </a:r>
-            <a:endParaRPr lang="en-CA" dirty="0"/>
+          <a:bodyPr/>
+          <a:lstStyle/>
+          <a:p>
+            <a:r>
+              <a:rPr lang="en-CA" dirty="0"/>
+              <a:t>User Interaction</a:t>
+            </a:r>
+            <a:endParaRPr lang="en-US" dirty="0"/>
           </a:p>
         </p:txBody>
       </p:sp>
@@ -5278,42 +5801,26 @@
           <a:lstStyle/>
           <a:p>
             <a:r>
-              <a:rPr lang="en-CA" dirty="0" smtClean="0"/>
-              <a:t>Bindings are strings (XAML vs. </a:t>
-            </a:r>
-            <a:r>
-              <a:rPr lang="en-CA" smtClean="0"/>
-              <a:t>C#)</a:t>
-            </a:r>
-            <a:endParaRPr lang="en-CA" dirty="0" smtClean="0"/>
-          </a:p>
-          <a:p>
-            <a:r>
-              <a:rPr lang="en-CA" dirty="0" smtClean="0"/>
-              <a:t>Some controls don’t bind well</a:t>
-            </a:r>
-          </a:p>
-          <a:p>
-            <a:r>
-              <a:rPr lang="en-CA" dirty="0" err="1" smtClean="0"/>
-              <a:t>INotifyPropertyChanged</a:t>
-            </a:r>
-            <a:r>
-              <a:rPr lang="en-CA" dirty="0" smtClean="0"/>
-              <a:t> events are published as strings</a:t>
+              <a:rPr lang="en-US" dirty="0" err="1" smtClean="0"/>
+              <a:t>ICommand</a:t>
+            </a:r>
+            <a:r>
+              <a:rPr lang="en-US" dirty="0" smtClean="0"/>
+              <a:t> – Consists of two things:</a:t>
             </a:r>
           </a:p>
           <a:p>
             <a:pPr lvl="1"/>
             <a:r>
-              <a:rPr lang="en-CA" dirty="0" smtClean="0"/>
-              <a:t>Synchronizer&lt;T&gt;</a:t>
-            </a:r>
-          </a:p>
-          <a:p>
-            <a:r>
-              <a:rPr lang="en-CA" dirty="0" smtClean="0"/>
-              <a:t>XAML Oddities</a:t>
+              <a:rPr lang="en-US" dirty="0" smtClean="0"/>
+              <a:t>The action to perform</a:t>
+            </a:r>
+          </a:p>
+          <a:p>
+            <a:pPr lvl="1"/>
+            <a:r>
+              <a:rPr lang="en-US" dirty="0" smtClean="0"/>
+              <a:t>A specification for when that action can be performed</a:t>
             </a:r>
           </a:p>
         </p:txBody>
@@ -5321,7 +5828,7 @@
     </p:spTree>
     <p:extLst>
       <p:ext uri="{BB962C8B-B14F-4D97-AF65-F5344CB8AC3E}">
-        <p14:creationId xmlns:p14="http://schemas.microsoft.com/office/powerpoint/2010/main" val="2372477167"/>
+        <p14:creationId xmlns:p14="http://schemas.microsoft.com/office/powerpoint/2010/main" val="444865502"/>
       </p:ext>
     </p:extLst>
   </p:cSld>
@@ -5371,42 +5878,60 @@
           <a:lstStyle/>
           <a:p>
             <a:r>
+              <a:rPr lang="en-CA" dirty="0"/>
+              <a:t>User Interaction</a:t>
+            </a:r>
+            <a:endParaRPr lang="en-US" dirty="0"/>
+          </a:p>
+        </p:txBody>
+      </p:sp>
+      <p:sp>
+        <p:nvSpPr>
+          <p:cNvPr id="3" name="Content Placeholder 2"/>
+          <p:cNvSpPr>
+            <a:spLocks noGrp="1"/>
+          </p:cNvSpPr>
+          <p:nvPr>
+            <p:ph idx="1"/>
+          </p:nvPr>
+        </p:nvSpPr>
+        <p:spPr/>
+        <p:txBody>
+          <a:bodyPr/>
+          <a:lstStyle/>
+          <a:p>
+            <a:r>
+              <a:rPr lang="en-US" dirty="0" err="1" smtClean="0"/>
+              <a:t>IDataErrorInfo</a:t>
+            </a:r>
+            <a:endParaRPr lang="en-US" dirty="0" smtClean="0"/>
+          </a:p>
+          <a:p>
+            <a:pPr lvl="1"/>
+            <a:r>
               <a:rPr lang="en-US" dirty="0" smtClean="0"/>
-              <a:t>Summary</a:t>
-            </a:r>
-            <a:endParaRPr lang="en-US" dirty="0"/>
-          </a:p>
-        </p:txBody>
-      </p:sp>
-      <p:sp>
-        <p:nvSpPr>
-          <p:cNvPr id="3" name="Content Placeholder 2"/>
-          <p:cNvSpPr>
-            <a:spLocks noGrp="1"/>
-          </p:cNvSpPr>
-          <p:nvPr>
-            <p:ph idx="1"/>
-          </p:nvPr>
-        </p:nvSpPr>
-        <p:spPr/>
-        <p:txBody>
-          <a:bodyPr/>
-          <a:lstStyle/>
-          <a:p>
-            <a:endParaRPr lang="en-US"/>
+              <a:t>Used to provide validation notifications to the View</a:t>
+            </a:r>
           </a:p>
         </p:txBody>
       </p:sp>
     </p:spTree>
     <p:extLst>
       <p:ext uri="{BB962C8B-B14F-4D97-AF65-F5344CB8AC3E}">
-        <p14:creationId xmlns:p14="http://schemas.microsoft.com/office/powerpoint/2010/main" val="1512480988"/>
+        <p14:creationId xmlns:p14="http://schemas.microsoft.com/office/powerpoint/2010/main" val="2811138508"/>
       </p:ext>
     </p:extLst>
   </p:cSld>
   <p:clrMapOvr>
     <a:masterClrMapping/>
   </p:clrMapOvr>
+  <p:timing>
+    <p:tnLst>
+      <p:par>
+        <p:cTn id="1" dur="indefinite" restart="never" nodeType="tmRoot"/>
+      </p:par>
+    </p:tnLst>
+  </p:timing>
 </p:sld>
 </file>
 
@@ -5444,7 +5969,7 @@
           <a:p>
             <a:r>
               <a:rPr lang="en-US" dirty="0" smtClean="0"/>
-              <a:t>Questions?</a:t>
+              <a:t>Summary</a:t>
             </a:r>
             <a:endParaRPr lang="en-US" dirty="0"/>
           </a:p>
@@ -5462,23 +5987,192 @@
         </p:nvSpPr>
         <p:spPr/>
         <p:txBody>
-          <a:bodyPr/>
-          <a:lstStyle/>
-          <a:p>
-            <a:endParaRPr lang="en-US"/>
+          <a:bodyPr>
+            <a:normAutofit fontScale="70000" lnSpcReduction="20000"/>
+          </a:bodyPr>
+          <a:lstStyle/>
+          <a:p>
+            <a:pPr marL="0" indent="0">
+              <a:buNone/>
+            </a:pPr>
+            <a:endParaRPr lang="en-US" dirty="0" smtClean="0"/>
+          </a:p>
+          <a:p>
+            <a:pPr marL="0" indent="0">
+              <a:buNone/>
+            </a:pPr>
+            <a:endParaRPr lang="en-US" dirty="0" smtClean="0"/>
+          </a:p>
+          <a:p>
+            <a:pPr marL="0" indent="0">
+              <a:buNone/>
+            </a:pPr>
+            <a:r>
+              <a:rPr lang="en-US" dirty="0" smtClean="0"/>
+              <a:t>Pros</a:t>
+            </a:r>
+          </a:p>
+          <a:p>
+            <a:pPr marL="834390" lvl="1" indent="-514350">
+              <a:buFont typeface="+mj-lt"/>
+              <a:buAutoNum type="arabicPeriod"/>
+            </a:pPr>
+            <a:r>
+              <a:rPr lang="en-CA" dirty="0"/>
+              <a:t>Built-in plumbing via WPF features</a:t>
+            </a:r>
+          </a:p>
+          <a:p>
+            <a:pPr marL="1108710" lvl="2" indent="-514350">
+              <a:buFont typeface="+mj-lt"/>
+              <a:buAutoNum type="alphaLcParenR"/>
+            </a:pPr>
+            <a:r>
+              <a:rPr lang="en-CA" dirty="0"/>
+              <a:t>Less Code</a:t>
+            </a:r>
+          </a:p>
+          <a:p>
+            <a:pPr marL="1108710" lvl="2" indent="-514350">
+              <a:buFont typeface="+mj-lt"/>
+              <a:buAutoNum type="alphaLcParenR"/>
+            </a:pPr>
+            <a:r>
+              <a:rPr lang="en-CA" dirty="0"/>
+              <a:t>Looser Coupling</a:t>
+            </a:r>
+          </a:p>
+          <a:p>
+            <a:pPr marL="834390" lvl="1" indent="-514350">
+              <a:buFont typeface="+mj-lt"/>
+              <a:buAutoNum type="arabicPeriod"/>
+            </a:pPr>
+            <a:r>
+              <a:rPr lang="en-CA" dirty="0"/>
+              <a:t>Focus on design without affecting behaviour</a:t>
+            </a:r>
+          </a:p>
+          <a:p>
+            <a:pPr marL="834390" lvl="1" indent="-514350">
+              <a:buFont typeface="+mj-lt"/>
+              <a:buAutoNum type="arabicPeriod"/>
+            </a:pPr>
+            <a:r>
+              <a:rPr lang="en-CA" dirty="0"/>
+              <a:t>Maintainability</a:t>
+            </a:r>
+          </a:p>
+          <a:p>
+            <a:pPr marL="0" indent="0">
+              <a:buNone/>
+            </a:pPr>
+            <a:endParaRPr lang="en-US" dirty="0" smtClean="0"/>
+          </a:p>
+          <a:p>
+            <a:pPr marL="0" indent="0">
+              <a:buNone/>
+            </a:pPr>
+            <a:r>
+              <a:rPr lang="en-US" dirty="0" smtClean="0"/>
+              <a:t>Cons</a:t>
+            </a:r>
+          </a:p>
+          <a:p>
+            <a:pPr marL="777240" lvl="1" indent="-457200">
+              <a:buFont typeface="+mj-lt"/>
+              <a:buAutoNum type="arabicPeriod"/>
+            </a:pPr>
+            <a:r>
+              <a:rPr lang="en-CA" dirty="0"/>
+              <a:t>Bindings are strings (XAML vs. C#)</a:t>
+            </a:r>
+          </a:p>
+          <a:p>
+            <a:pPr marL="777240" lvl="1" indent="-457200">
+              <a:buFont typeface="+mj-lt"/>
+              <a:buAutoNum type="arabicPeriod"/>
+            </a:pPr>
+            <a:r>
+              <a:rPr lang="en-CA" dirty="0"/>
+              <a:t>Some controls don’t bind well</a:t>
+            </a:r>
+          </a:p>
+          <a:p>
+            <a:pPr marL="777240" lvl="1" indent="-457200">
+              <a:buFont typeface="+mj-lt"/>
+              <a:buAutoNum type="arabicPeriod"/>
+            </a:pPr>
+            <a:r>
+              <a:rPr lang="en-CA" dirty="0" err="1"/>
+              <a:t>INotifyPropertyChanged</a:t>
+            </a:r>
+            <a:r>
+              <a:rPr lang="en-CA" dirty="0"/>
+              <a:t> events are published as </a:t>
+            </a:r>
+            <a:r>
+              <a:rPr lang="en-CA" dirty="0" smtClean="0"/>
+              <a:t>strings</a:t>
+            </a:r>
+          </a:p>
+          <a:p>
+            <a:pPr marL="1051560" lvl="2" indent="-457200">
+              <a:buFont typeface="+mj-lt"/>
+              <a:buAutoNum type="arabicPeriod"/>
+            </a:pPr>
+            <a:r>
+              <a:rPr lang="en-CA" dirty="0"/>
+              <a:t>Synchronizer&lt;T</a:t>
+            </a:r>
+            <a:r>
+              <a:rPr lang="en-CA" dirty="0" smtClean="0"/>
+              <a:t>&gt;</a:t>
+            </a:r>
+            <a:endParaRPr lang="en-CA" dirty="0"/>
+          </a:p>
+          <a:p>
+            <a:pPr marL="777240" lvl="1" indent="-457200">
+              <a:buFont typeface="+mj-lt"/>
+              <a:buAutoNum type="arabicPeriod"/>
+            </a:pPr>
+            <a:r>
+              <a:rPr lang="en-CA" dirty="0" smtClean="0"/>
+              <a:t>XAML </a:t>
+            </a:r>
+            <a:r>
+              <a:rPr lang="en-CA" dirty="0"/>
+              <a:t>Oddities</a:t>
+            </a:r>
+          </a:p>
+          <a:p>
+            <a:endParaRPr lang="en-US" dirty="0" smtClean="0"/>
+          </a:p>
+          <a:p>
+            <a:endParaRPr lang="en-US" dirty="0" smtClean="0"/>
+          </a:p>
+          <a:p>
+            <a:pPr lvl="1"/>
+            <a:endParaRPr lang="en-US" dirty="0"/>
           </a:p>
         </p:txBody>
       </p:sp>
     </p:spTree>
     <p:extLst>
       <p:ext uri="{BB962C8B-B14F-4D97-AF65-F5344CB8AC3E}">
-        <p14:creationId xmlns:p14="http://schemas.microsoft.com/office/powerpoint/2010/main" val="754734916"/>
+        <p14:creationId xmlns:p14="http://schemas.microsoft.com/office/powerpoint/2010/main" val="1512480988"/>
       </p:ext>
     </p:extLst>
   </p:cSld>
   <p:clrMapOvr>
     <a:masterClrMapping/>
   </p:clrMapOvr>
+  <p:timing>
+    <p:tnLst>
+      <p:par>
+        <p:cTn id="1" dur="indefinite" restart="never" nodeType="tmRoot"/>
+      </p:par>
+    </p:tnLst>
+  </p:timing>
 </p:sld>
 </file>
 
@@ -5515,10 +6209,84 @@
           <a:lstStyle/>
           <a:p>
             <a:r>
+              <a:rPr lang="en-US" dirty="0" smtClean="0"/>
+              <a:t>Questions?</a:t>
+            </a:r>
+            <a:endParaRPr lang="en-US" dirty="0"/>
+          </a:p>
+        </p:txBody>
+      </p:sp>
+      <p:sp>
+        <p:nvSpPr>
+          <p:cNvPr id="3" name="Content Placeholder 2"/>
+          <p:cNvSpPr>
+            <a:spLocks noGrp="1"/>
+          </p:cNvSpPr>
+          <p:nvPr>
+            <p:ph idx="1"/>
+          </p:nvPr>
+        </p:nvSpPr>
+        <p:spPr/>
+        <p:txBody>
+          <a:bodyPr/>
+          <a:lstStyle/>
+          <a:p>
+            <a:endParaRPr lang="en-US"/>
+          </a:p>
+        </p:txBody>
+      </p:sp>
+    </p:spTree>
+    <p:extLst>
+      <p:ext uri="{BB962C8B-B14F-4D97-AF65-F5344CB8AC3E}">
+        <p14:creationId xmlns:p14="http://schemas.microsoft.com/office/powerpoint/2010/main" val="754734916"/>
+      </p:ext>
+    </p:extLst>
+  </p:cSld>
+  <p:clrMapOvr>
+    <a:masterClrMapping/>
+  </p:clrMapOvr>
+</p:sld>
+</file>
+
+<file path=ppt/slides/slide14.xml><?xml version="1.0" encoding="utf-8"?>
+<p:sld xmlns:a="http://schemas.openxmlformats.org/drawingml/2006/main" xmlns:r="http://schemas.openxmlformats.org/officeDocument/2006/relationships" xmlns:p="http://schemas.openxmlformats.org/presentationml/2006/main">
+  <p:cSld>
+    <p:spTree>
+      <p:nvGrpSpPr>
+        <p:cNvPr id="1" name=""/>
+        <p:cNvGrpSpPr/>
+        <p:nvPr/>
+      </p:nvGrpSpPr>
+      <p:grpSpPr>
+        <a:xfrm>
+          <a:off x="0" y="0"/>
+          <a:ext cx="0" cy="0"/>
+          <a:chOff x="0" y="0"/>
+          <a:chExt cx="0" cy="0"/>
+        </a:xfrm>
+      </p:grpSpPr>
+      <p:sp>
+        <p:nvSpPr>
+          <p:cNvPr id="2" name="Title 1"/>
+          <p:cNvSpPr>
+            <a:spLocks noGrp="1"/>
+          </p:cNvSpPr>
+          <p:nvPr>
+            <p:ph type="title"/>
+          </p:nvPr>
+        </p:nvSpPr>
+        <p:spPr/>
+        <p:txBody>
+          <a:bodyPr>
+            <a:normAutofit/>
+          </a:bodyPr>
+          <a:lstStyle/>
+          <a:p>
+            <a:r>
               <a:rPr lang="en-CA" dirty="0" smtClean="0"/>
               <a:t>Contact Us</a:t>
             </a:r>
-            <a:endParaRPr lang="en-CA" dirty="0"/>
+            <a:endParaRPr lang="en-CA" sz="1400" dirty="0"/>
           </a:p>
         </p:txBody>
       </p:sp>
@@ -5539,12 +6307,14 @@
           </a:xfrm>
         </p:spPr>
         <p:txBody>
-          <a:bodyPr/>
+          <a:bodyPr>
+            <a:normAutofit lnSpcReduction="10000"/>
+          </a:bodyPr>
           <a:lstStyle/>
           <a:p>
             <a:r>
               <a:rPr lang="en-CA" dirty="0" smtClean="0"/>
-              <a:t>Jason Lepp </a:t>
+              <a:t>Jason Lepp</a:t>
             </a:r>
           </a:p>
           <a:p>
@@ -5553,7 +6323,6 @@
               <a:rPr lang="en-CA" dirty="0" smtClean="0"/>
               <a:t>jlepp@arcresources.com</a:t>
             </a:r>
-            <a:endParaRPr lang="en-CA" dirty="0" smtClean="0"/>
           </a:p>
           <a:p>
             <a:r>
@@ -5571,7 +6340,6 @@
               <a:rPr lang="en-CA" dirty="0" smtClean="0"/>
               <a:t>mkhan@arcresources.com</a:t>
             </a:r>
-            <a:endParaRPr lang="en-CA" dirty="0" smtClean="0"/>
           </a:p>
           <a:p>
             <a:r>
@@ -5584,6 +6352,15 @@
             <a:r>
               <a:rPr lang="en-CA" dirty="0" smtClean="0"/>
               <a:t>canderson@arcresources.com</a:t>
+            </a:r>
+          </a:p>
+          <a:p>
+            <a:pPr marL="0" indent="0">
+              <a:buNone/>
+            </a:pPr>
+            <a:r>
+              <a:rPr lang="en-CA" sz="2600" dirty="0"/>
+              <a:t>http://github.com/arcresources/MVPtoMVVM</a:t>
             </a:r>
             <a:endParaRPr lang="en-CA" dirty="0" smtClean="0"/>
           </a:p>
@@ -5692,7 +6469,7 @@
         <p:spPr/>
         <p:txBody>
           <a:bodyPr>
-            <a:normAutofit fontScale="92500" lnSpcReduction="20000"/>
+            <a:normAutofit fontScale="92500" lnSpcReduction="10000"/>
           </a:bodyPr>
           <a:lstStyle/>
           <a:p>
@@ -5757,42 +6534,31 @@
           </a:p>
           <a:p>
             <a:r>
+              <a:rPr lang="en-CA" smtClean="0"/>
+              <a:t>Summary</a:t>
+            </a:r>
+            <a:endParaRPr lang="en-CA" dirty="0" smtClean="0"/>
+          </a:p>
+          <a:p>
+            <a:pPr lvl="1"/>
+            <a:r>
               <a:rPr lang="en-CA" dirty="0" smtClean="0"/>
-              <a:t>Difficulties with Model-View-</a:t>
-            </a:r>
-            <a:r>
-              <a:rPr lang="en-CA" dirty="0" err="1" smtClean="0"/>
-              <a:t>ViewModel</a:t>
+              <a:t>Pros</a:t>
+            </a:r>
+          </a:p>
+          <a:p>
+            <a:pPr lvl="1"/>
+            <a:r>
+              <a:rPr lang="en-CA" dirty="0" smtClean="0"/>
+              <a:t>Cons</a:t>
             </a:r>
             <a:endParaRPr lang="en-CA" dirty="0" smtClean="0"/>
-          </a:p>
-          <a:p>
-            <a:pPr lvl="1"/>
-            <a:r>
-              <a:rPr lang="en-CA" dirty="0" smtClean="0"/>
-              <a:t>What are they?</a:t>
-            </a:r>
-          </a:p>
-          <a:p>
-            <a:pPr lvl="1"/>
-            <a:r>
-              <a:rPr lang="en-CA" dirty="0" smtClean="0"/>
-              <a:t>How do we solve them?</a:t>
-            </a:r>
-            <a:endParaRPr lang="en-CA" dirty="0"/>
-          </a:p>
-          <a:p>
-            <a:r>
-              <a:rPr lang="en-CA" dirty="0" smtClean="0"/>
-              <a:t>Summary</a:t>
-            </a:r>
           </a:p>
           <a:p>
             <a:r>
               <a:rPr lang="en-CA" dirty="0" smtClean="0"/>
               <a:t>Questions</a:t>
             </a:r>
-            <a:endParaRPr lang="en-CA" dirty="0" smtClean="0"/>
           </a:p>
           <a:p>
             <a:endParaRPr lang="en-CA" dirty="0" smtClean="0"/>
@@ -5911,40 +6677,14 @@
           </a:p>
           <a:p>
             <a:r>
-              <a:rPr lang="en-CA" sz="1600" dirty="0"/>
-              <a:t>T</a:t>
-            </a:r>
-            <a:r>
               <a:rPr lang="en-CA" sz="1600" dirty="0" smtClean="0"/>
-              <a:t>here is a lot of </a:t>
-            </a:r>
-            <a:r>
-              <a:rPr lang="en-CA" sz="1600" i="1" dirty="0" smtClean="0"/>
-              <a:t>____</a:t>
-            </a:r>
+              <a:t>There is a lot of chatter back and forth between the View and Presenter</a:t>
+            </a:r>
+          </a:p>
+          <a:p>
             <a:r>
               <a:rPr lang="en-CA" sz="1600" dirty="0" smtClean="0"/>
-              <a:t> between the View and Presenter</a:t>
-            </a:r>
-          </a:p>
-          <a:p>
-            <a:pPr lvl="1"/>
-            <a:r>
-              <a:rPr lang="en-CA" sz="1400" dirty="0" smtClean="0"/>
-              <a:t>Plumbing to be done</a:t>
-            </a:r>
-          </a:p>
-          <a:p>
-            <a:pPr lvl="1"/>
-            <a:r>
-              <a:rPr lang="en-CA" sz="1400" dirty="0" smtClean="0"/>
-              <a:t>Chatter back and forth</a:t>
-            </a:r>
-          </a:p>
-          <a:p>
-            <a:r>
-              <a:rPr lang="en-CA" sz="1600" dirty="0" smtClean="0"/>
-              <a:t>Presenter has reference to View to tell it what to do</a:t>
+              <a:t>Presenter has a reference to the View to tell it what to do</a:t>
             </a:r>
           </a:p>
           <a:p>
@@ -6079,8 +6819,19 @@
           <a:lstStyle/>
           <a:p>
             <a:r>
+              <a:rPr lang="en-US" dirty="0"/>
+              <a:t/>
+            </a:r>
+            <a:br>
+              <a:rPr lang="en-US" dirty="0"/>
+            </a:br>
+            <a:r>
+              <a:rPr lang="en-US" dirty="0"/>
+              <a:t>Things </a:t>
+            </a:r>
+            <a:r>
               <a:rPr lang="en-US" dirty="0" smtClean="0"/>
-              <a:t>Things To Do – Sample App</a:t>
+              <a:t>To Do – Sample App</a:t>
             </a:r>
             <a:endParaRPr lang="en-US" dirty="0"/>
           </a:p>
@@ -6674,94 +7425,95 @@
           <a:p>
             <a:r>
               <a:rPr lang="en-US" dirty="0" smtClean="0"/>
-              <a:t>Binding/</a:t>
-            </a:r>
-            <a:r>
-              <a:rPr lang="en-US" dirty="0" err="1" smtClean="0"/>
+              <a:t>Binding</a:t>
+            </a:r>
+            <a:endParaRPr lang="en-US" dirty="0"/>
+          </a:p>
+        </p:txBody>
+      </p:sp>
+      <p:sp>
+        <p:nvSpPr>
+          <p:cNvPr id="3" name="Content Placeholder 2"/>
+          <p:cNvSpPr>
+            <a:spLocks noGrp="1"/>
+          </p:cNvSpPr>
+          <p:nvPr>
+            <p:ph idx="1"/>
+          </p:nvPr>
+        </p:nvSpPr>
+        <p:spPr/>
+        <p:txBody>
+          <a:bodyPr/>
+          <a:lstStyle/>
+          <a:p>
+            <a:r>
+              <a:rPr lang="en-US" dirty="0"/>
+              <a:t>Binding</a:t>
+            </a:r>
+          </a:p>
+          <a:p>
+            <a:pPr lvl="1"/>
+            <a:r>
+              <a:rPr lang="en-US" dirty="0"/>
+              <a:t>Used to bind properties on a control to properties on a </a:t>
+            </a:r>
+            <a:r>
+              <a:rPr lang="en-US" dirty="0" err="1"/>
               <a:t>DataContext</a:t>
             </a:r>
-            <a:endParaRPr lang="en-US" dirty="0"/>
-          </a:p>
-        </p:txBody>
-      </p:sp>
-      <p:sp>
-        <p:nvSpPr>
-          <p:cNvPr id="3" name="Content Placeholder 2"/>
-          <p:cNvSpPr>
-            <a:spLocks noGrp="1"/>
-          </p:cNvSpPr>
-          <p:nvPr>
-            <p:ph idx="1"/>
-          </p:nvPr>
-        </p:nvSpPr>
-        <p:spPr/>
-        <p:txBody>
-          <a:bodyPr/>
-          <a:lstStyle/>
-          <a:p>
-            <a:r>
-              <a:rPr lang="en-US" dirty="0" err="1" smtClean="0"/>
-              <a:t>DataContext</a:t>
-            </a:r>
+            <a:r>
+              <a:rPr lang="en-US" dirty="0"/>
+              <a:t> (</a:t>
+            </a:r>
+            <a:r>
+              <a:rPr lang="en-US" dirty="0" err="1"/>
+              <a:t>ViewModel</a:t>
+            </a:r>
+            <a:r>
+              <a:rPr lang="en-US" dirty="0" smtClean="0"/>
+              <a:t>)</a:t>
+            </a:r>
+          </a:p>
+          <a:p>
+            <a:pPr lvl="1"/>
             <a:endParaRPr lang="en-US" dirty="0" smtClean="0"/>
-          </a:p>
-          <a:p>
-            <a:pPr lvl="1"/>
-            <a:r>
-              <a:rPr lang="en-US" dirty="0" smtClean="0"/>
-              <a:t>Every control has one</a:t>
-            </a:r>
-          </a:p>
-          <a:p>
-            <a:pPr lvl="1"/>
-            <a:r>
-              <a:rPr lang="en-US" dirty="0" smtClean="0"/>
-              <a:t>It is the </a:t>
-            </a:r>
-            <a:r>
-              <a:rPr lang="en-US" dirty="0" err="1" smtClean="0"/>
-              <a:t>ViewModel</a:t>
-            </a:r>
-            <a:r>
-              <a:rPr lang="en-US" dirty="0" smtClean="0"/>
-              <a:t> that is being bound to</a:t>
-            </a:r>
           </a:p>
           <a:p>
             <a:pPr lvl="1"/>
             <a:endParaRPr lang="en-US" dirty="0"/>
           </a:p>
-          <a:p>
-            <a:r>
-              <a:rPr lang="en-US" dirty="0" smtClean="0"/>
-              <a:t>Binding</a:t>
-            </a:r>
-          </a:p>
-          <a:p>
-            <a:pPr lvl="1"/>
-            <a:r>
-              <a:rPr lang="en-US" dirty="0" smtClean="0"/>
-              <a:t>Used to bind properties on a control to properties on a </a:t>
-            </a:r>
-            <a:r>
-              <a:rPr lang="en-US" dirty="0" err="1" smtClean="0"/>
-              <a:t>DataContext</a:t>
-            </a:r>
-            <a:r>
-              <a:rPr lang="en-US" dirty="0" smtClean="0"/>
-              <a:t> (</a:t>
-            </a:r>
-            <a:r>
-              <a:rPr lang="en-US" dirty="0" err="1" smtClean="0"/>
-              <a:t>ViewModel</a:t>
-            </a:r>
-            <a:r>
-              <a:rPr lang="en-US" dirty="0" smtClean="0"/>
-              <a:t>)</a:t>
-            </a:r>
-          </a:p>
-        </p:txBody>
-      </p:sp>
+        </p:txBody>
+      </p:sp>
+      <p:pic>
+        <p:nvPicPr>
+          <p:cNvPr id="6" name="Picture 5"/>
+          <p:cNvPicPr>
+            <a:picLocks noChangeAspect="1"/>
+          </p:cNvPicPr>
+          <p:nvPr/>
+        </p:nvPicPr>
+        <p:blipFill>
+          <a:blip r:embed="rId3">
+            <a:extLst>
+              <a:ext uri="{28A0092B-C50C-407E-A947-70E740481C1C}">
+                <a14:useLocalDpi xmlns:a14="http://schemas.microsoft.com/office/drawing/2010/main" val="0"/>
+              </a:ext>
+            </a:extLst>
+          </a:blip>
+          <a:stretch>
+            <a:fillRect/>
+          </a:stretch>
+        </p:blipFill>
+        <p:spPr>
+          <a:xfrm>
+            <a:off x="2123727" y="3240715"/>
+            <a:ext cx="4572638" cy="476317"/>
+          </a:xfrm>
+          <a:prstGeom prst="rect">
+            <a:avLst/>
+          </a:prstGeom>
+        </p:spPr>
+      </p:pic>
     </p:spTree>
     <p:extLst>
       <p:ext uri="{BB962C8B-B14F-4D97-AF65-F5344CB8AC3E}">
@@ -6772,6 +7524,13 @@
   <p:clrMapOvr>
     <a:masterClrMapping/>
   </p:clrMapOvr>
+  <p:timing>
+    <p:tnLst>
+      <p:par>
+        <p:cTn id="1" dur="indefinite" restart="never" nodeType="tmRoot"/>
+      </p:par>
+    </p:tnLst>
+  </p:timing>
 </p:sld>
 </file>
 
@@ -6804,14 +7563,12 @@
         </p:nvSpPr>
         <p:spPr/>
         <p:txBody>
-          <a:bodyPr>
-            <a:normAutofit fontScale="90000"/>
-          </a:bodyPr>
-          <a:lstStyle/>
-          <a:p>
-            <a:r>
-              <a:rPr lang="en-CA" dirty="0"/>
-              <a:t>Communicating Changes to the View</a:t>
+          <a:bodyPr/>
+          <a:lstStyle/>
+          <a:p>
+            <a:r>
+              <a:rPr lang="en-US" dirty="0" err="1" smtClean="0"/>
+              <a:t>DataContext</a:t>
             </a:r>
             <a:endParaRPr lang="en-US" dirty="0"/>
           </a:p>
@@ -6834,7 +7591,7 @@
           <a:p>
             <a:r>
               <a:rPr lang="en-US" dirty="0" err="1" smtClean="0"/>
-              <a:t>INotifyPropertyChanged</a:t>
+              <a:t>DataContext</a:t>
             </a:r>
             <a:endParaRPr lang="en-US" dirty="0" smtClean="0"/>
           </a:p>
@@ -6842,33 +7599,26 @@
             <a:pPr lvl="1"/>
             <a:r>
               <a:rPr lang="en-US" dirty="0" smtClean="0"/>
-              <a:t>Used to tell the view that a specific property has changed.</a:t>
-            </a:r>
-          </a:p>
-          <a:p>
+              <a:t>Every control has one</a:t>
+            </a:r>
+          </a:p>
+          <a:p>
+            <a:pPr lvl="1"/>
+            <a:r>
+              <a:rPr lang="en-US" dirty="0" smtClean="0"/>
+              <a:t>It is the </a:t>
+            </a:r>
             <a:r>
               <a:rPr lang="en-US" dirty="0" err="1" smtClean="0"/>
-              <a:t>INotifyCollectionChanged</a:t>
+              <a:t>ViewModel</a:t>
             </a:r>
             <a:r>
               <a:rPr lang="en-US" dirty="0" smtClean="0"/>
-              <a:t> (</a:t>
-            </a:r>
-            <a:r>
-              <a:rPr lang="en-US" dirty="0" err="1" smtClean="0"/>
-              <a:t>ObservableCollection</a:t>
-            </a:r>
-            <a:r>
-              <a:rPr lang="en-US" dirty="0" smtClean="0"/>
-              <a:t>&lt;T&gt;)</a:t>
+              <a:t> that is being bound to</a:t>
             </a:r>
           </a:p>
           <a:p>
             <a:pPr lvl="1"/>
-            <a:r>
-              <a:rPr lang="en-US" dirty="0" smtClean="0"/>
-              <a:t>Used to tell the view that the items in the collection have changed.</a:t>
-            </a:r>
             <a:endParaRPr lang="en-US" dirty="0"/>
           </a:p>
         </p:txBody>
@@ -6876,13 +7626,20 @@
     </p:spTree>
     <p:extLst>
       <p:ext uri="{BB962C8B-B14F-4D97-AF65-F5344CB8AC3E}">
-        <p14:creationId xmlns:p14="http://schemas.microsoft.com/office/powerpoint/2010/main" val="221136404"/>
+        <p14:creationId xmlns:p14="http://schemas.microsoft.com/office/powerpoint/2010/main" val="194837130"/>
       </p:ext>
     </p:extLst>
   </p:cSld>
   <p:clrMapOvr>
     <a:masterClrMapping/>
   </p:clrMapOvr>
+  <p:timing>
+    <p:tnLst>
+      <p:par>
+        <p:cTn id="1" dur="indefinite" restart="never" nodeType="tmRoot"/>
+      </p:par>
+    </p:tnLst>
+  </p:timing>
 </p:sld>
 </file>
 
@@ -6915,81 +7672,92 @@
         </p:nvSpPr>
         <p:spPr/>
         <p:txBody>
+          <a:bodyPr>
+            <a:normAutofit fontScale="90000"/>
+          </a:bodyPr>
+          <a:lstStyle/>
+          <a:p>
+            <a:r>
+              <a:rPr lang="en-CA" dirty="0"/>
+              <a:t>Communicating Changes to the View</a:t>
+            </a:r>
+            <a:endParaRPr lang="en-US" dirty="0"/>
+          </a:p>
+        </p:txBody>
+      </p:sp>
+      <p:sp>
+        <p:nvSpPr>
+          <p:cNvPr id="3" name="Content Placeholder 2"/>
+          <p:cNvSpPr>
+            <a:spLocks noGrp="1"/>
+          </p:cNvSpPr>
+          <p:nvPr>
+            <p:ph idx="1"/>
+          </p:nvPr>
+        </p:nvSpPr>
+        <p:spPr/>
+        <p:txBody>
           <a:bodyPr/>
           <a:lstStyle/>
           <a:p>
             <a:r>
-              <a:rPr lang="en-CA" dirty="0"/>
-              <a:t>User Interaction</a:t>
+              <a:rPr lang="en-US" dirty="0" err="1" smtClean="0"/>
+              <a:t>INotifyPropertyChanged</a:t>
+            </a:r>
+            <a:endParaRPr lang="en-US" dirty="0" smtClean="0"/>
+          </a:p>
+          <a:p>
+            <a:pPr lvl="1"/>
+            <a:r>
+              <a:rPr lang="en-US" dirty="0" smtClean="0"/>
+              <a:t>Used to tell the view that a specific property has changed.</a:t>
+            </a:r>
+          </a:p>
+          <a:p>
+            <a:r>
+              <a:rPr lang="en-US" dirty="0" err="1" smtClean="0"/>
+              <a:t>INotifyCollectionChanged</a:t>
+            </a:r>
+            <a:r>
+              <a:rPr lang="en-US" dirty="0" smtClean="0"/>
+              <a:t> (</a:t>
+            </a:r>
+            <a:r>
+              <a:rPr lang="en-US" dirty="0" err="1" smtClean="0"/>
+              <a:t>ObservableCollection</a:t>
+            </a:r>
+            <a:r>
+              <a:rPr lang="en-US" dirty="0" smtClean="0"/>
+              <a:t>&lt;T&gt;)</a:t>
+            </a:r>
+          </a:p>
+          <a:p>
+            <a:pPr lvl="1"/>
+            <a:r>
+              <a:rPr lang="en-US" dirty="0" smtClean="0"/>
+              <a:t>Used to tell the view that the items in the collection have changed.</a:t>
             </a:r>
             <a:endParaRPr lang="en-US" dirty="0"/>
-          </a:p>
-        </p:txBody>
-      </p:sp>
-      <p:sp>
-        <p:nvSpPr>
-          <p:cNvPr id="3" name="Content Placeholder 2"/>
-          <p:cNvSpPr>
-            <a:spLocks noGrp="1"/>
-          </p:cNvSpPr>
-          <p:nvPr>
-            <p:ph idx="1"/>
-          </p:nvPr>
-        </p:nvSpPr>
-        <p:spPr/>
-        <p:txBody>
-          <a:bodyPr/>
-          <a:lstStyle/>
-          <a:p>
-            <a:r>
-              <a:rPr lang="en-US" dirty="0" err="1" smtClean="0"/>
-              <a:t>ICommand</a:t>
-            </a:r>
-            <a:r>
-              <a:rPr lang="en-US" dirty="0" smtClean="0"/>
-              <a:t> – Consists of two things:</a:t>
-            </a:r>
-          </a:p>
-          <a:p>
-            <a:pPr lvl="1"/>
-            <a:r>
-              <a:rPr lang="en-US" dirty="0" smtClean="0"/>
-              <a:t>The action to perform</a:t>
-            </a:r>
-          </a:p>
-          <a:p>
-            <a:pPr lvl="1"/>
-            <a:r>
-              <a:rPr lang="en-US" dirty="0" smtClean="0"/>
-              <a:t>A specification for when that action can be performed</a:t>
-            </a:r>
-          </a:p>
-          <a:p>
-            <a:r>
-              <a:rPr lang="en-US" dirty="0" err="1" smtClean="0"/>
-              <a:t>IDataErrorInfo</a:t>
-            </a:r>
-            <a:endParaRPr lang="en-US" dirty="0" smtClean="0"/>
-          </a:p>
-          <a:p>
-            <a:pPr lvl="1"/>
-            <a:r>
-              <a:rPr lang="en-US" dirty="0" smtClean="0"/>
-              <a:t>Used to provide validation notifications to the View</a:t>
-            </a:r>
           </a:p>
         </p:txBody>
       </p:sp>
     </p:spTree>
     <p:extLst>
       <p:ext uri="{BB962C8B-B14F-4D97-AF65-F5344CB8AC3E}">
-        <p14:creationId xmlns:p14="http://schemas.microsoft.com/office/powerpoint/2010/main" val="444865502"/>
+        <p14:creationId xmlns:p14="http://schemas.microsoft.com/office/powerpoint/2010/main" val="221136404"/>
       </p:ext>
     </p:extLst>
   </p:cSld>
   <p:clrMapOvr>
     <a:masterClrMapping/>
   </p:clrMapOvr>
+  <p:timing>
+    <p:tnLst>
+      <p:par>
+        <p:cTn id="1" dur="indefinite" restart="never" nodeType="tmRoot"/>
+      </p:par>
+    </p:tnLst>
+  </p:timing>
 </p:sld>
 </file>
 

</xml_diff>

<commit_message>
added the datacontext image back to the slide deck.
</commit_message>
<xml_diff>
--- a/docs/MVP to MVVM.pptx
+++ b/docs/MVP to MVVM.pptx
@@ -7490,6 +7490,43 @@
           </a:p>
         </p:txBody>
       </p:sp>
+      <p:pic>
+        <p:nvPicPr>
+          <p:cNvPr id="4" name="Picture 3"/>
+          <p:cNvPicPr>
+            <a:picLocks noChangeAspect="1"/>
+          </p:cNvPicPr>
+          <p:nvPr/>
+        </p:nvPicPr>
+        <p:blipFill>
+          <a:blip r:embed="rId3">
+            <a:extLst>
+              <a:ext uri="{28A0092B-C50C-407E-A947-70E740481C1C}">
+                <a14:useLocalDpi xmlns:a14="http://schemas.microsoft.com/office/drawing/2010/main" val="0"/>
+              </a:ext>
+            </a:extLst>
+          </a:blip>
+          <a:stretch>
+            <a:fillRect/>
+          </a:stretch>
+        </p:blipFill>
+        <p:spPr>
+          <a:xfrm>
+            <a:off x="2419050" y="3390459"/>
+            <a:ext cx="4305901" cy="1581371"/>
+          </a:xfrm>
+          <a:prstGeom prst="rect">
+            <a:avLst/>
+          </a:prstGeom>
+          <a:effectLst>
+            <a:outerShdw blurRad="76200" dir="13500000" sy="23000" kx="1200000" algn="br" rotWithShape="0">
+              <a:prstClr val="black">
+                <a:alpha val="20000"/>
+              </a:prstClr>
+            </a:outerShdw>
+          </a:effectLst>
+        </p:spPr>
+      </p:pic>
     </p:spTree>
     <p:extLst>
       <p:ext uri="{BB962C8B-B14F-4D97-AF65-F5344CB8AC3E}">
@@ -7631,6 +7668,13 @@
           <a:prstGeom prst="rect">
             <a:avLst/>
           </a:prstGeom>
+          <a:effectLst>
+            <a:outerShdw blurRad="76200" dir="13500000" sy="23000" kx="1200000" algn="br" rotWithShape="0">
+              <a:prstClr val="black">
+                <a:alpha val="20000"/>
+              </a:prstClr>
+            </a:outerShdw>
+          </a:effectLst>
         </p:spPr>
       </p:pic>
     </p:spTree>

</xml_diff>

<commit_message>
Update Presentation to have image for datacontext
</commit_message>
<xml_diff>
--- a/docs/MVP to MVVM.pptx
+++ b/docs/MVP to MVVM.pptx
@@ -7490,6 +7490,43 @@
           </a:p>
         </p:txBody>
       </p:sp>
+      <p:pic>
+        <p:nvPicPr>
+          <p:cNvPr id="4" name="Picture 3"/>
+          <p:cNvPicPr>
+            <a:picLocks noChangeAspect="1"/>
+          </p:cNvPicPr>
+          <p:nvPr/>
+        </p:nvPicPr>
+        <p:blipFill>
+          <a:blip r:embed="rId3">
+            <a:extLst>
+              <a:ext uri="{28A0092B-C50C-407E-A947-70E740481C1C}">
+                <a14:useLocalDpi xmlns:a14="http://schemas.microsoft.com/office/drawing/2010/main" val="0"/>
+              </a:ext>
+            </a:extLst>
+          </a:blip>
+          <a:stretch>
+            <a:fillRect/>
+          </a:stretch>
+        </p:blipFill>
+        <p:spPr>
+          <a:xfrm>
+            <a:off x="2419050" y="3390459"/>
+            <a:ext cx="4305901" cy="1581371"/>
+          </a:xfrm>
+          <a:prstGeom prst="rect">
+            <a:avLst/>
+          </a:prstGeom>
+          <a:effectLst>
+            <a:outerShdw blurRad="76200" dir="13500000" sy="23000" kx="1200000" algn="br" rotWithShape="0">
+              <a:prstClr val="black">
+                <a:alpha val="20000"/>
+              </a:prstClr>
+            </a:outerShdw>
+          </a:effectLst>
+        </p:spPr>
+      </p:pic>
     </p:spTree>
     <p:extLst>
       <p:ext uri="{BB962C8B-B14F-4D97-AF65-F5344CB8AC3E}">
@@ -7631,6 +7668,13 @@
           <a:prstGeom prst="rect">
             <a:avLst/>
           </a:prstGeom>
+          <a:effectLst>
+            <a:outerShdw blurRad="76200" dir="13500000" sy="23000" kx="1200000" algn="br" rotWithShape="0">
+              <a:prstClr val="black">
+                <a:alpha val="20000"/>
+              </a:prstClr>
+            </a:outerShdw>
+          </a:effectLst>
         </p:spPr>
       </p:pic>
     </p:spTree>

</xml_diff>